<commit_message>
ultima ac enviado pro taka
</commit_message>
<xml_diff>
--- a/cenarioNegocio_DFD_analiseEventos_analiseCicloVida_modeloConceitual .pptx
+++ b/cenarioNegocio_DFD_analiseEventos_analiseCicloVida_modeloConceitual .pptx
@@ -2997,7 +2997,7 @@
           <p:cNvPr id="4" name="Retângulo 3">
             <a:extLst>
               <a:ext uri="{FF2B5EF4-FFF2-40B4-BE49-F238E27FC236}">
-                <a16:creationId xmlns:a16="http://schemas.microsoft.com/office/drawing/2014/main" id="{88C6BF1B-8B81-4A42-B266-9DF3168EF8CB}"/>
+                <a16:creationId xmlns="" xmlns:a16="http://schemas.microsoft.com/office/drawing/2014/main" id="{88C6BF1B-8B81-4A42-B266-9DF3168EF8CB}"/>
               </a:ext>
             </a:extLst>
           </p:cNvPr>
@@ -3059,7 +3059,7 @@
           <p:cNvPr id="6" name="CaixaDeTexto 5">
             <a:extLst>
               <a:ext uri="{FF2B5EF4-FFF2-40B4-BE49-F238E27FC236}">
-                <a16:creationId xmlns:a16="http://schemas.microsoft.com/office/drawing/2014/main" id="{1270056D-C445-482D-9C8C-EC4698A09D63}"/>
+                <a16:creationId xmlns="" xmlns:a16="http://schemas.microsoft.com/office/drawing/2014/main" id="{1270056D-C445-482D-9C8C-EC4698A09D63}"/>
               </a:ext>
             </a:extLst>
           </p:cNvPr>
@@ -3100,7 +3100,7 @@
           <p:cNvPr id="5" name="Retângulo 4">
             <a:extLst>
               <a:ext uri="{FF2B5EF4-FFF2-40B4-BE49-F238E27FC236}">
-                <a16:creationId xmlns:a16="http://schemas.microsoft.com/office/drawing/2014/main" id="{BBA1E2F4-BBFF-4EB2-B8C3-D9ECB7B26A24}"/>
+                <a16:creationId xmlns="" xmlns:a16="http://schemas.microsoft.com/office/drawing/2014/main" id="{BBA1E2F4-BBFF-4EB2-B8C3-D9ECB7B26A24}"/>
               </a:ext>
             </a:extLst>
           </p:cNvPr>
@@ -3149,7 +3149,7 @@
           <p:cNvPr id="3" name="Imagem 6" descr="Uma imagem contendo objeto&#10;&#10;Descrição gerada com muito alta confiança">
             <a:extLst>
               <a:ext uri="{FF2B5EF4-FFF2-40B4-BE49-F238E27FC236}">
-                <a16:creationId xmlns:a16="http://schemas.microsoft.com/office/drawing/2014/main" id="{92E329D9-4E40-4305-B89E-0B0FAF525C3C}"/>
+                <a16:creationId xmlns="" xmlns:a16="http://schemas.microsoft.com/office/drawing/2014/main" id="{92E329D9-4E40-4305-B89E-0B0FAF525C3C}"/>
               </a:ext>
             </a:extLst>
           </p:cNvPr>
@@ -3179,7 +3179,7 @@
           <p:cNvPr id="8" name="Conector de Seta Reta 7">
             <a:extLst>
               <a:ext uri="{FF2B5EF4-FFF2-40B4-BE49-F238E27FC236}">
-                <a16:creationId xmlns:a16="http://schemas.microsoft.com/office/drawing/2014/main" id="{FDC2BAF2-F507-44C8-BC1B-784D4C14FB57}"/>
+                <a16:creationId xmlns="" xmlns:a16="http://schemas.microsoft.com/office/drawing/2014/main" id="{FDC2BAF2-F507-44C8-BC1B-784D4C14FB57}"/>
               </a:ext>
             </a:extLst>
           </p:cNvPr>
@@ -3221,7 +3221,7 @@
           <p:cNvPr id="11" name="Imagem 6" descr="Uma imagem contendo objeto&#10;&#10;Descrição gerada com muito alta confiança">
             <a:extLst>
               <a:ext uri="{FF2B5EF4-FFF2-40B4-BE49-F238E27FC236}">
-                <a16:creationId xmlns:a16="http://schemas.microsoft.com/office/drawing/2014/main" id="{014B8D47-4BA0-4DA7-9AA1-4ED584384696}"/>
+                <a16:creationId xmlns="" xmlns:a16="http://schemas.microsoft.com/office/drawing/2014/main" id="{014B8D47-4BA0-4DA7-9AA1-4ED584384696}"/>
               </a:ext>
             </a:extLst>
           </p:cNvPr>
@@ -3251,7 +3251,7 @@
           <p:cNvPr id="12" name="Conector de Seta Reta 11">
             <a:extLst>
               <a:ext uri="{FF2B5EF4-FFF2-40B4-BE49-F238E27FC236}">
-                <a16:creationId xmlns:a16="http://schemas.microsoft.com/office/drawing/2014/main" id="{D6BF6348-7521-4FCC-8C02-2373BA40D8BE}"/>
+                <a16:creationId xmlns="" xmlns:a16="http://schemas.microsoft.com/office/drawing/2014/main" id="{D6BF6348-7521-4FCC-8C02-2373BA40D8BE}"/>
               </a:ext>
             </a:extLst>
           </p:cNvPr>
@@ -3295,7 +3295,7 @@
           <p:cNvPr id="13" name="Imagem 6" descr="Uma imagem contendo objeto&#10;&#10;Descrição gerada com muito alta confiança">
             <a:extLst>
               <a:ext uri="{FF2B5EF4-FFF2-40B4-BE49-F238E27FC236}">
-                <a16:creationId xmlns:a16="http://schemas.microsoft.com/office/drawing/2014/main" id="{C2683C72-D2AC-4582-9167-11414D7556C0}"/>
+                <a16:creationId xmlns="" xmlns:a16="http://schemas.microsoft.com/office/drawing/2014/main" id="{C2683C72-D2AC-4582-9167-11414D7556C0}"/>
               </a:ext>
             </a:extLst>
           </p:cNvPr>
@@ -3325,7 +3325,7 @@
           <p:cNvPr id="14" name="Imagem 6" descr="Uma imagem contendo objeto&#10;&#10;Descrição gerada com muito alta confiança">
             <a:extLst>
               <a:ext uri="{FF2B5EF4-FFF2-40B4-BE49-F238E27FC236}">
-                <a16:creationId xmlns:a16="http://schemas.microsoft.com/office/drawing/2014/main" id="{7BD7278E-63C9-4A7B-A177-39455309996E}"/>
+                <a16:creationId xmlns="" xmlns:a16="http://schemas.microsoft.com/office/drawing/2014/main" id="{7BD7278E-63C9-4A7B-A177-39455309996E}"/>
               </a:ext>
             </a:extLst>
           </p:cNvPr>
@@ -3355,7 +3355,7 @@
           <p:cNvPr id="17" name="Conector de Seta Reta 16">
             <a:extLst>
               <a:ext uri="{FF2B5EF4-FFF2-40B4-BE49-F238E27FC236}">
-                <a16:creationId xmlns:a16="http://schemas.microsoft.com/office/drawing/2014/main" id="{44979CC5-335D-4E0A-9F5D-53DF157520B5}"/>
+                <a16:creationId xmlns="" xmlns:a16="http://schemas.microsoft.com/office/drawing/2014/main" id="{44979CC5-335D-4E0A-9F5D-53DF157520B5}"/>
               </a:ext>
             </a:extLst>
           </p:cNvPr>
@@ -3399,7 +3399,7 @@
           <p:cNvPr id="18" name="Conector de Seta Reta 17">
             <a:extLst>
               <a:ext uri="{FF2B5EF4-FFF2-40B4-BE49-F238E27FC236}">
-                <a16:creationId xmlns:a16="http://schemas.microsoft.com/office/drawing/2014/main" id="{CBEB5DF7-DD78-458C-BEF2-5EE6B2EDCE1E}"/>
+                <a16:creationId xmlns="" xmlns:a16="http://schemas.microsoft.com/office/drawing/2014/main" id="{CBEB5DF7-DD78-458C-BEF2-5EE6B2EDCE1E}"/>
               </a:ext>
             </a:extLst>
           </p:cNvPr>
@@ -3443,7 +3443,7 @@
           <p:cNvPr id="19" name="CaixaDeTexto 18">
             <a:extLst>
               <a:ext uri="{FF2B5EF4-FFF2-40B4-BE49-F238E27FC236}">
-                <a16:creationId xmlns:a16="http://schemas.microsoft.com/office/drawing/2014/main" id="{AAD7B907-6CE7-47A0-995C-3DFC3EE8E0B4}"/>
+                <a16:creationId xmlns="" xmlns:a16="http://schemas.microsoft.com/office/drawing/2014/main" id="{AAD7B907-6CE7-47A0-995C-3DFC3EE8E0B4}"/>
               </a:ext>
             </a:extLst>
           </p:cNvPr>
@@ -3483,7 +3483,7 @@
           <p:cNvPr id="7" name="Agrupar 6">
             <a:extLst>
               <a:ext uri="{FF2B5EF4-FFF2-40B4-BE49-F238E27FC236}">
-                <a16:creationId xmlns:a16="http://schemas.microsoft.com/office/drawing/2014/main" id="{C4DEB443-9069-4E32-8358-8CB0FDAF9992}"/>
+                <a16:creationId xmlns="" xmlns:a16="http://schemas.microsoft.com/office/drawing/2014/main" id="{C4DEB443-9069-4E32-8358-8CB0FDAF9992}"/>
               </a:ext>
             </a:extLst>
           </p:cNvPr>
@@ -3503,7 +3503,7 @@
             <p:cNvPr id="24" name="CaixaDeTexto 23">
               <a:extLst>
                 <a:ext uri="{FF2B5EF4-FFF2-40B4-BE49-F238E27FC236}">
-                  <a16:creationId xmlns:a16="http://schemas.microsoft.com/office/drawing/2014/main" id="{3AB6A1BD-1D4F-4398-A8B0-B8E29B8BF1A1}"/>
+                  <a16:creationId xmlns="" xmlns:a16="http://schemas.microsoft.com/office/drawing/2014/main" id="{3AB6A1BD-1D4F-4398-A8B0-B8E29B8BF1A1}"/>
                 </a:ext>
               </a:extLst>
             </p:cNvPr>
@@ -3540,7 +3540,7 @@
             <p:cNvPr id="25" name="CaixaDeTexto 24">
               <a:extLst>
                 <a:ext uri="{FF2B5EF4-FFF2-40B4-BE49-F238E27FC236}">
-                  <a16:creationId xmlns:a16="http://schemas.microsoft.com/office/drawing/2014/main" id="{95B7716E-4A32-4257-96AE-C6ED30D31811}"/>
+                  <a16:creationId xmlns="" xmlns:a16="http://schemas.microsoft.com/office/drawing/2014/main" id="{95B7716E-4A32-4257-96AE-C6ED30D31811}"/>
                 </a:ext>
               </a:extLst>
             </p:cNvPr>
@@ -3580,7 +3580,7 @@
             <p:cNvPr id="26" name="CaixaDeTexto 25">
               <a:extLst>
                 <a:ext uri="{FF2B5EF4-FFF2-40B4-BE49-F238E27FC236}">
-                  <a16:creationId xmlns:a16="http://schemas.microsoft.com/office/drawing/2014/main" id="{01B87135-66BB-4424-98D4-30D87F39682B}"/>
+                  <a16:creationId xmlns="" xmlns:a16="http://schemas.microsoft.com/office/drawing/2014/main" id="{01B87135-66BB-4424-98D4-30D87F39682B}"/>
                 </a:ext>
               </a:extLst>
             </p:cNvPr>
@@ -3618,7 +3618,7 @@
           <p:cNvPr id="27" name="CaixaDeTexto 26">
             <a:extLst>
               <a:ext uri="{FF2B5EF4-FFF2-40B4-BE49-F238E27FC236}">
-                <a16:creationId xmlns:a16="http://schemas.microsoft.com/office/drawing/2014/main" id="{1238592B-29D7-4452-8312-F618C2509B80}"/>
+                <a16:creationId xmlns="" xmlns:a16="http://schemas.microsoft.com/office/drawing/2014/main" id="{1238592B-29D7-4452-8312-F618C2509B80}"/>
               </a:ext>
             </a:extLst>
           </p:cNvPr>
@@ -3656,7 +3656,7 @@
           <p:cNvPr id="28" name="CaixaDeTexto 27">
             <a:extLst>
               <a:ext uri="{FF2B5EF4-FFF2-40B4-BE49-F238E27FC236}">
-                <a16:creationId xmlns:a16="http://schemas.microsoft.com/office/drawing/2014/main" id="{BA57D8EF-4557-428E-AE17-0CB898192D8C}"/>
+                <a16:creationId xmlns="" xmlns:a16="http://schemas.microsoft.com/office/drawing/2014/main" id="{BA57D8EF-4557-428E-AE17-0CB898192D8C}"/>
               </a:ext>
             </a:extLst>
           </p:cNvPr>
@@ -3693,7 +3693,7 @@
           <p:cNvPr id="29" name="CaixaDeTexto 28">
             <a:extLst>
               <a:ext uri="{FF2B5EF4-FFF2-40B4-BE49-F238E27FC236}">
-                <a16:creationId xmlns:a16="http://schemas.microsoft.com/office/drawing/2014/main" id="{DA4508C1-D3E7-4097-886E-155CE2EACFC8}"/>
+                <a16:creationId xmlns="" xmlns:a16="http://schemas.microsoft.com/office/drawing/2014/main" id="{DA4508C1-D3E7-4097-886E-155CE2EACFC8}"/>
               </a:ext>
             </a:extLst>
           </p:cNvPr>
@@ -3730,7 +3730,7 @@
           <p:cNvPr id="30" name="CaixaDeTexto 29">
             <a:extLst>
               <a:ext uri="{FF2B5EF4-FFF2-40B4-BE49-F238E27FC236}">
-                <a16:creationId xmlns:a16="http://schemas.microsoft.com/office/drawing/2014/main" id="{41CB29A6-C155-4EA6-9C70-CF13A4EEC4D8}"/>
+                <a16:creationId xmlns="" xmlns:a16="http://schemas.microsoft.com/office/drawing/2014/main" id="{41CB29A6-C155-4EA6-9C70-CF13A4EEC4D8}"/>
               </a:ext>
             </a:extLst>
           </p:cNvPr>
@@ -3773,7 +3773,7 @@
           <p:cNvPr id="31" name="CaixaDeTexto 30">
             <a:extLst>
               <a:ext uri="{FF2B5EF4-FFF2-40B4-BE49-F238E27FC236}">
-                <a16:creationId xmlns:a16="http://schemas.microsoft.com/office/drawing/2014/main" id="{2751E0A1-1592-48F1-B9EA-2B586EEB78F6}"/>
+                <a16:creationId xmlns="" xmlns:a16="http://schemas.microsoft.com/office/drawing/2014/main" id="{2751E0A1-1592-48F1-B9EA-2B586EEB78F6}"/>
               </a:ext>
             </a:extLst>
           </p:cNvPr>
@@ -3810,7 +3810,7 @@
           <p:cNvPr id="2" name="CaixaDeTexto 1">
             <a:extLst>
               <a:ext uri="{FF2B5EF4-FFF2-40B4-BE49-F238E27FC236}">
-                <a16:creationId xmlns:a16="http://schemas.microsoft.com/office/drawing/2014/main" id="{5445A1D9-44FA-43B3-8C37-5AC19B9DD885}"/>
+                <a16:creationId xmlns="" xmlns:a16="http://schemas.microsoft.com/office/drawing/2014/main" id="{5445A1D9-44FA-43B3-8C37-5AC19B9DD885}"/>
               </a:ext>
             </a:extLst>
           </p:cNvPr>
@@ -3878,7 +3878,7 @@
           <p:cNvPr id="4" name="Retângulo 3">
             <a:extLst>
               <a:ext uri="{FF2B5EF4-FFF2-40B4-BE49-F238E27FC236}">
-                <a16:creationId xmlns:a16="http://schemas.microsoft.com/office/drawing/2014/main" id="{CEF9C6BA-8DDB-476C-86AF-98DA05BAF666}"/>
+                <a16:creationId xmlns="" xmlns:a16="http://schemas.microsoft.com/office/drawing/2014/main" id="{CEF9C6BA-8DDB-476C-86AF-98DA05BAF666}"/>
               </a:ext>
             </a:extLst>
           </p:cNvPr>
@@ -3932,7 +3932,7 @@
           <p:cNvPr id="5" name="CaixaDeTexto 4">
             <a:extLst>
               <a:ext uri="{FF2B5EF4-FFF2-40B4-BE49-F238E27FC236}">
-                <a16:creationId xmlns:a16="http://schemas.microsoft.com/office/drawing/2014/main" id="{0DB7A970-3CC1-4626-9F9D-866AD68C58EA}"/>
+                <a16:creationId xmlns="" xmlns:a16="http://schemas.microsoft.com/office/drawing/2014/main" id="{0DB7A970-3CC1-4626-9F9D-866AD68C58EA}"/>
               </a:ext>
             </a:extLst>
           </p:cNvPr>
@@ -3973,7 +3973,7 @@
           <p:cNvPr id="6" name="Imagem 6" descr="Uma imagem contendo objeto&#10;&#10;Descrição gerada com muito alta confiança">
             <a:extLst>
               <a:ext uri="{FF2B5EF4-FFF2-40B4-BE49-F238E27FC236}">
-                <a16:creationId xmlns:a16="http://schemas.microsoft.com/office/drawing/2014/main" id="{AE41C0EB-3270-451D-B583-48485D46168E}"/>
+                <a16:creationId xmlns="" xmlns:a16="http://schemas.microsoft.com/office/drawing/2014/main" id="{AE41C0EB-3270-451D-B583-48485D46168E}"/>
               </a:ext>
             </a:extLst>
           </p:cNvPr>
@@ -4003,7 +4003,7 @@
           <p:cNvPr id="7" name="Retângulo 6">
             <a:extLst>
               <a:ext uri="{FF2B5EF4-FFF2-40B4-BE49-F238E27FC236}">
-                <a16:creationId xmlns:a16="http://schemas.microsoft.com/office/drawing/2014/main" id="{14F074DC-6DCC-4E08-9917-5BE79B7E65BA}"/>
+                <a16:creationId xmlns="" xmlns:a16="http://schemas.microsoft.com/office/drawing/2014/main" id="{14F074DC-6DCC-4E08-9917-5BE79B7E65BA}"/>
               </a:ext>
             </a:extLst>
           </p:cNvPr>
@@ -4052,7 +4052,7 @@
           <p:cNvPr id="11" name="Conector de Seta Reta 10">
             <a:extLst>
               <a:ext uri="{FF2B5EF4-FFF2-40B4-BE49-F238E27FC236}">
-                <a16:creationId xmlns:a16="http://schemas.microsoft.com/office/drawing/2014/main" id="{AF990622-0DAD-4CF8-B897-C60879C5B414}"/>
+                <a16:creationId xmlns="" xmlns:a16="http://schemas.microsoft.com/office/drawing/2014/main" id="{AF990622-0DAD-4CF8-B897-C60879C5B414}"/>
               </a:ext>
             </a:extLst>
           </p:cNvPr>
@@ -4096,7 +4096,7 @@
           <p:cNvPr id="13" name="CaixaDeTexto 12">
             <a:extLst>
               <a:ext uri="{FF2B5EF4-FFF2-40B4-BE49-F238E27FC236}">
-                <a16:creationId xmlns:a16="http://schemas.microsoft.com/office/drawing/2014/main" id="{B9BDE6EE-83E2-4E9F-9DB8-ABE3AF877CCB}"/>
+                <a16:creationId xmlns="" xmlns:a16="http://schemas.microsoft.com/office/drawing/2014/main" id="{B9BDE6EE-83E2-4E9F-9DB8-ABE3AF877CCB}"/>
               </a:ext>
             </a:extLst>
           </p:cNvPr>
@@ -4133,7 +4133,7 @@
           <p:cNvPr id="29" name="CaixaDeTexto 28">
             <a:extLst>
               <a:ext uri="{FF2B5EF4-FFF2-40B4-BE49-F238E27FC236}">
-                <a16:creationId xmlns:a16="http://schemas.microsoft.com/office/drawing/2014/main" id="{A6762E50-5323-4BE0-915A-EB8EEDBCB00C}"/>
+                <a16:creationId xmlns="" xmlns:a16="http://schemas.microsoft.com/office/drawing/2014/main" id="{A6762E50-5323-4BE0-915A-EB8EEDBCB00C}"/>
               </a:ext>
             </a:extLst>
           </p:cNvPr>
@@ -4173,7 +4173,7 @@
           <p:cNvPr id="30" name="Retângulo 29">
             <a:extLst>
               <a:ext uri="{FF2B5EF4-FFF2-40B4-BE49-F238E27FC236}">
-                <a16:creationId xmlns:a16="http://schemas.microsoft.com/office/drawing/2014/main" id="{3AA62CBD-64E7-4BA1-BBCB-45C4726787D0}"/>
+                <a16:creationId xmlns="" xmlns:a16="http://schemas.microsoft.com/office/drawing/2014/main" id="{3AA62CBD-64E7-4BA1-BBCB-45C4726787D0}"/>
               </a:ext>
             </a:extLst>
           </p:cNvPr>
@@ -4225,7 +4225,7 @@
           <p:cNvPr id="31" name="CaixaDeTexto 30">
             <a:extLst>
               <a:ext uri="{FF2B5EF4-FFF2-40B4-BE49-F238E27FC236}">
-                <a16:creationId xmlns:a16="http://schemas.microsoft.com/office/drawing/2014/main" id="{2B86E22E-128E-40A7-9AA7-48626AD2DFA2}"/>
+                <a16:creationId xmlns="" xmlns:a16="http://schemas.microsoft.com/office/drawing/2014/main" id="{2B86E22E-128E-40A7-9AA7-48626AD2DFA2}"/>
               </a:ext>
             </a:extLst>
           </p:cNvPr>
@@ -4294,7 +4294,7 @@
           <p:cNvPr id="23" name="Agrupar 22">
             <a:extLst>
               <a:ext uri="{FF2B5EF4-FFF2-40B4-BE49-F238E27FC236}">
-                <a16:creationId xmlns:a16="http://schemas.microsoft.com/office/drawing/2014/main" id="{0AAE26CE-50AE-4585-8600-8F5CE0F550A2}"/>
+                <a16:creationId xmlns="" xmlns:a16="http://schemas.microsoft.com/office/drawing/2014/main" id="{0AAE26CE-50AE-4585-8600-8F5CE0F550A2}"/>
               </a:ext>
             </a:extLst>
           </p:cNvPr>
@@ -4314,7 +4314,7 @@
             <p:cNvPr id="4" name="Retângulo 3">
               <a:extLst>
                 <a:ext uri="{FF2B5EF4-FFF2-40B4-BE49-F238E27FC236}">
-                  <a16:creationId xmlns:a16="http://schemas.microsoft.com/office/drawing/2014/main" id="{88C6BF1B-8B81-4A42-B266-9DF3168EF8CB}"/>
+                  <a16:creationId xmlns="" xmlns:a16="http://schemas.microsoft.com/office/drawing/2014/main" id="{88C6BF1B-8B81-4A42-B266-9DF3168EF8CB}"/>
                 </a:ext>
               </a:extLst>
             </p:cNvPr>
@@ -4368,7 +4368,7 @@
             <p:cNvPr id="5" name="CaixaDeTexto 4">
               <a:extLst>
                 <a:ext uri="{FF2B5EF4-FFF2-40B4-BE49-F238E27FC236}">
-                  <a16:creationId xmlns:a16="http://schemas.microsoft.com/office/drawing/2014/main" id="{1AEAEC07-A165-4D26-BBD3-BB0A2EE6FDCE}"/>
+                  <a16:creationId xmlns="" xmlns:a16="http://schemas.microsoft.com/office/drawing/2014/main" id="{1AEAEC07-A165-4D26-BBD3-BB0A2EE6FDCE}"/>
                 </a:ext>
               </a:extLst>
             </p:cNvPr>
@@ -4409,7 +4409,7 @@
             <p:cNvPr id="6" name="Conector de Seta Reta 5">
               <a:extLst>
                 <a:ext uri="{FF2B5EF4-FFF2-40B4-BE49-F238E27FC236}">
-                  <a16:creationId xmlns:a16="http://schemas.microsoft.com/office/drawing/2014/main" id="{3CA215E8-6B7A-4EE8-B19D-43965C2FFF51}"/>
+                  <a16:creationId xmlns="" xmlns:a16="http://schemas.microsoft.com/office/drawing/2014/main" id="{3CA215E8-6B7A-4EE8-B19D-43965C2FFF51}"/>
                 </a:ext>
               </a:extLst>
             </p:cNvPr>
@@ -4452,7 +4452,7 @@
             <p:cNvPr id="7" name="Retângulo 6">
               <a:extLst>
                 <a:ext uri="{FF2B5EF4-FFF2-40B4-BE49-F238E27FC236}">
-                  <a16:creationId xmlns:a16="http://schemas.microsoft.com/office/drawing/2014/main" id="{B85D8224-4133-4070-A5AB-3AE9CA1C3903}"/>
+                  <a16:creationId xmlns="" xmlns:a16="http://schemas.microsoft.com/office/drawing/2014/main" id="{B85D8224-4133-4070-A5AB-3AE9CA1C3903}"/>
                 </a:ext>
               </a:extLst>
             </p:cNvPr>
@@ -4506,7 +4506,7 @@
             <p:cNvPr id="8" name="CaixaDeTexto 1">
               <a:extLst>
                 <a:ext uri="{FF2B5EF4-FFF2-40B4-BE49-F238E27FC236}">
-                  <a16:creationId xmlns:a16="http://schemas.microsoft.com/office/drawing/2014/main" id="{BF9502B6-F748-4FC4-B6F9-18A1E394C2BC}"/>
+                  <a16:creationId xmlns="" xmlns:a16="http://schemas.microsoft.com/office/drawing/2014/main" id="{BF9502B6-F748-4FC4-B6F9-18A1E394C2BC}"/>
                 </a:ext>
               </a:extLst>
             </p:cNvPr>
@@ -4640,7 +4640,7 @@
             <p:cNvPr id="9" name="Agrupar 8">
               <a:extLst>
                 <a:ext uri="{FF2B5EF4-FFF2-40B4-BE49-F238E27FC236}">
-                  <a16:creationId xmlns:a16="http://schemas.microsoft.com/office/drawing/2014/main" id="{70EC6F40-B78A-4FA6-AEC6-D87F09F8F858}"/>
+                  <a16:creationId xmlns="" xmlns:a16="http://schemas.microsoft.com/office/drawing/2014/main" id="{70EC6F40-B78A-4FA6-AEC6-D87F09F8F858}"/>
                 </a:ext>
               </a:extLst>
             </p:cNvPr>
@@ -4660,7 +4660,7 @@
               <p:cNvPr id="10" name="Imagem 6" descr="Uma imagem contendo objeto&#10;&#10;Descrição gerada com muito alta confiança">
                 <a:extLst>
                   <a:ext uri="{FF2B5EF4-FFF2-40B4-BE49-F238E27FC236}">
-                    <a16:creationId xmlns:a16="http://schemas.microsoft.com/office/drawing/2014/main" id="{2EDB6AAB-80CB-4F3F-8B37-01FF56F250D4}"/>
+                    <a16:creationId xmlns="" xmlns:a16="http://schemas.microsoft.com/office/drawing/2014/main" id="{2EDB6AAB-80CB-4F3F-8B37-01FF56F250D4}"/>
                   </a:ext>
                 </a:extLst>
               </p:cNvPr>
@@ -4690,7 +4690,7 @@
               <p:cNvPr id="11" name="CaixaDeTexto 10">
                 <a:extLst>
                   <a:ext uri="{FF2B5EF4-FFF2-40B4-BE49-F238E27FC236}">
-                    <a16:creationId xmlns:a16="http://schemas.microsoft.com/office/drawing/2014/main" id="{D2F17BB0-905F-429F-BA48-277307751C61}"/>
+                    <a16:creationId xmlns="" xmlns:a16="http://schemas.microsoft.com/office/drawing/2014/main" id="{D2F17BB0-905F-429F-BA48-277307751C61}"/>
                   </a:ext>
                 </a:extLst>
               </p:cNvPr>
@@ -4731,7 +4731,7 @@
             <p:cNvPr id="12" name="Conector de Seta Reta 11">
               <a:extLst>
                 <a:ext uri="{FF2B5EF4-FFF2-40B4-BE49-F238E27FC236}">
-                  <a16:creationId xmlns:a16="http://schemas.microsoft.com/office/drawing/2014/main" id="{AADFC01F-DE98-49E6-BCF3-4D209C12920F}"/>
+                  <a16:creationId xmlns="" xmlns:a16="http://schemas.microsoft.com/office/drawing/2014/main" id="{AADFC01F-DE98-49E6-BCF3-4D209C12920F}"/>
                 </a:ext>
               </a:extLst>
             </p:cNvPr>
@@ -4775,7 +4775,7 @@
             <p:cNvPr id="13" name="Conector de Seta Reta 12">
               <a:extLst>
                 <a:ext uri="{FF2B5EF4-FFF2-40B4-BE49-F238E27FC236}">
-                  <a16:creationId xmlns:a16="http://schemas.microsoft.com/office/drawing/2014/main" id="{38305CCA-0FC0-4C75-8071-F8E8AE25FE80}"/>
+                  <a16:creationId xmlns="" xmlns:a16="http://schemas.microsoft.com/office/drawing/2014/main" id="{38305CCA-0FC0-4C75-8071-F8E8AE25FE80}"/>
                 </a:ext>
               </a:extLst>
             </p:cNvPr>
@@ -4819,7 +4819,7 @@
             <p:cNvPr id="15" name="CaixaDeTexto 14">
               <a:extLst>
                 <a:ext uri="{FF2B5EF4-FFF2-40B4-BE49-F238E27FC236}">
-                  <a16:creationId xmlns:a16="http://schemas.microsoft.com/office/drawing/2014/main" id="{1072E68A-2CFE-47FF-8235-BA0891062FB7}"/>
+                  <a16:creationId xmlns="" xmlns:a16="http://schemas.microsoft.com/office/drawing/2014/main" id="{1072E68A-2CFE-47FF-8235-BA0891062FB7}"/>
                 </a:ext>
               </a:extLst>
             </p:cNvPr>
@@ -4860,7 +4860,7 @@
             <p:cNvPr id="16" name="CaixaDeTexto 15">
               <a:extLst>
                 <a:ext uri="{FF2B5EF4-FFF2-40B4-BE49-F238E27FC236}">
-                  <a16:creationId xmlns:a16="http://schemas.microsoft.com/office/drawing/2014/main" id="{5FE7BE5C-46D4-4852-A65D-C8065BA82FF9}"/>
+                  <a16:creationId xmlns="" xmlns:a16="http://schemas.microsoft.com/office/drawing/2014/main" id="{5FE7BE5C-46D4-4852-A65D-C8065BA82FF9}"/>
                 </a:ext>
               </a:extLst>
             </p:cNvPr>
@@ -4899,7 +4899,7 @@
             <p:cNvPr id="20" name="Agrupar 19">
               <a:extLst>
                 <a:ext uri="{FF2B5EF4-FFF2-40B4-BE49-F238E27FC236}">
-                  <a16:creationId xmlns:a16="http://schemas.microsoft.com/office/drawing/2014/main" id="{563ABF16-B5E2-4231-A0F2-37CCF9F052D9}"/>
+                  <a16:creationId xmlns="" xmlns:a16="http://schemas.microsoft.com/office/drawing/2014/main" id="{563ABF16-B5E2-4231-A0F2-37CCF9F052D9}"/>
                 </a:ext>
               </a:extLst>
             </p:cNvPr>
@@ -4919,7 +4919,7 @@
               <p:cNvPr id="21" name="CaixaDeTexto 20">
                 <a:extLst>
                   <a:ext uri="{FF2B5EF4-FFF2-40B4-BE49-F238E27FC236}">
-                    <a16:creationId xmlns:a16="http://schemas.microsoft.com/office/drawing/2014/main" id="{65293A4E-D1A4-4BFC-B18A-9C448A820B5D}"/>
+                    <a16:creationId xmlns="" xmlns:a16="http://schemas.microsoft.com/office/drawing/2014/main" id="{65293A4E-D1A4-4BFC-B18A-9C448A820B5D}"/>
                   </a:ext>
                 </a:extLst>
               </p:cNvPr>
@@ -4989,7 +4989,7 @@
               <p:cNvPr id="22" name="Retângulo 21">
                 <a:extLst>
                   <a:ext uri="{FF2B5EF4-FFF2-40B4-BE49-F238E27FC236}">
-                    <a16:creationId xmlns:a16="http://schemas.microsoft.com/office/drawing/2014/main" id="{03B94166-CC62-4486-B433-F9A38735B863}"/>
+                    <a16:creationId xmlns="" xmlns:a16="http://schemas.microsoft.com/office/drawing/2014/main" id="{03B94166-CC62-4486-B433-F9A38735B863}"/>
                   </a:ext>
                 </a:extLst>
               </p:cNvPr>
@@ -5042,7 +5042,7 @@
             <p:cNvPr id="24" name="Conector de Seta Reta 23">
               <a:extLst>
                 <a:ext uri="{FF2B5EF4-FFF2-40B4-BE49-F238E27FC236}">
-                  <a16:creationId xmlns:a16="http://schemas.microsoft.com/office/drawing/2014/main" id="{C7F7721A-A33C-4610-8D10-0D8225B21C1F}"/>
+                  <a16:creationId xmlns="" xmlns:a16="http://schemas.microsoft.com/office/drawing/2014/main" id="{C7F7721A-A33C-4610-8D10-0D8225B21C1F}"/>
                 </a:ext>
               </a:extLst>
             </p:cNvPr>
@@ -5086,7 +5086,7 @@
           <p:cNvPr id="25" name="Conector de Seta Reta 24">
             <a:extLst>
               <a:ext uri="{FF2B5EF4-FFF2-40B4-BE49-F238E27FC236}">
-                <a16:creationId xmlns:a16="http://schemas.microsoft.com/office/drawing/2014/main" id="{1A2793BB-33AA-4F95-8502-5B9663DA9DAF}"/>
+                <a16:creationId xmlns="" xmlns:a16="http://schemas.microsoft.com/office/drawing/2014/main" id="{1A2793BB-33AA-4F95-8502-5B9663DA9DAF}"/>
               </a:ext>
             </a:extLst>
           </p:cNvPr>
@@ -5160,7 +5160,7 @@
           <p:cNvPr id="4" name="Retângulo 3">
             <a:extLst>
               <a:ext uri="{FF2B5EF4-FFF2-40B4-BE49-F238E27FC236}">
-                <a16:creationId xmlns:a16="http://schemas.microsoft.com/office/drawing/2014/main" id="{3DF07C34-0710-49B7-89C7-9BEA9D436CC1}"/>
+                <a16:creationId xmlns="" xmlns:a16="http://schemas.microsoft.com/office/drawing/2014/main" id="{3DF07C34-0710-49B7-89C7-9BEA9D436CC1}"/>
               </a:ext>
             </a:extLst>
           </p:cNvPr>
@@ -5210,7 +5210,7 @@
           <p:cNvPr id="5" name="Retângulo 4">
             <a:extLst>
               <a:ext uri="{FF2B5EF4-FFF2-40B4-BE49-F238E27FC236}">
-                <a16:creationId xmlns:a16="http://schemas.microsoft.com/office/drawing/2014/main" id="{D6DC5FA4-21B9-44B2-B1CC-A3F70AA423A1}"/>
+                <a16:creationId xmlns="" xmlns:a16="http://schemas.microsoft.com/office/drawing/2014/main" id="{D6DC5FA4-21B9-44B2-B1CC-A3F70AA423A1}"/>
               </a:ext>
             </a:extLst>
           </p:cNvPr>
@@ -5265,7 +5265,7 @@
           <p:cNvPr id="6" name="Retângulo 5">
             <a:extLst>
               <a:ext uri="{FF2B5EF4-FFF2-40B4-BE49-F238E27FC236}">
-                <a16:creationId xmlns:a16="http://schemas.microsoft.com/office/drawing/2014/main" id="{0D121E13-86CB-44FA-86E7-521BF94F33AB}"/>
+                <a16:creationId xmlns="" xmlns:a16="http://schemas.microsoft.com/office/drawing/2014/main" id="{0D121E13-86CB-44FA-86E7-521BF94F33AB}"/>
               </a:ext>
             </a:extLst>
           </p:cNvPr>
@@ -5320,7 +5320,7 @@
           <p:cNvPr id="7" name="Retângulo 6">
             <a:extLst>
               <a:ext uri="{FF2B5EF4-FFF2-40B4-BE49-F238E27FC236}">
-                <a16:creationId xmlns:a16="http://schemas.microsoft.com/office/drawing/2014/main" id="{DB6AA2D3-CC34-47AC-B9BF-DC4905190EE6}"/>
+                <a16:creationId xmlns="" xmlns:a16="http://schemas.microsoft.com/office/drawing/2014/main" id="{DB6AA2D3-CC34-47AC-B9BF-DC4905190EE6}"/>
               </a:ext>
             </a:extLst>
           </p:cNvPr>
@@ -5375,7 +5375,7 @@
           <p:cNvPr id="8" name="Retângulo 7">
             <a:extLst>
               <a:ext uri="{FF2B5EF4-FFF2-40B4-BE49-F238E27FC236}">
-                <a16:creationId xmlns:a16="http://schemas.microsoft.com/office/drawing/2014/main" id="{AC1E93BF-8332-4DE3-970E-1DE4D2C705D3}"/>
+                <a16:creationId xmlns="" xmlns:a16="http://schemas.microsoft.com/office/drawing/2014/main" id="{AC1E93BF-8332-4DE3-970E-1DE4D2C705D3}"/>
               </a:ext>
             </a:extLst>
           </p:cNvPr>
@@ -5430,7 +5430,7 @@
           <p:cNvPr id="9" name="Elipse 8">
             <a:extLst>
               <a:ext uri="{FF2B5EF4-FFF2-40B4-BE49-F238E27FC236}">
-                <a16:creationId xmlns:a16="http://schemas.microsoft.com/office/drawing/2014/main" id="{1138C9A4-44A3-4671-9771-6F24ED7525F2}"/>
+                <a16:creationId xmlns="" xmlns:a16="http://schemas.microsoft.com/office/drawing/2014/main" id="{1138C9A4-44A3-4671-9771-6F24ED7525F2}"/>
               </a:ext>
             </a:extLst>
           </p:cNvPr>
@@ -5492,7 +5492,7 @@
           <p:cNvPr id="10" name="Conector de Seta Reta 9">
             <a:extLst>
               <a:ext uri="{FF2B5EF4-FFF2-40B4-BE49-F238E27FC236}">
-                <a16:creationId xmlns:a16="http://schemas.microsoft.com/office/drawing/2014/main" id="{EC094C44-981B-4956-9D56-D03C64510FCA}"/>
+                <a16:creationId xmlns="" xmlns:a16="http://schemas.microsoft.com/office/drawing/2014/main" id="{EC094C44-981B-4956-9D56-D03C64510FCA}"/>
               </a:ext>
             </a:extLst>
           </p:cNvPr>
@@ -5534,7 +5534,7 @@
           <p:cNvPr id="11" name="Conector de Seta Reta 10">
             <a:extLst>
               <a:ext uri="{FF2B5EF4-FFF2-40B4-BE49-F238E27FC236}">
-                <a16:creationId xmlns:a16="http://schemas.microsoft.com/office/drawing/2014/main" id="{B2C87742-0A7D-46C0-9441-9EED33272C27}"/>
+                <a16:creationId xmlns="" xmlns:a16="http://schemas.microsoft.com/office/drawing/2014/main" id="{B2C87742-0A7D-46C0-9441-9EED33272C27}"/>
               </a:ext>
             </a:extLst>
           </p:cNvPr>
@@ -5578,7 +5578,7 @@
           <p:cNvPr id="12" name="Conector de Seta Reta 11">
             <a:extLst>
               <a:ext uri="{FF2B5EF4-FFF2-40B4-BE49-F238E27FC236}">
-                <a16:creationId xmlns:a16="http://schemas.microsoft.com/office/drawing/2014/main" id="{F9B2E167-1300-4F32-A2BE-F5BECF8346C7}"/>
+                <a16:creationId xmlns="" xmlns:a16="http://schemas.microsoft.com/office/drawing/2014/main" id="{F9B2E167-1300-4F32-A2BE-F5BECF8346C7}"/>
               </a:ext>
             </a:extLst>
           </p:cNvPr>
@@ -5620,7 +5620,7 @@
           <p:cNvPr id="13" name="Elipse 12">
             <a:extLst>
               <a:ext uri="{FF2B5EF4-FFF2-40B4-BE49-F238E27FC236}">
-                <a16:creationId xmlns:a16="http://schemas.microsoft.com/office/drawing/2014/main" id="{C214B13E-7A0D-4B25-B250-84110A3D3FE6}"/>
+                <a16:creationId xmlns="" xmlns:a16="http://schemas.microsoft.com/office/drawing/2014/main" id="{C214B13E-7A0D-4B25-B250-84110A3D3FE6}"/>
               </a:ext>
             </a:extLst>
           </p:cNvPr>
@@ -5689,7 +5689,7 @@
           <p:cNvPr id="15" name="Conector de Seta Reta 14">
             <a:extLst>
               <a:ext uri="{FF2B5EF4-FFF2-40B4-BE49-F238E27FC236}">
-                <a16:creationId xmlns:a16="http://schemas.microsoft.com/office/drawing/2014/main" id="{553504CF-FC69-4035-BF67-2F37A415AD75}"/>
+                <a16:creationId xmlns="" xmlns:a16="http://schemas.microsoft.com/office/drawing/2014/main" id="{553504CF-FC69-4035-BF67-2F37A415AD75}"/>
               </a:ext>
             </a:extLst>
           </p:cNvPr>
@@ -5733,7 +5733,7 @@
           <p:cNvPr id="16" name="Conector de Seta Reta 15">
             <a:extLst>
               <a:ext uri="{FF2B5EF4-FFF2-40B4-BE49-F238E27FC236}">
-                <a16:creationId xmlns:a16="http://schemas.microsoft.com/office/drawing/2014/main" id="{DF3AD3C6-D9B2-4E6F-B47F-15F839968BC7}"/>
+                <a16:creationId xmlns="" xmlns:a16="http://schemas.microsoft.com/office/drawing/2014/main" id="{DF3AD3C6-D9B2-4E6F-B47F-15F839968BC7}"/>
               </a:ext>
             </a:extLst>
           </p:cNvPr>
@@ -5777,7 +5777,7 @@
           <p:cNvPr id="17" name="CaixaDeTexto 16">
             <a:extLst>
               <a:ext uri="{FF2B5EF4-FFF2-40B4-BE49-F238E27FC236}">
-                <a16:creationId xmlns:a16="http://schemas.microsoft.com/office/drawing/2014/main" id="{7B775DFD-739F-4C74-B743-6D77D03D3AAD}"/>
+                <a16:creationId xmlns="" xmlns:a16="http://schemas.microsoft.com/office/drawing/2014/main" id="{7B775DFD-739F-4C74-B743-6D77D03D3AAD}"/>
               </a:ext>
             </a:extLst>
           </p:cNvPr>
@@ -5817,7 +5817,7 @@
           <p:cNvPr id="26" name="CaixaDeTexto 25">
             <a:extLst>
               <a:ext uri="{FF2B5EF4-FFF2-40B4-BE49-F238E27FC236}">
-                <a16:creationId xmlns:a16="http://schemas.microsoft.com/office/drawing/2014/main" id="{7F528F94-AC97-45A9-A10D-FCDB2BAEC070}"/>
+                <a16:creationId xmlns="" xmlns:a16="http://schemas.microsoft.com/office/drawing/2014/main" id="{7F528F94-AC97-45A9-A10D-FCDB2BAEC070}"/>
               </a:ext>
             </a:extLst>
           </p:cNvPr>
@@ -5864,7 +5864,7 @@
           <p:cNvPr id="27" name="Conector de Seta Reta 26">
             <a:extLst>
               <a:ext uri="{FF2B5EF4-FFF2-40B4-BE49-F238E27FC236}">
-                <a16:creationId xmlns:a16="http://schemas.microsoft.com/office/drawing/2014/main" id="{DAA64FDF-FEA3-46A1-922B-FD08FD52450B}"/>
+                <a16:creationId xmlns="" xmlns:a16="http://schemas.microsoft.com/office/drawing/2014/main" id="{DAA64FDF-FEA3-46A1-922B-FD08FD52450B}"/>
               </a:ext>
             </a:extLst>
           </p:cNvPr>
@@ -5908,7 +5908,7 @@
           <p:cNvPr id="28" name="Conector de Seta Reta 27">
             <a:extLst>
               <a:ext uri="{FF2B5EF4-FFF2-40B4-BE49-F238E27FC236}">
-                <a16:creationId xmlns:a16="http://schemas.microsoft.com/office/drawing/2014/main" id="{DD897E32-E7EA-4446-B244-87F3406F8D16}"/>
+                <a16:creationId xmlns="" xmlns:a16="http://schemas.microsoft.com/office/drawing/2014/main" id="{DD897E32-E7EA-4446-B244-87F3406F8D16}"/>
               </a:ext>
             </a:extLst>
           </p:cNvPr>
@@ -5952,7 +5952,7 @@
           <p:cNvPr id="29" name="CaixaDeTexto 28">
             <a:extLst>
               <a:ext uri="{FF2B5EF4-FFF2-40B4-BE49-F238E27FC236}">
-                <a16:creationId xmlns:a16="http://schemas.microsoft.com/office/drawing/2014/main" id="{63682302-1E8A-4CE6-8062-47E7A163B34D}"/>
+                <a16:creationId xmlns="" xmlns:a16="http://schemas.microsoft.com/office/drawing/2014/main" id="{63682302-1E8A-4CE6-8062-47E7A163B34D}"/>
               </a:ext>
             </a:extLst>
           </p:cNvPr>
@@ -5991,7 +5991,7 @@
           <p:cNvPr id="37" name="Conector de Seta Reta 36">
             <a:extLst>
               <a:ext uri="{FF2B5EF4-FFF2-40B4-BE49-F238E27FC236}">
-                <a16:creationId xmlns:a16="http://schemas.microsoft.com/office/drawing/2014/main" id="{FD4EFA0F-4745-47DB-AE54-21F4930D466D}"/>
+                <a16:creationId xmlns="" xmlns:a16="http://schemas.microsoft.com/office/drawing/2014/main" id="{FD4EFA0F-4745-47DB-AE54-21F4930D466D}"/>
               </a:ext>
             </a:extLst>
           </p:cNvPr>
@@ -6035,7 +6035,7 @@
           <p:cNvPr id="38" name="Conector de Seta Reta 37">
             <a:extLst>
               <a:ext uri="{FF2B5EF4-FFF2-40B4-BE49-F238E27FC236}">
-                <a16:creationId xmlns:a16="http://schemas.microsoft.com/office/drawing/2014/main" id="{369B8BD3-7A7F-47B4-B170-F65F09A3CFAC}"/>
+                <a16:creationId xmlns="" xmlns:a16="http://schemas.microsoft.com/office/drawing/2014/main" id="{369B8BD3-7A7F-47B4-B170-F65F09A3CFAC}"/>
               </a:ext>
             </a:extLst>
           </p:cNvPr>
@@ -6078,7 +6078,7 @@
           <p:cNvPr id="39" name="CaixaDeTexto 38">
             <a:extLst>
               <a:ext uri="{FF2B5EF4-FFF2-40B4-BE49-F238E27FC236}">
-                <a16:creationId xmlns:a16="http://schemas.microsoft.com/office/drawing/2014/main" id="{92D73595-A4DD-48E0-8C10-C2471D4A4490}"/>
+                <a16:creationId xmlns="" xmlns:a16="http://schemas.microsoft.com/office/drawing/2014/main" id="{92D73595-A4DD-48E0-8C10-C2471D4A4490}"/>
               </a:ext>
             </a:extLst>
           </p:cNvPr>
@@ -6118,7 +6118,7 @@
           <p:cNvPr id="40" name="CaixaDeTexto 39">
             <a:extLst>
               <a:ext uri="{FF2B5EF4-FFF2-40B4-BE49-F238E27FC236}">
-                <a16:creationId xmlns:a16="http://schemas.microsoft.com/office/drawing/2014/main" id="{0F47815D-E774-4254-8546-D87BF504D5DE}"/>
+                <a16:creationId xmlns="" xmlns:a16="http://schemas.microsoft.com/office/drawing/2014/main" id="{0F47815D-E774-4254-8546-D87BF504D5DE}"/>
               </a:ext>
             </a:extLst>
           </p:cNvPr>
@@ -6157,7 +6157,7 @@
           <p:cNvPr id="30" name="Conector de Seta Reta 29">
             <a:extLst>
               <a:ext uri="{FF2B5EF4-FFF2-40B4-BE49-F238E27FC236}">
-                <a16:creationId xmlns:a16="http://schemas.microsoft.com/office/drawing/2014/main" id="{740826B5-115A-4CB2-8951-315DE92DE944}"/>
+                <a16:creationId xmlns="" xmlns:a16="http://schemas.microsoft.com/office/drawing/2014/main" id="{740826B5-115A-4CB2-8951-315DE92DE944}"/>
               </a:ext>
             </a:extLst>
           </p:cNvPr>
@@ -6200,7 +6200,7 @@
           <p:cNvPr id="19" name="Seta: para Baixo 18">
             <a:extLst>
               <a:ext uri="{FF2B5EF4-FFF2-40B4-BE49-F238E27FC236}">
-                <a16:creationId xmlns:a16="http://schemas.microsoft.com/office/drawing/2014/main" id="{B1CC3F0C-A62D-4E35-B244-A6E9315638E4}"/>
+                <a16:creationId xmlns="" xmlns:a16="http://schemas.microsoft.com/office/drawing/2014/main" id="{B1CC3F0C-A62D-4E35-B244-A6E9315638E4}"/>
               </a:ext>
             </a:extLst>
           </p:cNvPr>
@@ -6256,7 +6256,7 @@
           <p:cNvPr id="20" name="CaixaDeTexto 19">
             <a:extLst>
               <a:ext uri="{FF2B5EF4-FFF2-40B4-BE49-F238E27FC236}">
-                <a16:creationId xmlns:a16="http://schemas.microsoft.com/office/drawing/2014/main" id="{E427B953-A302-4A3B-A192-CB65E32F96B6}"/>
+                <a16:creationId xmlns="" xmlns:a16="http://schemas.microsoft.com/office/drawing/2014/main" id="{E427B953-A302-4A3B-A192-CB65E32F96B6}"/>
               </a:ext>
             </a:extLst>
           </p:cNvPr>
@@ -6299,7 +6299,7 @@
           <p:cNvPr id="32" name="Conector de Seta Reta 14">
             <a:extLst>
               <a:ext uri="{FF2B5EF4-FFF2-40B4-BE49-F238E27FC236}">
-                <a16:creationId xmlns:a16="http://schemas.microsoft.com/office/drawing/2014/main" id="{553504CF-FC69-4035-BF67-2F37A415AD75}"/>
+                <a16:creationId xmlns="" xmlns:a16="http://schemas.microsoft.com/office/drawing/2014/main" id="{553504CF-FC69-4035-BF67-2F37A415AD75}"/>
               </a:ext>
             </a:extLst>
           </p:cNvPr>
@@ -6344,7 +6344,7 @@
           <p:cNvPr id="33" name="Retângulo 32">
             <a:extLst>
               <a:ext uri="{FF2B5EF4-FFF2-40B4-BE49-F238E27FC236}">
-                <a16:creationId xmlns:a16="http://schemas.microsoft.com/office/drawing/2014/main" id="{AC1E93BF-8332-4DE3-970E-1DE4D2C705D3}"/>
+                <a16:creationId xmlns="" xmlns:a16="http://schemas.microsoft.com/office/drawing/2014/main" id="{AC1E93BF-8332-4DE3-970E-1DE4D2C705D3}"/>
               </a:ext>
             </a:extLst>
           </p:cNvPr>
@@ -6399,7 +6399,7 @@
           <p:cNvPr id="34" name="Retângulo 33">
             <a:extLst>
               <a:ext uri="{FF2B5EF4-FFF2-40B4-BE49-F238E27FC236}">
-                <a16:creationId xmlns:a16="http://schemas.microsoft.com/office/drawing/2014/main" id="{AC1E93BF-8332-4DE3-970E-1DE4D2C705D3}"/>
+                <a16:creationId xmlns="" xmlns:a16="http://schemas.microsoft.com/office/drawing/2014/main" id="{AC1E93BF-8332-4DE3-970E-1DE4D2C705D3}"/>
               </a:ext>
             </a:extLst>
           </p:cNvPr>
@@ -6454,7 +6454,7 @@
           <p:cNvPr id="35" name="Conector de Seta Reta 15">
             <a:extLst>
               <a:ext uri="{FF2B5EF4-FFF2-40B4-BE49-F238E27FC236}">
-                <a16:creationId xmlns:a16="http://schemas.microsoft.com/office/drawing/2014/main" id="{DF3AD3C6-D9B2-4E6F-B47F-15F839968BC7}"/>
+                <a16:creationId xmlns="" xmlns:a16="http://schemas.microsoft.com/office/drawing/2014/main" id="{DF3AD3C6-D9B2-4E6F-B47F-15F839968BC7}"/>
               </a:ext>
             </a:extLst>
           </p:cNvPr>
@@ -6498,7 +6498,7 @@
           <p:cNvPr id="36" name="Conector de Seta Reta 15">
             <a:extLst>
               <a:ext uri="{FF2B5EF4-FFF2-40B4-BE49-F238E27FC236}">
-                <a16:creationId xmlns:a16="http://schemas.microsoft.com/office/drawing/2014/main" id="{DF3AD3C6-D9B2-4E6F-B47F-15F839968BC7}"/>
+                <a16:creationId xmlns="" xmlns:a16="http://schemas.microsoft.com/office/drawing/2014/main" id="{DF3AD3C6-D9B2-4E6F-B47F-15F839968BC7}"/>
               </a:ext>
             </a:extLst>
           </p:cNvPr>
@@ -6572,7 +6572,7 @@
           <p:cNvPr id="4" name="CaixaDeTexto 3">
             <a:extLst>
               <a:ext uri="{FF2B5EF4-FFF2-40B4-BE49-F238E27FC236}">
-                <a16:creationId xmlns:a16="http://schemas.microsoft.com/office/drawing/2014/main" id="{8600E65D-8F90-45D6-8585-514491944BD1}"/>
+                <a16:creationId xmlns="" xmlns:a16="http://schemas.microsoft.com/office/drawing/2014/main" id="{8600E65D-8F90-45D6-8585-514491944BD1}"/>
               </a:ext>
             </a:extLst>
           </p:cNvPr>
@@ -6727,7 +6727,7 @@
           <p:cNvPr id="2" name="CaixaDeTexto 1">
             <a:extLst>
               <a:ext uri="{FF2B5EF4-FFF2-40B4-BE49-F238E27FC236}">
-                <a16:creationId xmlns:a16="http://schemas.microsoft.com/office/drawing/2014/main" id="{8D09AB71-F1EE-480A-906E-5299059EAC52}"/>
+                <a16:creationId xmlns="" xmlns:a16="http://schemas.microsoft.com/office/drawing/2014/main" id="{8D09AB71-F1EE-480A-906E-5299059EAC52}"/>
               </a:ext>
             </a:extLst>
           </p:cNvPr>
@@ -6797,7 +6797,7 @@
           <p:cNvPr id="4" name="CaixaDeTexto 3">
             <a:extLst>
               <a:ext uri="{FF2B5EF4-FFF2-40B4-BE49-F238E27FC236}">
-                <a16:creationId xmlns:a16="http://schemas.microsoft.com/office/drawing/2014/main" id="{8600E65D-8F90-45D6-8585-514491944BD1}"/>
+                <a16:creationId xmlns="" xmlns:a16="http://schemas.microsoft.com/office/drawing/2014/main" id="{8600E65D-8F90-45D6-8585-514491944BD1}"/>
               </a:ext>
             </a:extLst>
           </p:cNvPr>
@@ -7023,7 +7023,7 @@
           <p:cNvPr id="2" name="CaixaDeTexto 1">
             <a:extLst>
               <a:ext uri="{FF2B5EF4-FFF2-40B4-BE49-F238E27FC236}">
-                <a16:creationId xmlns:a16="http://schemas.microsoft.com/office/drawing/2014/main" id="{8D09AB71-F1EE-480A-906E-5299059EAC52}"/>
+                <a16:creationId xmlns="" xmlns:a16="http://schemas.microsoft.com/office/drawing/2014/main" id="{8D09AB71-F1EE-480A-906E-5299059EAC52}"/>
               </a:ext>
             </a:extLst>
           </p:cNvPr>
@@ -7092,7 +7092,7 @@
           <p:cNvPr id="2" name="Retângulo 1">
             <a:extLst>
               <a:ext uri="{FF2B5EF4-FFF2-40B4-BE49-F238E27FC236}">
-                <a16:creationId xmlns:a16="http://schemas.microsoft.com/office/drawing/2014/main" id="{7331AC1A-FE15-4F93-B8E3-A5DCA4A352F4}"/>
+                <a16:creationId xmlns="" xmlns:a16="http://schemas.microsoft.com/office/drawing/2014/main" id="{7331AC1A-FE15-4F93-B8E3-A5DCA4A352F4}"/>
               </a:ext>
             </a:extLst>
           </p:cNvPr>
@@ -7141,7 +7141,7 @@
           <p:cNvPr id="3" name="Retângulo 2">
             <a:extLst>
               <a:ext uri="{FF2B5EF4-FFF2-40B4-BE49-F238E27FC236}">
-                <a16:creationId xmlns:a16="http://schemas.microsoft.com/office/drawing/2014/main" id="{E2496FF1-F228-4C7F-B34E-FFFC040EE450}"/>
+                <a16:creationId xmlns="" xmlns:a16="http://schemas.microsoft.com/office/drawing/2014/main" id="{E2496FF1-F228-4C7F-B34E-FFFC040EE450}"/>
               </a:ext>
             </a:extLst>
           </p:cNvPr>
@@ -7195,7 +7195,7 @@
           <p:cNvPr id="5" name="Elipse 4">
             <a:extLst>
               <a:ext uri="{FF2B5EF4-FFF2-40B4-BE49-F238E27FC236}">
-                <a16:creationId xmlns:a16="http://schemas.microsoft.com/office/drawing/2014/main" id="{B2246A32-ED4E-4273-BC70-E632AAF5DC6D}"/>
+                <a16:creationId xmlns="" xmlns:a16="http://schemas.microsoft.com/office/drawing/2014/main" id="{B2246A32-ED4E-4273-BC70-E632AAF5DC6D}"/>
               </a:ext>
             </a:extLst>
           </p:cNvPr>
@@ -7256,7 +7256,7 @@
           <p:cNvPr id="6" name="Conector de Seta Reta 5">
             <a:extLst>
               <a:ext uri="{FF2B5EF4-FFF2-40B4-BE49-F238E27FC236}">
-                <a16:creationId xmlns:a16="http://schemas.microsoft.com/office/drawing/2014/main" id="{D9C4A25A-3221-45E2-91C5-E33C5B654E7F}"/>
+                <a16:creationId xmlns="" xmlns:a16="http://schemas.microsoft.com/office/drawing/2014/main" id="{D9C4A25A-3221-45E2-91C5-E33C5B654E7F}"/>
               </a:ext>
             </a:extLst>
           </p:cNvPr>
@@ -7298,7 +7298,7 @@
           <p:cNvPr id="7" name="CaixaDeTexto 6">
             <a:extLst>
               <a:ext uri="{FF2B5EF4-FFF2-40B4-BE49-F238E27FC236}">
-                <a16:creationId xmlns:a16="http://schemas.microsoft.com/office/drawing/2014/main" id="{1AAB4C44-D2FD-499E-B4D6-E3447161AD4E}"/>
+                <a16:creationId xmlns="" xmlns:a16="http://schemas.microsoft.com/office/drawing/2014/main" id="{1AAB4C44-D2FD-499E-B4D6-E3447161AD4E}"/>
               </a:ext>
             </a:extLst>
           </p:cNvPr>
@@ -7338,7 +7338,7 @@
           <p:cNvPr id="8" name="Conector de Seta Reta 7">
             <a:extLst>
               <a:ext uri="{FF2B5EF4-FFF2-40B4-BE49-F238E27FC236}">
-                <a16:creationId xmlns:a16="http://schemas.microsoft.com/office/drawing/2014/main" id="{DEE04075-57F5-4D3D-9002-F8A3AC688138}"/>
+                <a16:creationId xmlns="" xmlns:a16="http://schemas.microsoft.com/office/drawing/2014/main" id="{DEE04075-57F5-4D3D-9002-F8A3AC688138}"/>
               </a:ext>
             </a:extLst>
           </p:cNvPr>
@@ -7383,7 +7383,7 @@
           <p:cNvPr id="13" name="CaixaDeTexto 12">
             <a:extLst>
               <a:ext uri="{FF2B5EF4-FFF2-40B4-BE49-F238E27FC236}">
-                <a16:creationId xmlns:a16="http://schemas.microsoft.com/office/drawing/2014/main" id="{C379C9A8-7801-4AA8-9E54-99CD13EAB041}"/>
+                <a16:creationId xmlns="" xmlns:a16="http://schemas.microsoft.com/office/drawing/2014/main" id="{C379C9A8-7801-4AA8-9E54-99CD13EAB041}"/>
               </a:ext>
             </a:extLst>
           </p:cNvPr>
@@ -7423,7 +7423,7 @@
           <p:cNvPr id="14" name="CaixaDeTexto 13">
             <a:extLst>
               <a:ext uri="{FF2B5EF4-FFF2-40B4-BE49-F238E27FC236}">
-                <a16:creationId xmlns:a16="http://schemas.microsoft.com/office/drawing/2014/main" id="{C031E0D9-E485-4C1F-A13F-984475A3FCAD}"/>
+                <a16:creationId xmlns="" xmlns:a16="http://schemas.microsoft.com/office/drawing/2014/main" id="{C031E0D9-E485-4C1F-A13F-984475A3FCAD}"/>
               </a:ext>
             </a:extLst>
           </p:cNvPr>
@@ -7466,7 +7466,7 @@
           <p:cNvPr id="9" name="CaixaDeTexto 8">
             <a:extLst>
               <a:ext uri="{FF2B5EF4-FFF2-40B4-BE49-F238E27FC236}">
-                <a16:creationId xmlns:a16="http://schemas.microsoft.com/office/drawing/2014/main" id="{8CE48A7E-D60A-41AB-83D6-F65ED698CA4B}"/>
+                <a16:creationId xmlns="" xmlns:a16="http://schemas.microsoft.com/office/drawing/2014/main" id="{8CE48A7E-D60A-41AB-83D6-F65ED698CA4B}"/>
               </a:ext>
             </a:extLst>
           </p:cNvPr>
@@ -7643,7 +7643,7 @@
           <p:cNvPr id="17" name="Seta: para a Direita 16">
             <a:extLst>
               <a:ext uri="{FF2B5EF4-FFF2-40B4-BE49-F238E27FC236}">
-                <a16:creationId xmlns:a16="http://schemas.microsoft.com/office/drawing/2014/main" id="{7D53D3A5-3F41-435B-B884-8D70CD070095}"/>
+                <a16:creationId xmlns="" xmlns:a16="http://schemas.microsoft.com/office/drawing/2014/main" id="{7D53D3A5-3F41-435B-B884-8D70CD070095}"/>
               </a:ext>
             </a:extLst>
           </p:cNvPr>
@@ -7699,7 +7699,7 @@
           <p:cNvPr id="18" name="CaixaDeTexto 17">
             <a:extLst>
               <a:ext uri="{FF2B5EF4-FFF2-40B4-BE49-F238E27FC236}">
-                <a16:creationId xmlns:a16="http://schemas.microsoft.com/office/drawing/2014/main" id="{6FAB2EB8-F9FD-44E8-89E4-11640C633C28}"/>
+                <a16:creationId xmlns="" xmlns:a16="http://schemas.microsoft.com/office/drawing/2014/main" id="{6FAB2EB8-F9FD-44E8-89E4-11640C633C28}"/>
               </a:ext>
             </a:extLst>
           </p:cNvPr>
@@ -7805,7 +7805,7 @@
           <p:cNvPr id="2" name="Retângulo 1">
             <a:extLst>
               <a:ext uri="{FF2B5EF4-FFF2-40B4-BE49-F238E27FC236}">
-                <a16:creationId xmlns:a16="http://schemas.microsoft.com/office/drawing/2014/main" id="{C4817A17-78F0-4224-BC4E-5C25B029C385}"/>
+                <a16:creationId xmlns="" xmlns:a16="http://schemas.microsoft.com/office/drawing/2014/main" id="{C4817A17-78F0-4224-BC4E-5C25B029C385}"/>
               </a:ext>
             </a:extLst>
           </p:cNvPr>
@@ -7852,7 +7852,7 @@
           <p:cNvPr id="3" name="Conector de Seta Reta 2">
             <a:extLst>
               <a:ext uri="{FF2B5EF4-FFF2-40B4-BE49-F238E27FC236}">
-                <a16:creationId xmlns:a16="http://schemas.microsoft.com/office/drawing/2014/main" id="{75E155B9-77A8-47AF-8ADD-A3AF193ACCB1}"/>
+                <a16:creationId xmlns="" xmlns:a16="http://schemas.microsoft.com/office/drawing/2014/main" id="{75E155B9-77A8-47AF-8ADD-A3AF193ACCB1}"/>
               </a:ext>
             </a:extLst>
           </p:cNvPr>
@@ -7894,7 +7894,7 @@
           <p:cNvPr id="4" name="Elipse 3">
             <a:extLst>
               <a:ext uri="{FF2B5EF4-FFF2-40B4-BE49-F238E27FC236}">
-                <a16:creationId xmlns:a16="http://schemas.microsoft.com/office/drawing/2014/main" id="{402CE597-0776-41CF-94CA-CB54FBD9F9EA}"/>
+                <a16:creationId xmlns="" xmlns:a16="http://schemas.microsoft.com/office/drawing/2014/main" id="{402CE597-0776-41CF-94CA-CB54FBD9F9EA}"/>
               </a:ext>
             </a:extLst>
           </p:cNvPr>
@@ -7952,7 +7952,7 @@
           <p:cNvPr id="6" name="Retângulo 5">
             <a:extLst>
               <a:ext uri="{FF2B5EF4-FFF2-40B4-BE49-F238E27FC236}">
-                <a16:creationId xmlns:a16="http://schemas.microsoft.com/office/drawing/2014/main" id="{3F69578D-2C08-4D4F-B462-141DD334ACA8}"/>
+                <a16:creationId xmlns="" xmlns:a16="http://schemas.microsoft.com/office/drawing/2014/main" id="{3F69578D-2C08-4D4F-B462-141DD334ACA8}"/>
               </a:ext>
             </a:extLst>
           </p:cNvPr>
@@ -8012,7 +8012,7 @@
           <p:cNvPr id="8" name="Conector de Seta Reta 7">
             <a:extLst>
               <a:ext uri="{FF2B5EF4-FFF2-40B4-BE49-F238E27FC236}">
-                <a16:creationId xmlns:a16="http://schemas.microsoft.com/office/drawing/2014/main" id="{9A465F67-1274-4BB7-8990-1887FA0A2D60}"/>
+                <a16:creationId xmlns="" xmlns:a16="http://schemas.microsoft.com/office/drawing/2014/main" id="{9A465F67-1274-4BB7-8990-1887FA0A2D60}"/>
               </a:ext>
             </a:extLst>
           </p:cNvPr>
@@ -8054,7 +8054,7 @@
           <p:cNvPr id="12" name="CaixaDeTexto 11">
             <a:extLst>
               <a:ext uri="{FF2B5EF4-FFF2-40B4-BE49-F238E27FC236}">
-                <a16:creationId xmlns:a16="http://schemas.microsoft.com/office/drawing/2014/main" id="{69F99116-13E8-4446-AE65-5CCE40C0102E}"/>
+                <a16:creationId xmlns="" xmlns:a16="http://schemas.microsoft.com/office/drawing/2014/main" id="{69F99116-13E8-4446-AE65-5CCE40C0102E}"/>
               </a:ext>
             </a:extLst>
           </p:cNvPr>
@@ -8094,7 +8094,7 @@
           <p:cNvPr id="13" name="Conector de Seta Reta 12">
             <a:extLst>
               <a:ext uri="{FF2B5EF4-FFF2-40B4-BE49-F238E27FC236}">
-                <a16:creationId xmlns:a16="http://schemas.microsoft.com/office/drawing/2014/main" id="{3560FD0F-6549-4141-838E-A08B004C9956}"/>
+                <a16:creationId xmlns="" xmlns:a16="http://schemas.microsoft.com/office/drawing/2014/main" id="{3560FD0F-6549-4141-838E-A08B004C9956}"/>
               </a:ext>
             </a:extLst>
           </p:cNvPr>
@@ -8138,7 +8138,7 @@
           <p:cNvPr id="7" name="CaixaDeTexto 6">
             <a:extLst>
               <a:ext uri="{FF2B5EF4-FFF2-40B4-BE49-F238E27FC236}">
-                <a16:creationId xmlns:a16="http://schemas.microsoft.com/office/drawing/2014/main" id="{7FB608DA-CD32-435E-9736-D9F0D6D40858}"/>
+                <a16:creationId xmlns="" xmlns:a16="http://schemas.microsoft.com/office/drawing/2014/main" id="{7FB608DA-CD32-435E-9736-D9F0D6D40858}"/>
               </a:ext>
             </a:extLst>
           </p:cNvPr>
@@ -8187,7 +8187,7 @@
           <p:cNvPr id="16" name="CaixaDeTexto 15">
             <a:extLst>
               <a:ext uri="{FF2B5EF4-FFF2-40B4-BE49-F238E27FC236}">
-                <a16:creationId xmlns:a16="http://schemas.microsoft.com/office/drawing/2014/main" id="{24D22BE1-D5FA-4CA9-A3DF-BDED81EC4D0A}"/>
+                <a16:creationId xmlns="" xmlns:a16="http://schemas.microsoft.com/office/drawing/2014/main" id="{24D22BE1-D5FA-4CA9-A3DF-BDED81EC4D0A}"/>
               </a:ext>
             </a:extLst>
           </p:cNvPr>
@@ -8227,7 +8227,7 @@
           <p:cNvPr id="18" name="Seta: para a Direita 17">
             <a:extLst>
               <a:ext uri="{FF2B5EF4-FFF2-40B4-BE49-F238E27FC236}">
-                <a16:creationId xmlns:a16="http://schemas.microsoft.com/office/drawing/2014/main" id="{A05163EF-D34F-4465-85BD-BEDB276CE0E9}"/>
+                <a16:creationId xmlns="" xmlns:a16="http://schemas.microsoft.com/office/drawing/2014/main" id="{A05163EF-D34F-4465-85BD-BEDB276CE0E9}"/>
               </a:ext>
             </a:extLst>
           </p:cNvPr>
@@ -8283,7 +8283,7 @@
           <p:cNvPr id="15" name="CaixaDeTexto 14">
             <a:extLst>
               <a:ext uri="{FF2B5EF4-FFF2-40B4-BE49-F238E27FC236}">
-                <a16:creationId xmlns:a16="http://schemas.microsoft.com/office/drawing/2014/main" id="{F36DF806-452D-4DBF-B886-5303EF46E7D6}"/>
+                <a16:creationId xmlns="" xmlns:a16="http://schemas.microsoft.com/office/drawing/2014/main" id="{F36DF806-452D-4DBF-B886-5303EF46E7D6}"/>
               </a:ext>
             </a:extLst>
           </p:cNvPr>
@@ -8332,7 +8332,7 @@
           <p:cNvPr id="17" name="Retângulo 16">
             <a:extLst>
               <a:ext uri="{FF2B5EF4-FFF2-40B4-BE49-F238E27FC236}">
-                <a16:creationId xmlns:a16="http://schemas.microsoft.com/office/drawing/2014/main" id="{3F69578D-2C08-4D4F-B462-141DD334ACA8}"/>
+                <a16:creationId xmlns="" xmlns:a16="http://schemas.microsoft.com/office/drawing/2014/main" id="{3F69578D-2C08-4D4F-B462-141DD334ACA8}"/>
               </a:ext>
             </a:extLst>
           </p:cNvPr>
@@ -8392,7 +8392,7 @@
           <p:cNvPr id="19" name="CaixaDeTexto 18">
             <a:extLst>
               <a:ext uri="{FF2B5EF4-FFF2-40B4-BE49-F238E27FC236}">
-                <a16:creationId xmlns:a16="http://schemas.microsoft.com/office/drawing/2014/main" id="{63682302-1E8A-4CE6-8062-47E7A163B34D}"/>
+                <a16:creationId xmlns="" xmlns:a16="http://schemas.microsoft.com/office/drawing/2014/main" id="{63682302-1E8A-4CE6-8062-47E7A163B34D}"/>
               </a:ext>
             </a:extLst>
           </p:cNvPr>
@@ -8432,7 +8432,7 @@
           <p:cNvPr id="21" name="Conector de Seta Reta 2">
             <a:extLst>
               <a:ext uri="{FF2B5EF4-FFF2-40B4-BE49-F238E27FC236}">
-                <a16:creationId xmlns:a16="http://schemas.microsoft.com/office/drawing/2014/main" id="{75E155B9-77A8-47AF-8ADD-A3AF193ACCB1}"/>
+                <a16:creationId xmlns="" xmlns:a16="http://schemas.microsoft.com/office/drawing/2014/main" id="{75E155B9-77A8-47AF-8ADD-A3AF193ACCB1}"/>
               </a:ext>
             </a:extLst>
           </p:cNvPr>
@@ -8509,7 +8509,7 @@
           <p:cNvPr id="40" name="Conector de Seta Reta 2">
             <a:extLst>
               <a:ext uri="{FF2B5EF4-FFF2-40B4-BE49-F238E27FC236}">
-                <a16:creationId xmlns:a16="http://schemas.microsoft.com/office/drawing/2014/main" id="{75E155B9-77A8-47AF-8ADD-A3AF193ACCB1}"/>
+                <a16:creationId xmlns="" xmlns:a16="http://schemas.microsoft.com/office/drawing/2014/main" id="{75E155B9-77A8-47AF-8ADD-A3AF193ACCB1}"/>
               </a:ext>
             </a:extLst>
           </p:cNvPr>
@@ -8551,7 +8551,7 @@
           <p:cNvPr id="48" name="Elipse 47">
             <a:extLst>
               <a:ext uri="{FF2B5EF4-FFF2-40B4-BE49-F238E27FC236}">
-                <a16:creationId xmlns:a16="http://schemas.microsoft.com/office/drawing/2014/main" id="{402CE597-0776-41CF-94CA-CB54FBD9F9EA}"/>
+                <a16:creationId xmlns="" xmlns:a16="http://schemas.microsoft.com/office/drawing/2014/main" id="{402CE597-0776-41CF-94CA-CB54FBD9F9EA}"/>
               </a:ext>
             </a:extLst>
           </p:cNvPr>
@@ -8600,7 +8600,7 @@
           <p:cNvPr id="20" name="Conector de Seta Reta 2">
             <a:extLst>
               <a:ext uri="{FF2B5EF4-FFF2-40B4-BE49-F238E27FC236}">
-                <a16:creationId xmlns:a16="http://schemas.microsoft.com/office/drawing/2014/main" id="{48986D6C-3C53-4387-B9D2-C2851013AEA0}"/>
+                <a16:creationId xmlns="" xmlns:a16="http://schemas.microsoft.com/office/drawing/2014/main" id="{48986D6C-3C53-4387-B9D2-C2851013AEA0}"/>
               </a:ext>
             </a:extLst>
           </p:cNvPr>
@@ -8644,7 +8644,7 @@
           <p:cNvPr id="22" name="Conector reto 21">
             <a:extLst>
               <a:ext uri="{FF2B5EF4-FFF2-40B4-BE49-F238E27FC236}">
-                <a16:creationId xmlns:a16="http://schemas.microsoft.com/office/drawing/2014/main" id="{91D3E80F-F036-409F-86A2-D07CBC2A3D48}"/>
+                <a16:creationId xmlns="" xmlns:a16="http://schemas.microsoft.com/office/drawing/2014/main" id="{91D3E80F-F036-409F-86A2-D07CBC2A3D48}"/>
               </a:ext>
             </a:extLst>
           </p:cNvPr>
@@ -8687,7 +8687,7 @@
           <p:cNvPr id="27" name="CaixaDeTexto 26">
             <a:extLst>
               <a:ext uri="{FF2B5EF4-FFF2-40B4-BE49-F238E27FC236}">
-                <a16:creationId xmlns:a16="http://schemas.microsoft.com/office/drawing/2014/main" id="{B8E9B063-3273-4D08-990D-E3367DC84563}"/>
+                <a16:creationId xmlns="" xmlns:a16="http://schemas.microsoft.com/office/drawing/2014/main" id="{B8E9B063-3273-4D08-990D-E3367DC84563}"/>
               </a:ext>
             </a:extLst>
           </p:cNvPr>
@@ -8757,7 +8757,7 @@
           <p:cNvPr id="2" name="CaixaDeTexto 1">
             <a:extLst>
               <a:ext uri="{FF2B5EF4-FFF2-40B4-BE49-F238E27FC236}">
-                <a16:creationId xmlns:a16="http://schemas.microsoft.com/office/drawing/2014/main" id="{0BF9F42C-338F-411B-BD35-FAB947BC5016}"/>
+                <a16:creationId xmlns="" xmlns:a16="http://schemas.microsoft.com/office/drawing/2014/main" id="{0BF9F42C-338F-411B-BD35-FAB947BC5016}"/>
               </a:ext>
             </a:extLst>
           </p:cNvPr>
@@ -8958,7 +8958,7 @@
           <p:cNvPr id="3" name="CaixaDeTexto 2">
             <a:extLst>
               <a:ext uri="{FF2B5EF4-FFF2-40B4-BE49-F238E27FC236}">
-                <a16:creationId xmlns:a16="http://schemas.microsoft.com/office/drawing/2014/main" id="{7FB608DA-CD32-435E-9736-D9F0D6D40858}"/>
+                <a16:creationId xmlns="" xmlns:a16="http://schemas.microsoft.com/office/drawing/2014/main" id="{7FB608DA-CD32-435E-9736-D9F0D6D40858}"/>
               </a:ext>
             </a:extLst>
           </p:cNvPr>
@@ -9028,7 +9028,7 @@
           <p:cNvPr id="2" name="Retângulo 1">
             <a:extLst>
               <a:ext uri="{FF2B5EF4-FFF2-40B4-BE49-F238E27FC236}">
-                <a16:creationId xmlns:a16="http://schemas.microsoft.com/office/drawing/2014/main" id="{F25D9931-2A34-4441-8234-04F8F330EDE3}"/>
+                <a16:creationId xmlns="" xmlns:a16="http://schemas.microsoft.com/office/drawing/2014/main" id="{F25D9931-2A34-4441-8234-04F8F330EDE3}"/>
               </a:ext>
             </a:extLst>
           </p:cNvPr>
@@ -9078,7 +9078,7 @@
           <p:cNvPr id="3" name="Conector de Seta Reta 2">
             <a:extLst>
               <a:ext uri="{FF2B5EF4-FFF2-40B4-BE49-F238E27FC236}">
-                <a16:creationId xmlns:a16="http://schemas.microsoft.com/office/drawing/2014/main" id="{DD2362A0-26E7-4752-BA70-DC5EA141C163}"/>
+                <a16:creationId xmlns="" xmlns:a16="http://schemas.microsoft.com/office/drawing/2014/main" id="{DD2362A0-26E7-4752-BA70-DC5EA141C163}"/>
               </a:ext>
             </a:extLst>
           </p:cNvPr>
@@ -9120,7 +9120,7 @@
           <p:cNvPr id="5" name="Retângulo 4">
             <a:extLst>
               <a:ext uri="{FF2B5EF4-FFF2-40B4-BE49-F238E27FC236}">
-                <a16:creationId xmlns:a16="http://schemas.microsoft.com/office/drawing/2014/main" id="{E430DB26-A7AA-4F73-B45A-E520DE02B9F1}"/>
+                <a16:creationId xmlns="" xmlns:a16="http://schemas.microsoft.com/office/drawing/2014/main" id="{E430DB26-A7AA-4F73-B45A-E520DE02B9F1}"/>
               </a:ext>
             </a:extLst>
           </p:cNvPr>
@@ -9175,7 +9175,7 @@
           <p:cNvPr id="6" name="Elipse 5">
             <a:extLst>
               <a:ext uri="{FF2B5EF4-FFF2-40B4-BE49-F238E27FC236}">
-                <a16:creationId xmlns:a16="http://schemas.microsoft.com/office/drawing/2014/main" id="{0B165049-39DC-4A49-8BEF-084544FB17BA}"/>
+                <a16:creationId xmlns="" xmlns:a16="http://schemas.microsoft.com/office/drawing/2014/main" id="{0B165049-39DC-4A49-8BEF-084544FB17BA}"/>
               </a:ext>
             </a:extLst>
           </p:cNvPr>
@@ -9236,7 +9236,7 @@
           <p:cNvPr id="7" name="Conector de Seta Reta 6">
             <a:extLst>
               <a:ext uri="{FF2B5EF4-FFF2-40B4-BE49-F238E27FC236}">
-                <a16:creationId xmlns:a16="http://schemas.microsoft.com/office/drawing/2014/main" id="{7454E7BB-9D41-4A12-8428-6BB24664233A}"/>
+                <a16:creationId xmlns="" xmlns:a16="http://schemas.microsoft.com/office/drawing/2014/main" id="{7454E7BB-9D41-4A12-8428-6BB24664233A}"/>
               </a:ext>
             </a:extLst>
           </p:cNvPr>
@@ -9280,7 +9280,7 @@
           <p:cNvPr id="20" name="CaixaDeTexto 19">
             <a:extLst>
               <a:ext uri="{FF2B5EF4-FFF2-40B4-BE49-F238E27FC236}">
-                <a16:creationId xmlns:a16="http://schemas.microsoft.com/office/drawing/2014/main" id="{EE063C56-0066-4077-AD6C-024ED0D03377}"/>
+                <a16:creationId xmlns="" xmlns:a16="http://schemas.microsoft.com/office/drawing/2014/main" id="{EE063C56-0066-4077-AD6C-024ED0D03377}"/>
               </a:ext>
             </a:extLst>
           </p:cNvPr>
@@ -9321,7 +9321,7 @@
           <p:cNvPr id="24" name="Conector de Seta Reta 23">
             <a:extLst>
               <a:ext uri="{FF2B5EF4-FFF2-40B4-BE49-F238E27FC236}">
-                <a16:creationId xmlns:a16="http://schemas.microsoft.com/office/drawing/2014/main" id="{1E32D56D-7EAE-46FD-9270-F2153D2674CA}"/>
+                <a16:creationId xmlns="" xmlns:a16="http://schemas.microsoft.com/office/drawing/2014/main" id="{1E32D56D-7EAE-46FD-9270-F2153D2674CA}"/>
               </a:ext>
             </a:extLst>
           </p:cNvPr>
@@ -9363,7 +9363,7 @@
           <p:cNvPr id="25" name="CaixaDeTexto 24">
             <a:extLst>
               <a:ext uri="{FF2B5EF4-FFF2-40B4-BE49-F238E27FC236}">
-                <a16:creationId xmlns:a16="http://schemas.microsoft.com/office/drawing/2014/main" id="{86E5058E-8A54-45B3-9D06-FA34AE2BEDD4}"/>
+                <a16:creationId xmlns="" xmlns:a16="http://schemas.microsoft.com/office/drawing/2014/main" id="{86E5058E-8A54-45B3-9D06-FA34AE2BEDD4}"/>
               </a:ext>
             </a:extLst>
           </p:cNvPr>
@@ -9404,7 +9404,7 @@
           <p:cNvPr id="4" name="Conector de Seta Reta 3">
             <a:extLst>
               <a:ext uri="{FF2B5EF4-FFF2-40B4-BE49-F238E27FC236}">
-                <a16:creationId xmlns:a16="http://schemas.microsoft.com/office/drawing/2014/main" id="{11350AC0-AD03-4C25-B857-0A0143B22D2F}"/>
+                <a16:creationId xmlns="" xmlns:a16="http://schemas.microsoft.com/office/drawing/2014/main" id="{11350AC0-AD03-4C25-B857-0A0143B22D2F}"/>
               </a:ext>
             </a:extLst>
           </p:cNvPr>
@@ -9445,7 +9445,7 @@
           <p:cNvPr id="14" name="Conector de Seta Reta 13">
             <a:extLst>
               <a:ext uri="{FF2B5EF4-FFF2-40B4-BE49-F238E27FC236}">
-                <a16:creationId xmlns:a16="http://schemas.microsoft.com/office/drawing/2014/main" id="{E18C630E-5EAE-44F6-9908-1E5F197BD4BA}"/>
+                <a16:creationId xmlns="" xmlns:a16="http://schemas.microsoft.com/office/drawing/2014/main" id="{E18C630E-5EAE-44F6-9908-1E5F197BD4BA}"/>
               </a:ext>
             </a:extLst>
           </p:cNvPr>
@@ -9488,7 +9488,7 @@
           <p:cNvPr id="12" name="CaixaDeTexto 11">
             <a:extLst>
               <a:ext uri="{FF2B5EF4-FFF2-40B4-BE49-F238E27FC236}">
-                <a16:creationId xmlns:a16="http://schemas.microsoft.com/office/drawing/2014/main" id="{CB77A5E5-B880-42F7-A62D-91FC9E1182D6}"/>
+                <a16:creationId xmlns="" xmlns:a16="http://schemas.microsoft.com/office/drawing/2014/main" id="{CB77A5E5-B880-42F7-A62D-91FC9E1182D6}"/>
               </a:ext>
             </a:extLst>
           </p:cNvPr>
@@ -9527,7 +9527,7 @@
           <p:cNvPr id="8" name="CaixaDeTexto 7">
             <a:extLst>
               <a:ext uri="{FF2B5EF4-FFF2-40B4-BE49-F238E27FC236}">
-                <a16:creationId xmlns:a16="http://schemas.microsoft.com/office/drawing/2014/main" id="{265B57C0-4419-4EC5-AF58-E6E7D1D114AA}"/>
+                <a16:creationId xmlns="" xmlns:a16="http://schemas.microsoft.com/office/drawing/2014/main" id="{265B57C0-4419-4EC5-AF58-E6E7D1D114AA}"/>
               </a:ext>
             </a:extLst>
           </p:cNvPr>
@@ -9719,7 +9719,7 @@
           <p:cNvPr id="11" name="Seta: para a Direita 10">
             <a:extLst>
               <a:ext uri="{FF2B5EF4-FFF2-40B4-BE49-F238E27FC236}">
-                <a16:creationId xmlns:a16="http://schemas.microsoft.com/office/drawing/2014/main" id="{258035D5-6877-4B2A-86C5-08559C46A05A}"/>
+                <a16:creationId xmlns="" xmlns:a16="http://schemas.microsoft.com/office/drawing/2014/main" id="{258035D5-6877-4B2A-86C5-08559C46A05A}"/>
               </a:ext>
             </a:extLst>
           </p:cNvPr>
@@ -9775,7 +9775,7 @@
           <p:cNvPr id="13" name="CaixaDeTexto 12">
             <a:extLst>
               <a:ext uri="{FF2B5EF4-FFF2-40B4-BE49-F238E27FC236}">
-                <a16:creationId xmlns:a16="http://schemas.microsoft.com/office/drawing/2014/main" id="{FB0CC6D0-85A8-42FD-AA6E-2005D18A0DD2}"/>
+                <a16:creationId xmlns="" xmlns:a16="http://schemas.microsoft.com/office/drawing/2014/main" id="{FB0CC6D0-85A8-42FD-AA6E-2005D18A0DD2}"/>
               </a:ext>
             </a:extLst>
           </p:cNvPr>
@@ -9848,7 +9848,7 @@
           <p:cNvPr id="3" name="Tabela 2">
             <a:extLst>
               <a:ext uri="{FF2B5EF4-FFF2-40B4-BE49-F238E27FC236}">
-                <a16:creationId xmlns:a16="http://schemas.microsoft.com/office/drawing/2014/main" id="{C2770EFF-D9E3-4292-B7A1-82F05087DBB9}"/>
+                <a16:creationId xmlns="" xmlns:a16="http://schemas.microsoft.com/office/drawing/2014/main" id="{C2770EFF-D9E3-4292-B7A1-82F05087DBB9}"/>
               </a:ext>
             </a:extLst>
           </p:cNvPr>
@@ -9875,70 +9875,70 @@
                 <a:gridCol w="2645106">
                   <a:extLst>
                     <a:ext uri="{9D8B030D-6E8A-4147-A177-3AD203B41FA5}">
-                      <a16:colId xmlns:a16="http://schemas.microsoft.com/office/drawing/2014/main" val="783639410"/>
+                      <a16:colId xmlns="" xmlns:a16="http://schemas.microsoft.com/office/drawing/2014/main" val="783639410"/>
                     </a:ext>
                   </a:extLst>
                 </a:gridCol>
                 <a:gridCol w="466187">
                   <a:extLst>
                     <a:ext uri="{9D8B030D-6E8A-4147-A177-3AD203B41FA5}">
-                      <a16:colId xmlns:a16="http://schemas.microsoft.com/office/drawing/2014/main" val="689539510"/>
+                      <a16:colId xmlns="" xmlns:a16="http://schemas.microsoft.com/office/drawing/2014/main" val="689539510"/>
                     </a:ext>
                   </a:extLst>
                 </a:gridCol>
                 <a:gridCol w="270253">
                   <a:extLst>
                     <a:ext uri="{9D8B030D-6E8A-4147-A177-3AD203B41FA5}">
-                      <a16:colId xmlns:a16="http://schemas.microsoft.com/office/drawing/2014/main" val="1972958874"/>
+                      <a16:colId xmlns="" xmlns:a16="http://schemas.microsoft.com/office/drawing/2014/main" val="1972958874"/>
                     </a:ext>
                   </a:extLst>
                 </a:gridCol>
                 <a:gridCol w="2959276">
                   <a:extLst>
                     <a:ext uri="{9D8B030D-6E8A-4147-A177-3AD203B41FA5}">
-                      <a16:colId xmlns:a16="http://schemas.microsoft.com/office/drawing/2014/main" val="444452622"/>
+                      <a16:colId xmlns="" xmlns:a16="http://schemas.microsoft.com/office/drawing/2014/main" val="444452622"/>
                     </a:ext>
                   </a:extLst>
                 </a:gridCol>
                 <a:gridCol w="719550">
                   <a:extLst>
                     <a:ext uri="{9D8B030D-6E8A-4147-A177-3AD203B41FA5}">
-                      <a16:colId xmlns:a16="http://schemas.microsoft.com/office/drawing/2014/main" val="3913584187"/>
+                      <a16:colId xmlns="" xmlns:a16="http://schemas.microsoft.com/office/drawing/2014/main" val="3913584187"/>
                     </a:ext>
                   </a:extLst>
                 </a:gridCol>
                 <a:gridCol w="878324">
                   <a:extLst>
                     <a:ext uri="{9D8B030D-6E8A-4147-A177-3AD203B41FA5}">
-                      <a16:colId xmlns:a16="http://schemas.microsoft.com/office/drawing/2014/main" val="3815751715"/>
+                      <a16:colId xmlns="" xmlns:a16="http://schemas.microsoft.com/office/drawing/2014/main" val="3815751715"/>
                     </a:ext>
                   </a:extLst>
                 </a:gridCol>
                 <a:gridCol w="557398">
                   <a:extLst>
                     <a:ext uri="{9D8B030D-6E8A-4147-A177-3AD203B41FA5}">
-                      <a16:colId xmlns:a16="http://schemas.microsoft.com/office/drawing/2014/main" val="3974757616"/>
+                      <a16:colId xmlns="" xmlns:a16="http://schemas.microsoft.com/office/drawing/2014/main" val="3974757616"/>
                     </a:ext>
                   </a:extLst>
                 </a:gridCol>
                 <a:gridCol w="638474">
                   <a:extLst>
                     <a:ext uri="{9D8B030D-6E8A-4147-A177-3AD203B41FA5}">
-                      <a16:colId xmlns:a16="http://schemas.microsoft.com/office/drawing/2014/main" val="3198405966"/>
+                      <a16:colId xmlns="" xmlns:a16="http://schemas.microsoft.com/office/drawing/2014/main" val="3198405966"/>
                     </a:ext>
                   </a:extLst>
                 </a:gridCol>
                 <a:gridCol w="743197">
                   <a:extLst>
                     <a:ext uri="{9D8B030D-6E8A-4147-A177-3AD203B41FA5}">
-                      <a16:colId xmlns:a16="http://schemas.microsoft.com/office/drawing/2014/main" val="886076819"/>
+                      <a16:colId xmlns="" xmlns:a16="http://schemas.microsoft.com/office/drawing/2014/main" val="886076819"/>
                     </a:ext>
                   </a:extLst>
                 </a:gridCol>
                 <a:gridCol w="1053989">
                   <a:extLst>
                     <a:ext uri="{9D8B030D-6E8A-4147-A177-3AD203B41FA5}">
-                      <a16:colId xmlns:a16="http://schemas.microsoft.com/office/drawing/2014/main" val="396249085"/>
+                      <a16:colId xmlns="" xmlns:a16="http://schemas.microsoft.com/office/drawing/2014/main" val="396249085"/>
                     </a:ext>
                   </a:extLst>
                 </a:gridCol>
@@ -10469,7 +10469,7 @@
                 </a:tc>
                 <a:extLst>
                   <a:ext uri="{0D108BD9-81ED-4DB2-BD59-A6C34878D82A}">
-                    <a16:rowId xmlns:a16="http://schemas.microsoft.com/office/drawing/2014/main" val="135564186"/>
+                    <a16:rowId xmlns="" xmlns:a16="http://schemas.microsoft.com/office/drawing/2014/main" val="135564186"/>
                   </a:ext>
                 </a:extLst>
               </a:tr>
@@ -11067,7 +11067,7 @@
                 </a:tc>
                 <a:extLst>
                   <a:ext uri="{0D108BD9-81ED-4DB2-BD59-A6C34878D82A}">
-                    <a16:rowId xmlns:a16="http://schemas.microsoft.com/office/drawing/2014/main" val="581222236"/>
+                    <a16:rowId xmlns="" xmlns:a16="http://schemas.microsoft.com/office/drawing/2014/main" val="581222236"/>
                   </a:ext>
                 </a:extLst>
               </a:tr>
@@ -11568,7 +11568,7 @@
                 </a:tc>
                 <a:extLst>
                   <a:ext uri="{0D108BD9-81ED-4DB2-BD59-A6C34878D82A}">
-                    <a16:rowId xmlns:a16="http://schemas.microsoft.com/office/drawing/2014/main" val="996232071"/>
+                    <a16:rowId xmlns="" xmlns:a16="http://schemas.microsoft.com/office/drawing/2014/main" val="996232071"/>
                   </a:ext>
                 </a:extLst>
               </a:tr>
@@ -12069,7 +12069,7 @@
                 </a:tc>
                 <a:extLst>
                   <a:ext uri="{0D108BD9-81ED-4DB2-BD59-A6C34878D82A}">
-                    <a16:rowId xmlns:a16="http://schemas.microsoft.com/office/drawing/2014/main" val="1051793465"/>
+                    <a16:rowId xmlns="" xmlns:a16="http://schemas.microsoft.com/office/drawing/2014/main" val="1051793465"/>
                   </a:ext>
                 </a:extLst>
               </a:tr>
@@ -12570,7 +12570,7 @@
                 </a:tc>
                 <a:extLst>
                   <a:ext uri="{0D108BD9-81ED-4DB2-BD59-A6C34878D82A}">
-                    <a16:rowId xmlns:a16="http://schemas.microsoft.com/office/drawing/2014/main" val="41538527"/>
+                    <a16:rowId xmlns="" xmlns:a16="http://schemas.microsoft.com/office/drawing/2014/main" val="41538527"/>
                   </a:ext>
                 </a:extLst>
               </a:tr>
@@ -13118,7 +13118,7 @@
                 </a:tc>
                 <a:extLst>
                   <a:ext uri="{0D108BD9-81ED-4DB2-BD59-A6C34878D82A}">
-                    <a16:rowId xmlns:a16="http://schemas.microsoft.com/office/drawing/2014/main" val="2506469892"/>
+                    <a16:rowId xmlns="" xmlns:a16="http://schemas.microsoft.com/office/drawing/2014/main" val="2506469892"/>
                   </a:ext>
                 </a:extLst>
               </a:tr>
@@ -13619,7 +13619,7 @@
                 </a:tc>
                 <a:extLst>
                   <a:ext uri="{0D108BD9-81ED-4DB2-BD59-A6C34878D82A}">
-                    <a16:rowId xmlns:a16="http://schemas.microsoft.com/office/drawing/2014/main" val="4234577572"/>
+                    <a16:rowId xmlns="" xmlns:a16="http://schemas.microsoft.com/office/drawing/2014/main" val="4234577572"/>
                   </a:ext>
                 </a:extLst>
               </a:tr>
@@ -14217,7 +14217,7 @@
                 </a:tc>
                 <a:extLst>
                   <a:ext uri="{0D108BD9-81ED-4DB2-BD59-A6C34878D82A}">
-                    <a16:rowId xmlns:a16="http://schemas.microsoft.com/office/drawing/2014/main" val="1439819237"/>
+                    <a16:rowId xmlns="" xmlns:a16="http://schemas.microsoft.com/office/drawing/2014/main" val="1439819237"/>
                   </a:ext>
                 </a:extLst>
               </a:tr>
@@ -14718,7 +14718,7 @@
                 </a:tc>
                 <a:extLst>
                   <a:ext uri="{0D108BD9-81ED-4DB2-BD59-A6C34878D82A}">
-                    <a16:rowId xmlns:a16="http://schemas.microsoft.com/office/drawing/2014/main" val="1029845756"/>
+                    <a16:rowId xmlns="" xmlns:a16="http://schemas.microsoft.com/office/drawing/2014/main" val="1029845756"/>
                   </a:ext>
                 </a:extLst>
               </a:tr>
@@ -15266,7 +15266,7 @@
                 </a:tc>
                 <a:extLst>
                   <a:ext uri="{0D108BD9-81ED-4DB2-BD59-A6C34878D82A}">
-                    <a16:rowId xmlns:a16="http://schemas.microsoft.com/office/drawing/2014/main" val="784219082"/>
+                    <a16:rowId xmlns="" xmlns:a16="http://schemas.microsoft.com/office/drawing/2014/main" val="784219082"/>
                   </a:ext>
                 </a:extLst>
               </a:tr>
@@ -15864,7 +15864,7 @@
                 </a:tc>
                 <a:extLst>
                   <a:ext uri="{0D108BD9-81ED-4DB2-BD59-A6C34878D82A}">
-                    <a16:rowId xmlns:a16="http://schemas.microsoft.com/office/drawing/2014/main" val="513794652"/>
+                    <a16:rowId xmlns="" xmlns:a16="http://schemas.microsoft.com/office/drawing/2014/main" val="513794652"/>
                   </a:ext>
                 </a:extLst>
               </a:tr>
@@ -16365,7 +16365,7 @@
                 </a:tc>
                 <a:extLst>
                   <a:ext uri="{0D108BD9-81ED-4DB2-BD59-A6C34878D82A}">
-                    <a16:rowId xmlns:a16="http://schemas.microsoft.com/office/drawing/2014/main" val="2550552596"/>
+                    <a16:rowId xmlns="" xmlns:a16="http://schemas.microsoft.com/office/drawing/2014/main" val="2550552596"/>
                   </a:ext>
                 </a:extLst>
               </a:tr>
@@ -16866,7 +16866,7 @@
                 </a:tc>
                 <a:extLst>
                   <a:ext uri="{0D108BD9-81ED-4DB2-BD59-A6C34878D82A}">
-                    <a16:rowId xmlns:a16="http://schemas.microsoft.com/office/drawing/2014/main" val="4005426644"/>
+                    <a16:rowId xmlns="" xmlns:a16="http://schemas.microsoft.com/office/drawing/2014/main" val="4005426644"/>
                   </a:ext>
                 </a:extLst>
               </a:tr>
@@ -17367,7 +17367,7 @@
                 </a:tc>
                 <a:extLst>
                   <a:ext uri="{0D108BD9-81ED-4DB2-BD59-A6C34878D82A}">
-                    <a16:rowId xmlns:a16="http://schemas.microsoft.com/office/drawing/2014/main" val="2767419899"/>
+                    <a16:rowId xmlns="" xmlns:a16="http://schemas.microsoft.com/office/drawing/2014/main" val="2767419899"/>
                   </a:ext>
                 </a:extLst>
               </a:tr>
@@ -17915,7 +17915,7 @@
                 </a:tc>
                 <a:extLst>
                   <a:ext uri="{0D108BD9-81ED-4DB2-BD59-A6C34878D82A}">
-                    <a16:rowId xmlns:a16="http://schemas.microsoft.com/office/drawing/2014/main" val="2801034896"/>
+                    <a16:rowId xmlns="" xmlns:a16="http://schemas.microsoft.com/office/drawing/2014/main" val="2801034896"/>
                   </a:ext>
                 </a:extLst>
               </a:tr>
@@ -18513,7 +18513,7 @@
                 </a:tc>
                 <a:extLst>
                   <a:ext uri="{0D108BD9-81ED-4DB2-BD59-A6C34878D82A}">
-                    <a16:rowId xmlns:a16="http://schemas.microsoft.com/office/drawing/2014/main" val="3314678953"/>
+                    <a16:rowId xmlns="" xmlns:a16="http://schemas.microsoft.com/office/drawing/2014/main" val="3314678953"/>
                   </a:ext>
                 </a:extLst>
               </a:tr>
@@ -19014,7 +19014,7 @@
                 </a:tc>
                 <a:extLst>
                   <a:ext uri="{0D108BD9-81ED-4DB2-BD59-A6C34878D82A}">
-                    <a16:rowId xmlns:a16="http://schemas.microsoft.com/office/drawing/2014/main" val="4179011476"/>
+                    <a16:rowId xmlns="" xmlns:a16="http://schemas.microsoft.com/office/drawing/2014/main" val="4179011476"/>
                   </a:ext>
                 </a:extLst>
               </a:tr>
@@ -19027,7 +19027,7 @@
           <p:cNvPr id="4" name="CaixaDeTexto 3">
             <a:extLst>
               <a:ext uri="{FF2B5EF4-FFF2-40B4-BE49-F238E27FC236}">
-                <a16:creationId xmlns:a16="http://schemas.microsoft.com/office/drawing/2014/main" id="{EF7C4E01-DBDD-4FB7-AB4C-DA5DE4D23338}"/>
+                <a16:creationId xmlns="" xmlns:a16="http://schemas.microsoft.com/office/drawing/2014/main" id="{EF7C4E01-DBDD-4FB7-AB4C-DA5DE4D23338}"/>
               </a:ext>
             </a:extLst>
           </p:cNvPr>
@@ -19097,7 +19097,7 @@
           <p:cNvPr id="4" name="Retângulo 3">
             <a:extLst>
               <a:ext uri="{FF2B5EF4-FFF2-40B4-BE49-F238E27FC236}">
-                <a16:creationId xmlns:a16="http://schemas.microsoft.com/office/drawing/2014/main" id="{88C6BF1B-8B81-4A42-B266-9DF3168EF8CB}"/>
+                <a16:creationId xmlns="" xmlns:a16="http://schemas.microsoft.com/office/drawing/2014/main" id="{88C6BF1B-8B81-4A42-B266-9DF3168EF8CB}"/>
               </a:ext>
             </a:extLst>
           </p:cNvPr>
@@ -19151,7 +19151,7 @@
           <p:cNvPr id="6" name="CaixaDeTexto 5">
             <a:extLst>
               <a:ext uri="{FF2B5EF4-FFF2-40B4-BE49-F238E27FC236}">
-                <a16:creationId xmlns:a16="http://schemas.microsoft.com/office/drawing/2014/main" id="{1270056D-C445-482D-9C8C-EC4698A09D63}"/>
+                <a16:creationId xmlns="" xmlns:a16="http://schemas.microsoft.com/office/drawing/2014/main" id="{1270056D-C445-482D-9C8C-EC4698A09D63}"/>
               </a:ext>
             </a:extLst>
           </p:cNvPr>
@@ -19192,7 +19192,7 @@
           <p:cNvPr id="2" name="Retângulo 1">
             <a:extLst>
               <a:ext uri="{FF2B5EF4-FFF2-40B4-BE49-F238E27FC236}">
-                <a16:creationId xmlns:a16="http://schemas.microsoft.com/office/drawing/2014/main" id="{12043949-80F2-4BA4-ACCA-8E1E73200266}"/>
+                <a16:creationId xmlns="" xmlns:a16="http://schemas.microsoft.com/office/drawing/2014/main" id="{12043949-80F2-4BA4-ACCA-8E1E73200266}"/>
               </a:ext>
             </a:extLst>
           </p:cNvPr>
@@ -19241,7 +19241,7 @@
           <p:cNvPr id="3" name="Imagem 6" descr="Uma imagem contendo objeto&#10;&#10;Descrição gerada com muito alta confiança">
             <a:extLst>
               <a:ext uri="{FF2B5EF4-FFF2-40B4-BE49-F238E27FC236}">
-                <a16:creationId xmlns:a16="http://schemas.microsoft.com/office/drawing/2014/main" id="{BBEA9159-6E91-4172-99DF-56517BBFE5AC}"/>
+                <a16:creationId xmlns="" xmlns:a16="http://schemas.microsoft.com/office/drawing/2014/main" id="{BBEA9159-6E91-4172-99DF-56517BBFE5AC}"/>
               </a:ext>
             </a:extLst>
           </p:cNvPr>
@@ -19271,7 +19271,7 @@
           <p:cNvPr id="9" name="Conector de Seta Reta 8">
             <a:extLst>
               <a:ext uri="{FF2B5EF4-FFF2-40B4-BE49-F238E27FC236}">
-                <a16:creationId xmlns:a16="http://schemas.microsoft.com/office/drawing/2014/main" id="{BA601A5E-E9FD-4E49-A21A-E1D9795909C3}"/>
+                <a16:creationId xmlns="" xmlns:a16="http://schemas.microsoft.com/office/drawing/2014/main" id="{BA601A5E-E9FD-4E49-A21A-E1D9795909C3}"/>
               </a:ext>
             </a:extLst>
           </p:cNvPr>
@@ -19315,7 +19315,7 @@
           <p:cNvPr id="11" name="CaixaDeTexto 10">
             <a:extLst>
               <a:ext uri="{FF2B5EF4-FFF2-40B4-BE49-F238E27FC236}">
-                <a16:creationId xmlns:a16="http://schemas.microsoft.com/office/drawing/2014/main" id="{2B365FA8-96A9-46EF-82C1-1F0ACEB6382C}"/>
+                <a16:creationId xmlns="" xmlns:a16="http://schemas.microsoft.com/office/drawing/2014/main" id="{2B365FA8-96A9-46EF-82C1-1F0ACEB6382C}"/>
               </a:ext>
             </a:extLst>
           </p:cNvPr>
@@ -19352,7 +19352,7 @@
           <p:cNvPr id="15" name="CaixaDeTexto 14">
             <a:extLst>
               <a:ext uri="{FF2B5EF4-FFF2-40B4-BE49-F238E27FC236}">
-                <a16:creationId xmlns:a16="http://schemas.microsoft.com/office/drawing/2014/main" id="{589ED39B-DB76-4792-9198-978C3E9B327E}"/>
+                <a16:creationId xmlns="" xmlns:a16="http://schemas.microsoft.com/office/drawing/2014/main" id="{589ED39B-DB76-4792-9198-978C3E9B327E}"/>
               </a:ext>
             </a:extLst>
           </p:cNvPr>
@@ -19392,7 +19392,7 @@
           <p:cNvPr id="17" name="Retângulo 16">
             <a:extLst>
               <a:ext uri="{FF2B5EF4-FFF2-40B4-BE49-F238E27FC236}">
-                <a16:creationId xmlns:a16="http://schemas.microsoft.com/office/drawing/2014/main" id="{AAE3C69C-201D-4C86-AAF7-B3DC70259B1F}"/>
+                <a16:creationId xmlns="" xmlns:a16="http://schemas.microsoft.com/office/drawing/2014/main" id="{AAE3C69C-201D-4C86-AAF7-B3DC70259B1F}"/>
               </a:ext>
             </a:extLst>
           </p:cNvPr>
@@ -19441,7 +19441,7 @@
           <p:cNvPr id="19" name="Retângulo 18">
             <a:extLst>
               <a:ext uri="{FF2B5EF4-FFF2-40B4-BE49-F238E27FC236}">
-                <a16:creationId xmlns:a16="http://schemas.microsoft.com/office/drawing/2014/main" id="{B1DA2E97-81CC-4053-8E24-07F96ED0FDF9}"/>
+                <a16:creationId xmlns="" xmlns:a16="http://schemas.microsoft.com/office/drawing/2014/main" id="{B1DA2E97-81CC-4053-8E24-07F96ED0FDF9}"/>
               </a:ext>
             </a:extLst>
           </p:cNvPr>
@@ -19490,7 +19490,7 @@
           <p:cNvPr id="20" name="CaixaDeTexto 19">
             <a:extLst>
               <a:ext uri="{FF2B5EF4-FFF2-40B4-BE49-F238E27FC236}">
-                <a16:creationId xmlns:a16="http://schemas.microsoft.com/office/drawing/2014/main" id="{9EF114C1-C8CF-409C-847E-943F96FE0F0F}"/>
+                <a16:creationId xmlns="" xmlns:a16="http://schemas.microsoft.com/office/drawing/2014/main" id="{9EF114C1-C8CF-409C-847E-943F96FE0F0F}"/>
               </a:ext>
             </a:extLst>
           </p:cNvPr>
@@ -19532,7 +19532,7 @@
           <p:cNvPr id="21" name="CaixaDeTexto 20">
             <a:extLst>
               <a:ext uri="{FF2B5EF4-FFF2-40B4-BE49-F238E27FC236}">
-                <a16:creationId xmlns:a16="http://schemas.microsoft.com/office/drawing/2014/main" id="{EDBD84FF-B3AA-4678-8B40-4A48A902DC6E}"/>
+                <a16:creationId xmlns="" xmlns:a16="http://schemas.microsoft.com/office/drawing/2014/main" id="{EDBD84FF-B3AA-4678-8B40-4A48A902DC6E}"/>
               </a:ext>
             </a:extLst>
           </p:cNvPr>
@@ -19570,7 +19570,7 @@
           <p:cNvPr id="22" name="Conector de Seta Reta 21">
             <a:extLst>
               <a:ext uri="{FF2B5EF4-FFF2-40B4-BE49-F238E27FC236}">
-                <a16:creationId xmlns:a16="http://schemas.microsoft.com/office/drawing/2014/main" id="{6005A5E0-EFE8-4E81-9A9B-EC939F301038}"/>
+                <a16:creationId xmlns="" xmlns:a16="http://schemas.microsoft.com/office/drawing/2014/main" id="{6005A5E0-EFE8-4E81-9A9B-EC939F301038}"/>
               </a:ext>
             </a:extLst>
           </p:cNvPr>
@@ -19644,7 +19644,7 @@
           <p:cNvPr id="2" name="CaixaDeTexto 1">
             <a:extLst>
               <a:ext uri="{FF2B5EF4-FFF2-40B4-BE49-F238E27FC236}">
-                <a16:creationId xmlns:a16="http://schemas.microsoft.com/office/drawing/2014/main" id="{D4FBAB1E-D362-4FFE-9F68-676EC352141C}"/>
+                <a16:creationId xmlns="" xmlns:a16="http://schemas.microsoft.com/office/drawing/2014/main" id="{D4FBAB1E-D362-4FFE-9F68-676EC352141C}"/>
               </a:ext>
             </a:extLst>
           </p:cNvPr>
@@ -19684,7 +19684,7 @@
           <p:cNvPr id="4" name="Imagem 3">
             <a:extLst>
               <a:ext uri="{FF2B5EF4-FFF2-40B4-BE49-F238E27FC236}">
-                <a16:creationId xmlns:a16="http://schemas.microsoft.com/office/drawing/2014/main" id="{63AC2410-66FC-42A0-A1BF-4979DC926B1B}"/>
+                <a16:creationId xmlns="" xmlns:a16="http://schemas.microsoft.com/office/drawing/2014/main" id="{63AC2410-66FC-42A0-A1BF-4979DC926B1B}"/>
               </a:ext>
             </a:extLst>
           </p:cNvPr>
@@ -19750,7 +19750,7 @@
           <p:cNvPr id="2" name="CaixaDeTexto 1">
             <a:extLst>
               <a:ext uri="{FF2B5EF4-FFF2-40B4-BE49-F238E27FC236}">
-                <a16:creationId xmlns:a16="http://schemas.microsoft.com/office/drawing/2014/main" id="{676F3882-7EE1-4D63-BC21-3F2E586A42CA}"/>
+                <a16:creationId xmlns="" xmlns:a16="http://schemas.microsoft.com/office/drawing/2014/main" id="{676F3882-7EE1-4D63-BC21-3F2E586A42CA}"/>
               </a:ext>
             </a:extLst>
           </p:cNvPr>
@@ -19759,8 +19759,8 @@
         </p:nvSpPr>
         <p:spPr>
           <a:xfrm>
-            <a:off x="3712719" y="219827"/>
-            <a:ext cx="4963510" cy="461665"/>
+            <a:off x="392665" y="592428"/>
+            <a:ext cx="1966864" cy="830997"/>
           </a:xfrm>
           <a:prstGeom prst="rect">
             <a:avLst/>
@@ -19787,13 +19787,7 @@
       </p:sp>
       <p:pic>
         <p:nvPicPr>
-          <p:cNvPr id="4" name="Imagem 3">
-            <a:extLst>
-              <a:ext uri="{FF2B5EF4-FFF2-40B4-BE49-F238E27FC236}">
-                <a16:creationId xmlns:a16="http://schemas.microsoft.com/office/drawing/2014/main" id="{F0E8E748-A00A-4650-A43B-9AD558C87412}"/>
-              </a:ext>
-            </a:extLst>
-          </p:cNvPr>
+          <p:cNvPr id="3" name="Imagem 2"/>
           <p:cNvPicPr>
             <a:picLocks noChangeAspect="1"/>
           </p:cNvPicPr>
@@ -19813,8 +19807,8 @@
         </p:blipFill>
         <p:spPr>
           <a:xfrm>
-            <a:off x="822374" y="1114425"/>
-            <a:ext cx="10744200" cy="4629150"/>
+            <a:off x="2247221" y="0"/>
+            <a:ext cx="8725579" cy="6730912"/>
           </a:xfrm>
           <a:prstGeom prst="rect">
             <a:avLst/>
@@ -19856,7 +19850,7 @@
           <p:cNvPr id="2" name="CaixaDeTexto 1">
             <a:extLst>
               <a:ext uri="{FF2B5EF4-FFF2-40B4-BE49-F238E27FC236}">
-                <a16:creationId xmlns:a16="http://schemas.microsoft.com/office/drawing/2014/main" id="{298D3547-6AF1-429C-AF84-EB32A674D5FA}"/>
+                <a16:creationId xmlns="" xmlns:a16="http://schemas.microsoft.com/office/drawing/2014/main" id="{298D3547-6AF1-429C-AF84-EB32A674D5FA}"/>
               </a:ext>
             </a:extLst>
           </p:cNvPr>
@@ -20131,7 +20125,7 @@
           <p:cNvPr id="3" name="Tabela 2">
             <a:extLst>
               <a:ext uri="{FF2B5EF4-FFF2-40B4-BE49-F238E27FC236}">
-                <a16:creationId xmlns:a16="http://schemas.microsoft.com/office/drawing/2014/main" id="{C7076FB7-004B-4D81-BA9F-248E81BD8E8E}"/>
+                <a16:creationId xmlns="" xmlns:a16="http://schemas.microsoft.com/office/drawing/2014/main" id="{C7076FB7-004B-4D81-BA9F-248E81BD8E8E}"/>
               </a:ext>
             </a:extLst>
           </p:cNvPr>
@@ -20154,119 +20148,119 @@
                 <a:gridCol w="640312">
                   <a:extLst>
                     <a:ext uri="{9D8B030D-6E8A-4147-A177-3AD203B41FA5}">
-                      <a16:colId xmlns:a16="http://schemas.microsoft.com/office/drawing/2014/main" val="4005008011"/>
+                      <a16:colId xmlns="" xmlns:a16="http://schemas.microsoft.com/office/drawing/2014/main" val="4005008011"/>
                     </a:ext>
                   </a:extLst>
                 </a:gridCol>
                 <a:gridCol w="641548">
                   <a:extLst>
                     <a:ext uri="{9D8B030D-6E8A-4147-A177-3AD203B41FA5}">
-                      <a16:colId xmlns:a16="http://schemas.microsoft.com/office/drawing/2014/main" val="652421216"/>
+                      <a16:colId xmlns="" xmlns:a16="http://schemas.microsoft.com/office/drawing/2014/main" val="652421216"/>
                     </a:ext>
                   </a:extLst>
                 </a:gridCol>
                 <a:gridCol w="641548">
                   <a:extLst>
                     <a:ext uri="{9D8B030D-6E8A-4147-A177-3AD203B41FA5}">
-                      <a16:colId xmlns:a16="http://schemas.microsoft.com/office/drawing/2014/main" val="3039469927"/>
+                      <a16:colId xmlns="" xmlns:a16="http://schemas.microsoft.com/office/drawing/2014/main" val="3039469927"/>
                     </a:ext>
                   </a:extLst>
                 </a:gridCol>
                 <a:gridCol w="641548">
                   <a:extLst>
                     <a:ext uri="{9D8B030D-6E8A-4147-A177-3AD203B41FA5}">
-                      <a16:colId xmlns:a16="http://schemas.microsoft.com/office/drawing/2014/main" val="1316076473"/>
+                      <a16:colId xmlns="" xmlns:a16="http://schemas.microsoft.com/office/drawing/2014/main" val="1316076473"/>
                     </a:ext>
                   </a:extLst>
                 </a:gridCol>
                 <a:gridCol w="641548">
                   <a:extLst>
                     <a:ext uri="{9D8B030D-6E8A-4147-A177-3AD203B41FA5}">
-                      <a16:colId xmlns:a16="http://schemas.microsoft.com/office/drawing/2014/main" val="2448816850"/>
+                      <a16:colId xmlns="" xmlns:a16="http://schemas.microsoft.com/office/drawing/2014/main" val="2448816850"/>
                     </a:ext>
                   </a:extLst>
                 </a:gridCol>
                 <a:gridCol w="641548">
                   <a:extLst>
                     <a:ext uri="{9D8B030D-6E8A-4147-A177-3AD203B41FA5}">
-                      <a16:colId xmlns:a16="http://schemas.microsoft.com/office/drawing/2014/main" val="2479370852"/>
+                      <a16:colId xmlns="" xmlns:a16="http://schemas.microsoft.com/office/drawing/2014/main" val="2479370852"/>
                     </a:ext>
                   </a:extLst>
                 </a:gridCol>
                 <a:gridCol w="641548">
                   <a:extLst>
                     <a:ext uri="{9D8B030D-6E8A-4147-A177-3AD203B41FA5}">
-                      <a16:colId xmlns:a16="http://schemas.microsoft.com/office/drawing/2014/main" val="1969095361"/>
+                      <a16:colId xmlns="" xmlns:a16="http://schemas.microsoft.com/office/drawing/2014/main" val="1969095361"/>
                     </a:ext>
                   </a:extLst>
                 </a:gridCol>
                 <a:gridCol w="641548">
                   <a:extLst>
                     <a:ext uri="{9D8B030D-6E8A-4147-A177-3AD203B41FA5}">
-                      <a16:colId xmlns:a16="http://schemas.microsoft.com/office/drawing/2014/main" val="98119693"/>
+                      <a16:colId xmlns="" xmlns:a16="http://schemas.microsoft.com/office/drawing/2014/main" val="98119693"/>
                     </a:ext>
                   </a:extLst>
                 </a:gridCol>
                 <a:gridCol w="641548">
                   <a:extLst>
                     <a:ext uri="{9D8B030D-6E8A-4147-A177-3AD203B41FA5}">
-                      <a16:colId xmlns:a16="http://schemas.microsoft.com/office/drawing/2014/main" val="454450840"/>
+                      <a16:colId xmlns="" xmlns:a16="http://schemas.microsoft.com/office/drawing/2014/main" val="454450840"/>
                     </a:ext>
                   </a:extLst>
                 </a:gridCol>
                 <a:gridCol w="641548">
                   <a:extLst>
                     <a:ext uri="{9D8B030D-6E8A-4147-A177-3AD203B41FA5}">
-                      <a16:colId xmlns:a16="http://schemas.microsoft.com/office/drawing/2014/main" val="614312454"/>
+                      <a16:colId xmlns="" xmlns:a16="http://schemas.microsoft.com/office/drawing/2014/main" val="614312454"/>
                     </a:ext>
                   </a:extLst>
                 </a:gridCol>
                 <a:gridCol w="641548">
                   <a:extLst>
                     <a:ext uri="{9D8B030D-6E8A-4147-A177-3AD203B41FA5}">
-                      <a16:colId xmlns:a16="http://schemas.microsoft.com/office/drawing/2014/main" val="2716756239"/>
+                      <a16:colId xmlns="" xmlns:a16="http://schemas.microsoft.com/office/drawing/2014/main" val="2716756239"/>
                     </a:ext>
                   </a:extLst>
                 </a:gridCol>
                 <a:gridCol w="641548">
                   <a:extLst>
                     <a:ext uri="{9D8B030D-6E8A-4147-A177-3AD203B41FA5}">
-                      <a16:colId xmlns:a16="http://schemas.microsoft.com/office/drawing/2014/main" val="1130405621"/>
+                      <a16:colId xmlns="" xmlns:a16="http://schemas.microsoft.com/office/drawing/2014/main" val="1130405621"/>
                     </a:ext>
                   </a:extLst>
                 </a:gridCol>
                 <a:gridCol w="641548">
                   <a:extLst>
                     <a:ext uri="{9D8B030D-6E8A-4147-A177-3AD203B41FA5}">
-                      <a16:colId xmlns:a16="http://schemas.microsoft.com/office/drawing/2014/main" val="3622759223"/>
+                      <a16:colId xmlns="" xmlns:a16="http://schemas.microsoft.com/office/drawing/2014/main" val="3622759223"/>
                     </a:ext>
                   </a:extLst>
                 </a:gridCol>
                 <a:gridCol w="641548">
                   <a:extLst>
                     <a:ext uri="{9D8B030D-6E8A-4147-A177-3AD203B41FA5}">
-                      <a16:colId xmlns:a16="http://schemas.microsoft.com/office/drawing/2014/main" val="1006877252"/>
+                      <a16:colId xmlns="" xmlns:a16="http://schemas.microsoft.com/office/drawing/2014/main" val="1006877252"/>
                     </a:ext>
                   </a:extLst>
                 </a:gridCol>
                 <a:gridCol w="641548">
                   <a:extLst>
                     <a:ext uri="{9D8B030D-6E8A-4147-A177-3AD203B41FA5}">
-                      <a16:colId xmlns:a16="http://schemas.microsoft.com/office/drawing/2014/main" val="111930039"/>
+                      <a16:colId xmlns="" xmlns:a16="http://schemas.microsoft.com/office/drawing/2014/main" val="111930039"/>
                     </a:ext>
                   </a:extLst>
                 </a:gridCol>
                 <a:gridCol w="641548">
                   <a:extLst>
                     <a:ext uri="{9D8B030D-6E8A-4147-A177-3AD203B41FA5}">
-                      <a16:colId xmlns:a16="http://schemas.microsoft.com/office/drawing/2014/main" val="1778524480"/>
+                      <a16:colId xmlns="" xmlns:a16="http://schemas.microsoft.com/office/drawing/2014/main" val="1778524480"/>
                     </a:ext>
                   </a:extLst>
                 </a:gridCol>
                 <a:gridCol w="641548">
                   <a:extLst>
                     <a:ext uri="{9D8B030D-6E8A-4147-A177-3AD203B41FA5}">
-                      <a16:colId xmlns:a16="http://schemas.microsoft.com/office/drawing/2014/main" val="3971070220"/>
+                      <a16:colId xmlns="" xmlns:a16="http://schemas.microsoft.com/office/drawing/2014/main" val="3971070220"/>
                     </a:ext>
                   </a:extLst>
                 </a:gridCol>
@@ -20598,7 +20592,7 @@
                 </a:tc>
                 <a:extLst>
                   <a:ext uri="{0D108BD9-81ED-4DB2-BD59-A6C34878D82A}">
-                    <a16:rowId xmlns:a16="http://schemas.microsoft.com/office/drawing/2014/main" val="1360716634"/>
+                    <a16:rowId xmlns="" xmlns:a16="http://schemas.microsoft.com/office/drawing/2014/main" val="1360716634"/>
                   </a:ext>
                 </a:extLst>
               </a:tr>
@@ -20942,7 +20936,7 @@
                 </a:tc>
                 <a:extLst>
                   <a:ext uri="{0D108BD9-81ED-4DB2-BD59-A6C34878D82A}">
-                    <a16:rowId xmlns:a16="http://schemas.microsoft.com/office/drawing/2014/main" val="2291495613"/>
+                    <a16:rowId xmlns="" xmlns:a16="http://schemas.microsoft.com/office/drawing/2014/main" val="2291495613"/>
                   </a:ext>
                 </a:extLst>
               </a:tr>
@@ -21278,7 +21272,7 @@
                 </a:tc>
                 <a:extLst>
                   <a:ext uri="{0D108BD9-81ED-4DB2-BD59-A6C34878D82A}">
-                    <a16:rowId xmlns:a16="http://schemas.microsoft.com/office/drawing/2014/main" val="3544853836"/>
+                    <a16:rowId xmlns="" xmlns:a16="http://schemas.microsoft.com/office/drawing/2014/main" val="3544853836"/>
                   </a:ext>
                 </a:extLst>
               </a:tr>
@@ -21622,7 +21616,7 @@
                 </a:tc>
                 <a:extLst>
                   <a:ext uri="{0D108BD9-81ED-4DB2-BD59-A6C34878D82A}">
-                    <a16:rowId xmlns:a16="http://schemas.microsoft.com/office/drawing/2014/main" val="3175992056"/>
+                    <a16:rowId xmlns="" xmlns:a16="http://schemas.microsoft.com/office/drawing/2014/main" val="3175992056"/>
                   </a:ext>
                 </a:extLst>
               </a:tr>
@@ -21964,7 +21958,7 @@
                 </a:tc>
                 <a:extLst>
                   <a:ext uri="{0D108BD9-81ED-4DB2-BD59-A6C34878D82A}">
-                    <a16:rowId xmlns:a16="http://schemas.microsoft.com/office/drawing/2014/main" val="1230683347"/>
+                    <a16:rowId xmlns="" xmlns:a16="http://schemas.microsoft.com/office/drawing/2014/main" val="1230683347"/>
                   </a:ext>
                 </a:extLst>
               </a:tr>
@@ -22307,7 +22301,7 @@
                 </a:tc>
                 <a:extLst>
                   <a:ext uri="{0D108BD9-81ED-4DB2-BD59-A6C34878D82A}">
-                    <a16:rowId xmlns:a16="http://schemas.microsoft.com/office/drawing/2014/main" val="1276669589"/>
+                    <a16:rowId xmlns="" xmlns:a16="http://schemas.microsoft.com/office/drawing/2014/main" val="1276669589"/>
                   </a:ext>
                 </a:extLst>
               </a:tr>
@@ -22651,7 +22645,7 @@
                 </a:tc>
                 <a:extLst>
                   <a:ext uri="{0D108BD9-81ED-4DB2-BD59-A6C34878D82A}">
-                    <a16:rowId xmlns:a16="http://schemas.microsoft.com/office/drawing/2014/main" val="773569043"/>
+                    <a16:rowId xmlns="" xmlns:a16="http://schemas.microsoft.com/office/drawing/2014/main" val="773569043"/>
                   </a:ext>
                 </a:extLst>
               </a:tr>
@@ -22997,7 +22991,7 @@
                 </a:tc>
                 <a:extLst>
                   <a:ext uri="{0D108BD9-81ED-4DB2-BD59-A6C34878D82A}">
-                    <a16:rowId xmlns:a16="http://schemas.microsoft.com/office/drawing/2014/main" val="1259029321"/>
+                    <a16:rowId xmlns="" xmlns:a16="http://schemas.microsoft.com/office/drawing/2014/main" val="1259029321"/>
                   </a:ext>
                 </a:extLst>
               </a:tr>
@@ -23335,7 +23329,7 @@
                 </a:tc>
                 <a:extLst>
                   <a:ext uri="{0D108BD9-81ED-4DB2-BD59-A6C34878D82A}">
-                    <a16:rowId xmlns:a16="http://schemas.microsoft.com/office/drawing/2014/main" val="618596595"/>
+                    <a16:rowId xmlns="" xmlns:a16="http://schemas.microsoft.com/office/drawing/2014/main" val="618596595"/>
                   </a:ext>
                 </a:extLst>
               </a:tr>
@@ -23679,7 +23673,7 @@
                 </a:tc>
                 <a:extLst>
                   <a:ext uri="{0D108BD9-81ED-4DB2-BD59-A6C34878D82A}">
-                    <a16:rowId xmlns:a16="http://schemas.microsoft.com/office/drawing/2014/main" val="2091550086"/>
+                    <a16:rowId xmlns="" xmlns:a16="http://schemas.microsoft.com/office/drawing/2014/main" val="2091550086"/>
                   </a:ext>
                 </a:extLst>
               </a:tr>
@@ -24024,7 +24018,7 @@
                 </a:tc>
                 <a:extLst>
                   <a:ext uri="{0D108BD9-81ED-4DB2-BD59-A6C34878D82A}">
-                    <a16:rowId xmlns:a16="http://schemas.microsoft.com/office/drawing/2014/main" val="3792584638"/>
+                    <a16:rowId xmlns="" xmlns:a16="http://schemas.microsoft.com/office/drawing/2014/main" val="3792584638"/>
                   </a:ext>
                 </a:extLst>
               </a:tr>
@@ -24366,7 +24360,7 @@
                 </a:tc>
                 <a:extLst>
                   <a:ext uri="{0D108BD9-81ED-4DB2-BD59-A6C34878D82A}">
-                    <a16:rowId xmlns:a16="http://schemas.microsoft.com/office/drawing/2014/main" val="1575665881"/>
+                    <a16:rowId xmlns="" xmlns:a16="http://schemas.microsoft.com/office/drawing/2014/main" val="1575665881"/>
                   </a:ext>
                 </a:extLst>
               </a:tr>
@@ -24710,7 +24704,7 @@
                 </a:tc>
                 <a:extLst>
                   <a:ext uri="{0D108BD9-81ED-4DB2-BD59-A6C34878D82A}">
-                    <a16:rowId xmlns:a16="http://schemas.microsoft.com/office/drawing/2014/main" val="770604299"/>
+                    <a16:rowId xmlns="" xmlns:a16="http://schemas.microsoft.com/office/drawing/2014/main" val="770604299"/>
                   </a:ext>
                 </a:extLst>
               </a:tr>
@@ -25053,7 +25047,7 @@
                 </a:tc>
                 <a:extLst>
                   <a:ext uri="{0D108BD9-81ED-4DB2-BD59-A6C34878D82A}">
-                    <a16:rowId xmlns:a16="http://schemas.microsoft.com/office/drawing/2014/main" val="2125458334"/>
+                    <a16:rowId xmlns="" xmlns:a16="http://schemas.microsoft.com/office/drawing/2014/main" val="2125458334"/>
                   </a:ext>
                 </a:extLst>
               </a:tr>
@@ -25396,7 +25390,7 @@
                 </a:tc>
                 <a:extLst>
                   <a:ext uri="{0D108BD9-81ED-4DB2-BD59-A6C34878D82A}">
-                    <a16:rowId xmlns:a16="http://schemas.microsoft.com/office/drawing/2014/main" val="2352351653"/>
+                    <a16:rowId xmlns="" xmlns:a16="http://schemas.microsoft.com/office/drawing/2014/main" val="2352351653"/>
                   </a:ext>
                 </a:extLst>
               </a:tr>
@@ -25409,7 +25403,7 @@
           <p:cNvPr id="5" name="CaixaDeTexto 4">
             <a:extLst>
               <a:ext uri="{FF2B5EF4-FFF2-40B4-BE49-F238E27FC236}">
-                <a16:creationId xmlns:a16="http://schemas.microsoft.com/office/drawing/2014/main" id="{B547C52F-1282-4FE4-8998-9BCF7EA9715E}"/>
+                <a16:creationId xmlns="" xmlns:a16="http://schemas.microsoft.com/office/drawing/2014/main" id="{B547C52F-1282-4FE4-8998-9BCF7EA9715E}"/>
               </a:ext>
             </a:extLst>
           </p:cNvPr>
@@ -25479,7 +25473,7 @@
           <p:cNvPr id="4" name="CaixaDeTexto 3">
             <a:extLst>
               <a:ext uri="{FF2B5EF4-FFF2-40B4-BE49-F238E27FC236}">
-                <a16:creationId xmlns:a16="http://schemas.microsoft.com/office/drawing/2014/main" id="{20A94597-87AA-482D-A4BF-545EA0215DBC}"/>
+                <a16:creationId xmlns="" xmlns:a16="http://schemas.microsoft.com/office/drawing/2014/main" id="{20A94597-87AA-482D-A4BF-545EA0215DBC}"/>
               </a:ext>
             </a:extLst>
           </p:cNvPr>
@@ -25515,7 +25509,7 @@
           <p:cNvPr id="5" name="CaixaDeTexto 4">
             <a:extLst>
               <a:ext uri="{FF2B5EF4-FFF2-40B4-BE49-F238E27FC236}">
-                <a16:creationId xmlns:a16="http://schemas.microsoft.com/office/drawing/2014/main" id="{1B8765AE-70BA-4CEF-A9F7-2847A44362F3}"/>
+                <a16:creationId xmlns="" xmlns:a16="http://schemas.microsoft.com/office/drawing/2014/main" id="{1B8765AE-70BA-4CEF-A9F7-2847A44362F3}"/>
               </a:ext>
             </a:extLst>
           </p:cNvPr>
@@ -25524,8 +25518,8 @@
         </p:nvSpPr>
         <p:spPr>
           <a:xfrm>
-            <a:off x="1624816" y="2459504"/>
-            <a:ext cx="8942365" cy="1938992"/>
+            <a:off x="1624814" y="2485262"/>
+            <a:ext cx="8942365" cy="1631216"/>
           </a:xfrm>
           <a:prstGeom prst="rect">
             <a:avLst/>
@@ -25539,30 +25533,12 @@
           <a:lstStyle/>
           <a:p>
             <a:r>
-              <a:rPr lang="pt-BR" sz="2000" b="1" dirty="0"/>
-              <a:t>Nome: </a:t>
-            </a:r>
-            <a:r>
-              <a:rPr lang="pt-BR" sz="2000" dirty="0" err="1"/>
-              <a:t>Isac</a:t>
-            </a:r>
-            <a:r>
-              <a:rPr lang="pt-BR" sz="2000" dirty="0"/>
-              <a:t> Moreira Campos</a:t>
+              <a:rPr lang="pt-BR" sz="2000" b="1" smtClean="0"/>
+              <a:t>Nome</a:t>
             </a:r>
             <a:r>
               <a:rPr lang="pt-BR" sz="2000" b="1" dirty="0"/>
-              <a:t>					RA: </a:t>
-            </a:r>
-            <a:r>
-              <a:rPr lang="pt-BR" sz="2000" dirty="0"/>
-              <a:t>1800451</a:t>
-            </a:r>
-          </a:p>
-          <a:p>
-            <a:r>
-              <a:rPr lang="pt-BR" sz="2000" b="1" dirty="0"/>
-              <a:t>Nome: </a:t>
+              <a:t>: </a:t>
             </a:r>
             <a:r>
               <a:rPr lang="pt-BR" sz="2000" dirty="0"/>
@@ -25686,7 +25662,7 @@
           <p:cNvPr id="37" name="Agrupar 36">
             <a:extLst>
               <a:ext uri="{FF2B5EF4-FFF2-40B4-BE49-F238E27FC236}">
-                <a16:creationId xmlns:a16="http://schemas.microsoft.com/office/drawing/2014/main" id="{AD55A375-5E96-4C62-9CC7-E8015B3E49AD}"/>
+                <a16:creationId xmlns="" xmlns:a16="http://schemas.microsoft.com/office/drawing/2014/main" id="{AD55A375-5E96-4C62-9CC7-E8015B3E49AD}"/>
               </a:ext>
             </a:extLst>
           </p:cNvPr>
@@ -25706,7 +25682,7 @@
             <p:cNvPr id="36" name="Agrupar 35">
               <a:extLst>
                 <a:ext uri="{FF2B5EF4-FFF2-40B4-BE49-F238E27FC236}">
-                  <a16:creationId xmlns:a16="http://schemas.microsoft.com/office/drawing/2014/main" id="{54346E9C-8BCE-4B2B-BE69-77638DB797FE}"/>
+                  <a16:creationId xmlns="" xmlns:a16="http://schemas.microsoft.com/office/drawing/2014/main" id="{54346E9C-8BCE-4B2B-BE69-77638DB797FE}"/>
                 </a:ext>
               </a:extLst>
             </p:cNvPr>
@@ -25726,7 +25702,7 @@
               <p:cNvPr id="4" name="Retângulo 3">
                 <a:extLst>
                   <a:ext uri="{FF2B5EF4-FFF2-40B4-BE49-F238E27FC236}">
-                    <a16:creationId xmlns:a16="http://schemas.microsoft.com/office/drawing/2014/main" id="{88C6BF1B-8B81-4A42-B266-9DF3168EF8CB}"/>
+                    <a16:creationId xmlns="" xmlns:a16="http://schemas.microsoft.com/office/drawing/2014/main" id="{88C6BF1B-8B81-4A42-B266-9DF3168EF8CB}"/>
                   </a:ext>
                 </a:extLst>
               </p:cNvPr>
@@ -25780,7 +25756,7 @@
               <p:cNvPr id="5" name="Conector de Seta Reta 4">
                 <a:extLst>
                   <a:ext uri="{FF2B5EF4-FFF2-40B4-BE49-F238E27FC236}">
-                    <a16:creationId xmlns:a16="http://schemas.microsoft.com/office/drawing/2014/main" id="{85E6B2C7-D043-4C92-898F-4F2DEE8A2690}"/>
+                    <a16:creationId xmlns="" xmlns:a16="http://schemas.microsoft.com/office/drawing/2014/main" id="{85E6B2C7-D043-4C92-898F-4F2DEE8A2690}"/>
                   </a:ext>
                 </a:extLst>
               </p:cNvPr>
@@ -25824,7 +25800,7 @@
             <p:cNvPr id="6" name="Conector de Seta Reta 5">
               <a:extLst>
                 <a:ext uri="{FF2B5EF4-FFF2-40B4-BE49-F238E27FC236}">
-                  <a16:creationId xmlns:a16="http://schemas.microsoft.com/office/drawing/2014/main" id="{9BACC1B6-2F2A-4248-B083-17CB87D6E5BE}"/>
+                  <a16:creationId xmlns="" xmlns:a16="http://schemas.microsoft.com/office/drawing/2014/main" id="{9BACC1B6-2F2A-4248-B083-17CB87D6E5BE}"/>
                 </a:ext>
               </a:extLst>
             </p:cNvPr>
@@ -25868,7 +25844,7 @@
           <p:cNvPr id="2" name="CaixaDeTexto 1">
             <a:extLst>
               <a:ext uri="{FF2B5EF4-FFF2-40B4-BE49-F238E27FC236}">
-                <a16:creationId xmlns:a16="http://schemas.microsoft.com/office/drawing/2014/main" id="{80F5CD5A-1914-4EF1-BE32-34B089486C2F}"/>
+                <a16:creationId xmlns="" xmlns:a16="http://schemas.microsoft.com/office/drawing/2014/main" id="{80F5CD5A-1914-4EF1-BE32-34B089486C2F}"/>
               </a:ext>
             </a:extLst>
           </p:cNvPr>
@@ -25909,7 +25885,7 @@
           <p:cNvPr id="44" name="Agrupar 43">
             <a:extLst>
               <a:ext uri="{FF2B5EF4-FFF2-40B4-BE49-F238E27FC236}">
-                <a16:creationId xmlns:a16="http://schemas.microsoft.com/office/drawing/2014/main" id="{BA6E27EE-CE85-4231-860A-EC8B217CE24F}"/>
+                <a16:creationId xmlns="" xmlns:a16="http://schemas.microsoft.com/office/drawing/2014/main" id="{BA6E27EE-CE85-4231-860A-EC8B217CE24F}"/>
               </a:ext>
             </a:extLst>
           </p:cNvPr>
@@ -25929,7 +25905,7 @@
             <p:cNvPr id="8" name="Retângulo 7">
               <a:extLst>
                 <a:ext uri="{FF2B5EF4-FFF2-40B4-BE49-F238E27FC236}">
-                  <a16:creationId xmlns:a16="http://schemas.microsoft.com/office/drawing/2014/main" id="{5941647A-72D6-4138-BD44-C48D31273AB1}"/>
+                  <a16:creationId xmlns="" xmlns:a16="http://schemas.microsoft.com/office/drawing/2014/main" id="{5941647A-72D6-4138-BD44-C48D31273AB1}"/>
                 </a:ext>
               </a:extLst>
             </p:cNvPr>
@@ -25983,7 +25959,7 @@
             <p:cNvPr id="9" name="CaixaDeTexto 1">
               <a:extLst>
                 <a:ext uri="{FF2B5EF4-FFF2-40B4-BE49-F238E27FC236}">
-                  <a16:creationId xmlns:a16="http://schemas.microsoft.com/office/drawing/2014/main" id="{7994EBAF-0D7D-41FB-B228-383D0E67FB6C}"/>
+                  <a16:creationId xmlns="" xmlns:a16="http://schemas.microsoft.com/office/drawing/2014/main" id="{7994EBAF-0D7D-41FB-B228-383D0E67FB6C}"/>
                 </a:ext>
               </a:extLst>
             </p:cNvPr>
@@ -26120,7 +26096,7 @@
           <p:cNvPr id="45" name="Agrupar 44">
             <a:extLst>
               <a:ext uri="{FF2B5EF4-FFF2-40B4-BE49-F238E27FC236}">
-                <a16:creationId xmlns:a16="http://schemas.microsoft.com/office/drawing/2014/main" id="{A39C0BD4-A4A9-4C34-878E-6105488207AF}"/>
+                <a16:creationId xmlns="" xmlns:a16="http://schemas.microsoft.com/office/drawing/2014/main" id="{A39C0BD4-A4A9-4C34-878E-6105488207AF}"/>
               </a:ext>
             </a:extLst>
           </p:cNvPr>
@@ -26140,7 +26116,7 @@
             <p:cNvPr id="10" name="Retângulo 9">
               <a:extLst>
                 <a:ext uri="{FF2B5EF4-FFF2-40B4-BE49-F238E27FC236}">
-                  <a16:creationId xmlns:a16="http://schemas.microsoft.com/office/drawing/2014/main" id="{971BC70D-B8E4-4A17-B17F-86055154C60C}"/>
+                  <a16:creationId xmlns="" xmlns:a16="http://schemas.microsoft.com/office/drawing/2014/main" id="{971BC70D-B8E4-4A17-B17F-86055154C60C}"/>
                 </a:ext>
               </a:extLst>
             </p:cNvPr>
@@ -26194,7 +26170,7 @@
             <p:cNvPr id="11" name="CaixaDeTexto 1">
               <a:extLst>
                 <a:ext uri="{FF2B5EF4-FFF2-40B4-BE49-F238E27FC236}">
-                  <a16:creationId xmlns:a16="http://schemas.microsoft.com/office/drawing/2014/main" id="{F77E377A-2299-45F1-BD65-AD221DB0412C}"/>
+                  <a16:creationId xmlns="" xmlns:a16="http://schemas.microsoft.com/office/drawing/2014/main" id="{F77E377A-2299-45F1-BD65-AD221DB0412C}"/>
                 </a:ext>
               </a:extLst>
             </p:cNvPr>
@@ -26331,7 +26307,7 @@
           <p:cNvPr id="42" name="Agrupar 41">
             <a:extLst>
               <a:ext uri="{FF2B5EF4-FFF2-40B4-BE49-F238E27FC236}">
-                <a16:creationId xmlns:a16="http://schemas.microsoft.com/office/drawing/2014/main" id="{15ED0C22-7BEF-404D-8355-9C9D373C2B51}"/>
+                <a16:creationId xmlns="" xmlns:a16="http://schemas.microsoft.com/office/drawing/2014/main" id="{15ED0C22-7BEF-404D-8355-9C9D373C2B51}"/>
               </a:ext>
             </a:extLst>
           </p:cNvPr>
@@ -26351,7 +26327,7 @@
             <p:cNvPr id="13" name="Imagem 6" descr="Uma imagem contendo objeto&#10;&#10;Descrição gerada com muito alta confiança">
               <a:extLst>
                 <a:ext uri="{FF2B5EF4-FFF2-40B4-BE49-F238E27FC236}">
-                  <a16:creationId xmlns:a16="http://schemas.microsoft.com/office/drawing/2014/main" id="{63824687-0B05-4413-8D3C-5E29C9702638}"/>
+                  <a16:creationId xmlns="" xmlns:a16="http://schemas.microsoft.com/office/drawing/2014/main" id="{63824687-0B05-4413-8D3C-5E29C9702638}"/>
                 </a:ext>
               </a:extLst>
             </p:cNvPr>
@@ -26381,7 +26357,7 @@
             <p:cNvPr id="16" name="CaixaDeTexto 15">
               <a:extLst>
                 <a:ext uri="{FF2B5EF4-FFF2-40B4-BE49-F238E27FC236}">
-                  <a16:creationId xmlns:a16="http://schemas.microsoft.com/office/drawing/2014/main" id="{FDA29973-2090-478C-8CFB-2DD1F5F78F5A}"/>
+                  <a16:creationId xmlns="" xmlns:a16="http://schemas.microsoft.com/office/drawing/2014/main" id="{FDA29973-2090-478C-8CFB-2DD1F5F78F5A}"/>
                 </a:ext>
               </a:extLst>
             </p:cNvPr>
@@ -26420,7 +26396,7 @@
           <p:cNvPr id="43" name="Agrupar 42">
             <a:extLst>
               <a:ext uri="{FF2B5EF4-FFF2-40B4-BE49-F238E27FC236}">
-                <a16:creationId xmlns:a16="http://schemas.microsoft.com/office/drawing/2014/main" id="{9DB1F885-85FC-4032-BAA2-BCB1EBAE1904}"/>
+                <a16:creationId xmlns="" xmlns:a16="http://schemas.microsoft.com/office/drawing/2014/main" id="{9DB1F885-85FC-4032-BAA2-BCB1EBAE1904}"/>
               </a:ext>
             </a:extLst>
           </p:cNvPr>
@@ -26440,7 +26416,7 @@
             <p:cNvPr id="14" name="Imagem 6" descr="Uma imagem contendo objeto&#10;&#10;Descrição gerada com muito alta confiança">
               <a:extLst>
                 <a:ext uri="{FF2B5EF4-FFF2-40B4-BE49-F238E27FC236}">
-                  <a16:creationId xmlns:a16="http://schemas.microsoft.com/office/drawing/2014/main" id="{DBED1A96-C999-457A-8F32-18571E67930B}"/>
+                  <a16:creationId xmlns="" xmlns:a16="http://schemas.microsoft.com/office/drawing/2014/main" id="{DBED1A96-C999-457A-8F32-18571E67930B}"/>
                 </a:ext>
               </a:extLst>
             </p:cNvPr>
@@ -26470,7 +26446,7 @@
             <p:cNvPr id="18" name="CaixaDeTexto 17">
               <a:extLst>
                 <a:ext uri="{FF2B5EF4-FFF2-40B4-BE49-F238E27FC236}">
-                  <a16:creationId xmlns:a16="http://schemas.microsoft.com/office/drawing/2014/main" id="{4A840F81-AC70-4925-A6AF-06B2ECF11F52}"/>
+                  <a16:creationId xmlns="" xmlns:a16="http://schemas.microsoft.com/office/drawing/2014/main" id="{4A840F81-AC70-4925-A6AF-06B2ECF11F52}"/>
                 </a:ext>
               </a:extLst>
             </p:cNvPr>
@@ -26514,7 +26490,7 @@
           <p:cNvPr id="19" name="Conector de Seta Reta 18">
             <a:extLst>
               <a:ext uri="{FF2B5EF4-FFF2-40B4-BE49-F238E27FC236}">
-                <a16:creationId xmlns:a16="http://schemas.microsoft.com/office/drawing/2014/main" id="{7053101E-BA41-4AFA-90EB-5F30E05D5C2A}"/>
+                <a16:creationId xmlns="" xmlns:a16="http://schemas.microsoft.com/office/drawing/2014/main" id="{7053101E-BA41-4AFA-90EB-5F30E05D5C2A}"/>
               </a:ext>
             </a:extLst>
           </p:cNvPr>
@@ -26558,7 +26534,7 @@
           <p:cNvPr id="20" name="Conector de Seta Reta 19">
             <a:extLst>
               <a:ext uri="{FF2B5EF4-FFF2-40B4-BE49-F238E27FC236}">
-                <a16:creationId xmlns:a16="http://schemas.microsoft.com/office/drawing/2014/main" id="{972CCC72-617F-4D78-B3FE-1B11C03D20E1}"/>
+                <a16:creationId xmlns="" xmlns:a16="http://schemas.microsoft.com/office/drawing/2014/main" id="{972CCC72-617F-4D78-B3FE-1B11C03D20E1}"/>
               </a:ext>
             </a:extLst>
           </p:cNvPr>
@@ -26602,7 +26578,7 @@
           <p:cNvPr id="21" name="Conector de Seta Reta 20">
             <a:extLst>
               <a:ext uri="{FF2B5EF4-FFF2-40B4-BE49-F238E27FC236}">
-                <a16:creationId xmlns:a16="http://schemas.microsoft.com/office/drawing/2014/main" id="{EA66EA41-B19F-44A8-87CD-EFADB016E3DD}"/>
+                <a16:creationId xmlns="" xmlns:a16="http://schemas.microsoft.com/office/drawing/2014/main" id="{EA66EA41-B19F-44A8-87CD-EFADB016E3DD}"/>
               </a:ext>
             </a:extLst>
           </p:cNvPr>
@@ -26646,7 +26622,7 @@
           <p:cNvPr id="22" name="Conector de Seta Reta 21">
             <a:extLst>
               <a:ext uri="{FF2B5EF4-FFF2-40B4-BE49-F238E27FC236}">
-                <a16:creationId xmlns:a16="http://schemas.microsoft.com/office/drawing/2014/main" id="{317BB5CC-C5DD-4E1C-9FC9-A8537615FAD0}"/>
+                <a16:creationId xmlns="" xmlns:a16="http://schemas.microsoft.com/office/drawing/2014/main" id="{317BB5CC-C5DD-4E1C-9FC9-A8537615FAD0}"/>
               </a:ext>
             </a:extLst>
           </p:cNvPr>
@@ -26690,7 +26666,7 @@
           <p:cNvPr id="23" name="Conector de Seta Reta 22">
             <a:extLst>
               <a:ext uri="{FF2B5EF4-FFF2-40B4-BE49-F238E27FC236}">
-                <a16:creationId xmlns:a16="http://schemas.microsoft.com/office/drawing/2014/main" id="{6F2A4F03-C5E4-40D7-AA81-EDDBC7B02437}"/>
+                <a16:creationId xmlns="" xmlns:a16="http://schemas.microsoft.com/office/drawing/2014/main" id="{6F2A4F03-C5E4-40D7-AA81-EDDBC7B02437}"/>
               </a:ext>
             </a:extLst>
           </p:cNvPr>
@@ -26734,7 +26710,7 @@
           <p:cNvPr id="27" name="Conector de Seta Reta 26">
             <a:extLst>
               <a:ext uri="{FF2B5EF4-FFF2-40B4-BE49-F238E27FC236}">
-                <a16:creationId xmlns:a16="http://schemas.microsoft.com/office/drawing/2014/main" id="{569658DA-03D1-4969-9E0E-3405A27FE72E}"/>
+                <a16:creationId xmlns="" xmlns:a16="http://schemas.microsoft.com/office/drawing/2014/main" id="{569658DA-03D1-4969-9E0E-3405A27FE72E}"/>
               </a:ext>
             </a:extLst>
           </p:cNvPr>
@@ -26778,7 +26754,7 @@
           <p:cNvPr id="3" name="CaixaDeTexto 2">
             <a:extLst>
               <a:ext uri="{FF2B5EF4-FFF2-40B4-BE49-F238E27FC236}">
-                <a16:creationId xmlns:a16="http://schemas.microsoft.com/office/drawing/2014/main" id="{7FCA1908-EC09-46BB-B633-12D671CD2244}"/>
+                <a16:creationId xmlns="" xmlns:a16="http://schemas.microsoft.com/office/drawing/2014/main" id="{7FCA1908-EC09-46BB-B633-12D671CD2244}"/>
               </a:ext>
             </a:extLst>
           </p:cNvPr>
@@ -26819,7 +26795,7 @@
           <p:cNvPr id="7" name="CaixaDeTexto 6">
             <a:extLst>
               <a:ext uri="{FF2B5EF4-FFF2-40B4-BE49-F238E27FC236}">
-                <a16:creationId xmlns:a16="http://schemas.microsoft.com/office/drawing/2014/main" id="{BF0B844E-C924-4EC3-B27F-D0C0220E391A}"/>
+                <a16:creationId xmlns="" xmlns:a16="http://schemas.microsoft.com/office/drawing/2014/main" id="{BF0B844E-C924-4EC3-B27F-D0C0220E391A}"/>
               </a:ext>
             </a:extLst>
           </p:cNvPr>
@@ -26858,7 +26834,7 @@
           <p:cNvPr id="30" name="Agrupar 29">
             <a:extLst>
               <a:ext uri="{FF2B5EF4-FFF2-40B4-BE49-F238E27FC236}">
-                <a16:creationId xmlns:a16="http://schemas.microsoft.com/office/drawing/2014/main" id="{55A6F1EE-B3B9-4AD3-A189-E3913427B6B6}"/>
+                <a16:creationId xmlns="" xmlns:a16="http://schemas.microsoft.com/office/drawing/2014/main" id="{55A6F1EE-B3B9-4AD3-A189-E3913427B6B6}"/>
               </a:ext>
             </a:extLst>
           </p:cNvPr>
@@ -26878,7 +26854,7 @@
             <p:cNvPr id="28" name="CaixaDeTexto 27">
               <a:extLst>
                 <a:ext uri="{FF2B5EF4-FFF2-40B4-BE49-F238E27FC236}">
-                  <a16:creationId xmlns:a16="http://schemas.microsoft.com/office/drawing/2014/main" id="{06F24E56-56C0-48DE-B993-B1CF84033F10}"/>
+                  <a16:creationId xmlns="" xmlns:a16="http://schemas.microsoft.com/office/drawing/2014/main" id="{06F24E56-56C0-48DE-B993-B1CF84033F10}"/>
                 </a:ext>
               </a:extLst>
             </p:cNvPr>
@@ -26942,7 +26918,7 @@
             <p:cNvPr id="34" name="Retângulo 33">
               <a:extLst>
                 <a:ext uri="{FF2B5EF4-FFF2-40B4-BE49-F238E27FC236}">
-                  <a16:creationId xmlns:a16="http://schemas.microsoft.com/office/drawing/2014/main" id="{07B5FAAB-A3BD-4418-A9BF-1694D728EFC3}"/>
+                  <a16:creationId xmlns="" xmlns:a16="http://schemas.microsoft.com/office/drawing/2014/main" id="{07B5FAAB-A3BD-4418-A9BF-1694D728EFC3}"/>
                 </a:ext>
               </a:extLst>
             </p:cNvPr>
@@ -27001,7 +26977,7 @@
           <p:cNvPr id="31" name="Agrupar 30">
             <a:extLst>
               <a:ext uri="{FF2B5EF4-FFF2-40B4-BE49-F238E27FC236}">
-                <a16:creationId xmlns:a16="http://schemas.microsoft.com/office/drawing/2014/main" id="{C4062237-DD02-40B3-AC9C-B89D60A767B8}"/>
+                <a16:creationId xmlns="" xmlns:a16="http://schemas.microsoft.com/office/drawing/2014/main" id="{C4062237-DD02-40B3-AC9C-B89D60A767B8}"/>
               </a:ext>
             </a:extLst>
           </p:cNvPr>
@@ -27021,7 +26997,7 @@
             <p:cNvPr id="32" name="CaixaDeTexto 31">
               <a:extLst>
                 <a:ext uri="{FF2B5EF4-FFF2-40B4-BE49-F238E27FC236}">
-                  <a16:creationId xmlns:a16="http://schemas.microsoft.com/office/drawing/2014/main" id="{566CD485-09EF-48E1-86C5-9CA202611613}"/>
+                  <a16:creationId xmlns="" xmlns:a16="http://schemas.microsoft.com/office/drawing/2014/main" id="{566CD485-09EF-48E1-86C5-9CA202611613}"/>
                 </a:ext>
               </a:extLst>
             </p:cNvPr>
@@ -27097,7 +27073,7 @@
             <p:cNvPr id="35" name="Retângulo 34">
               <a:extLst>
                 <a:ext uri="{FF2B5EF4-FFF2-40B4-BE49-F238E27FC236}">
-                  <a16:creationId xmlns:a16="http://schemas.microsoft.com/office/drawing/2014/main" id="{BD6C4BD0-D5BB-4786-BF71-1D992016DC45}"/>
+                  <a16:creationId xmlns="" xmlns:a16="http://schemas.microsoft.com/office/drawing/2014/main" id="{BD6C4BD0-D5BB-4786-BF71-1D992016DC45}"/>
                 </a:ext>
               </a:extLst>
             </p:cNvPr>
@@ -27180,7 +27156,7 @@
           <p:cNvPr id="4" name="Retângulo 3">
             <a:extLst>
               <a:ext uri="{FF2B5EF4-FFF2-40B4-BE49-F238E27FC236}">
-                <a16:creationId xmlns:a16="http://schemas.microsoft.com/office/drawing/2014/main" id="{88C6BF1B-8B81-4A42-B266-9DF3168EF8CB}"/>
+                <a16:creationId xmlns="" xmlns:a16="http://schemas.microsoft.com/office/drawing/2014/main" id="{88C6BF1B-8B81-4A42-B266-9DF3168EF8CB}"/>
               </a:ext>
             </a:extLst>
           </p:cNvPr>
@@ -27234,7 +27210,7 @@
           <p:cNvPr id="2" name="CaixaDeTexto 1">
             <a:extLst>
               <a:ext uri="{FF2B5EF4-FFF2-40B4-BE49-F238E27FC236}">
-                <a16:creationId xmlns:a16="http://schemas.microsoft.com/office/drawing/2014/main" id="{80F5CD5A-1914-4EF1-BE32-34B089486C2F}"/>
+                <a16:creationId xmlns="" xmlns:a16="http://schemas.microsoft.com/office/drawing/2014/main" id="{80F5CD5A-1914-4EF1-BE32-34B089486C2F}"/>
               </a:ext>
             </a:extLst>
           </p:cNvPr>
@@ -27275,7 +27251,7 @@
           <p:cNvPr id="3" name="Imagem 6" descr="Uma imagem contendo objeto&#10;&#10;Descrição gerada com muito alta confiança">
             <a:extLst>
               <a:ext uri="{FF2B5EF4-FFF2-40B4-BE49-F238E27FC236}">
-                <a16:creationId xmlns:a16="http://schemas.microsoft.com/office/drawing/2014/main" id="{3A958C51-9DB6-409A-8BCE-A5C77D3B1354}"/>
+                <a16:creationId xmlns="" xmlns:a16="http://schemas.microsoft.com/office/drawing/2014/main" id="{3A958C51-9DB6-409A-8BCE-A5C77D3B1354}"/>
               </a:ext>
             </a:extLst>
           </p:cNvPr>
@@ -27305,7 +27281,7 @@
           <p:cNvPr id="7" name="Retângulo 6">
             <a:extLst>
               <a:ext uri="{FF2B5EF4-FFF2-40B4-BE49-F238E27FC236}">
-                <a16:creationId xmlns:a16="http://schemas.microsoft.com/office/drawing/2014/main" id="{89094DE6-756F-4A82-8A95-1CBED37E87E2}"/>
+                <a16:creationId xmlns="" xmlns:a16="http://schemas.microsoft.com/office/drawing/2014/main" id="{89094DE6-756F-4A82-8A95-1CBED37E87E2}"/>
               </a:ext>
             </a:extLst>
           </p:cNvPr>
@@ -27354,7 +27330,7 @@
           <p:cNvPr id="9" name="Retângulo 8">
             <a:extLst>
               <a:ext uri="{FF2B5EF4-FFF2-40B4-BE49-F238E27FC236}">
-                <a16:creationId xmlns:a16="http://schemas.microsoft.com/office/drawing/2014/main" id="{407F5294-A287-4708-8220-29D5D97DEE86}"/>
+                <a16:creationId xmlns="" xmlns:a16="http://schemas.microsoft.com/office/drawing/2014/main" id="{407F5294-A287-4708-8220-29D5D97DEE86}"/>
               </a:ext>
             </a:extLst>
           </p:cNvPr>
@@ -27403,7 +27379,7 @@
           <p:cNvPr id="11" name="Retângulo 10">
             <a:extLst>
               <a:ext uri="{FF2B5EF4-FFF2-40B4-BE49-F238E27FC236}">
-                <a16:creationId xmlns:a16="http://schemas.microsoft.com/office/drawing/2014/main" id="{8CCE9E41-DF19-4539-AEB2-C83DDB8D015A}"/>
+                <a16:creationId xmlns="" xmlns:a16="http://schemas.microsoft.com/office/drawing/2014/main" id="{8CCE9E41-DF19-4539-AEB2-C83DDB8D015A}"/>
               </a:ext>
             </a:extLst>
           </p:cNvPr>
@@ -27452,7 +27428,7 @@
           <p:cNvPr id="13" name="CaixaDeTexto 12">
             <a:extLst>
               <a:ext uri="{FF2B5EF4-FFF2-40B4-BE49-F238E27FC236}">
-                <a16:creationId xmlns:a16="http://schemas.microsoft.com/office/drawing/2014/main" id="{36A1F85B-7B7F-4EB2-A921-5BDA85D5F006}"/>
+                <a16:creationId xmlns="" xmlns:a16="http://schemas.microsoft.com/office/drawing/2014/main" id="{36A1F85B-7B7F-4EB2-A921-5BDA85D5F006}"/>
               </a:ext>
             </a:extLst>
           </p:cNvPr>
@@ -27494,7 +27470,7 @@
           <p:cNvPr id="15" name="CaixaDeTexto 14">
             <a:extLst>
               <a:ext uri="{FF2B5EF4-FFF2-40B4-BE49-F238E27FC236}">
-                <a16:creationId xmlns:a16="http://schemas.microsoft.com/office/drawing/2014/main" id="{F4835543-02C9-4F7E-942E-19AA80F41074}"/>
+                <a16:creationId xmlns="" xmlns:a16="http://schemas.microsoft.com/office/drawing/2014/main" id="{F4835543-02C9-4F7E-942E-19AA80F41074}"/>
               </a:ext>
             </a:extLst>
           </p:cNvPr>
@@ -27534,7 +27510,7 @@
           <p:cNvPr id="17" name="Conector de Seta Reta 16">
             <a:extLst>
               <a:ext uri="{FF2B5EF4-FFF2-40B4-BE49-F238E27FC236}">
-                <a16:creationId xmlns:a16="http://schemas.microsoft.com/office/drawing/2014/main" id="{411AA6B9-507C-44D4-9959-3C997B8CBC1D}"/>
+                <a16:creationId xmlns="" xmlns:a16="http://schemas.microsoft.com/office/drawing/2014/main" id="{411AA6B9-507C-44D4-9959-3C997B8CBC1D}"/>
               </a:ext>
             </a:extLst>
           </p:cNvPr>
@@ -27576,7 +27552,7 @@
           <p:cNvPr id="19" name="Conector de Seta Reta 18">
             <a:extLst>
               <a:ext uri="{FF2B5EF4-FFF2-40B4-BE49-F238E27FC236}">
-                <a16:creationId xmlns:a16="http://schemas.microsoft.com/office/drawing/2014/main" id="{93EB990D-C099-4555-BD11-426E6E8EE67F}"/>
+                <a16:creationId xmlns="" xmlns:a16="http://schemas.microsoft.com/office/drawing/2014/main" id="{93EB990D-C099-4555-BD11-426E6E8EE67F}"/>
               </a:ext>
             </a:extLst>
           </p:cNvPr>
@@ -27620,7 +27596,7 @@
           <p:cNvPr id="21" name="CaixaDeTexto 20">
             <a:extLst>
               <a:ext uri="{FF2B5EF4-FFF2-40B4-BE49-F238E27FC236}">
-                <a16:creationId xmlns:a16="http://schemas.microsoft.com/office/drawing/2014/main" id="{DDB3C006-F399-4DA0-84A7-14D02AA99AD9}"/>
+                <a16:creationId xmlns="" xmlns:a16="http://schemas.microsoft.com/office/drawing/2014/main" id="{DDB3C006-F399-4DA0-84A7-14D02AA99AD9}"/>
               </a:ext>
             </a:extLst>
           </p:cNvPr>
@@ -27660,7 +27636,7 @@
           <p:cNvPr id="23" name="CaixaDeTexto 22">
             <a:extLst>
               <a:ext uri="{FF2B5EF4-FFF2-40B4-BE49-F238E27FC236}">
-                <a16:creationId xmlns:a16="http://schemas.microsoft.com/office/drawing/2014/main" id="{EDDF8BE8-BC1F-46BC-9872-A1A48F87BFAC}"/>
+                <a16:creationId xmlns="" xmlns:a16="http://schemas.microsoft.com/office/drawing/2014/main" id="{EDDF8BE8-BC1F-46BC-9872-A1A48F87BFAC}"/>
               </a:ext>
             </a:extLst>
           </p:cNvPr>
@@ -27728,7 +27704,7 @@
           <p:cNvPr id="4" name="Retângulo 3">
             <a:extLst>
               <a:ext uri="{FF2B5EF4-FFF2-40B4-BE49-F238E27FC236}">
-                <a16:creationId xmlns:a16="http://schemas.microsoft.com/office/drawing/2014/main" id="{88C6BF1B-8B81-4A42-B266-9DF3168EF8CB}"/>
+                <a16:creationId xmlns="" xmlns:a16="http://schemas.microsoft.com/office/drawing/2014/main" id="{88C6BF1B-8B81-4A42-B266-9DF3168EF8CB}"/>
               </a:ext>
             </a:extLst>
           </p:cNvPr>
@@ -27782,7 +27758,7 @@
           <p:cNvPr id="2" name="CaixaDeTexto 1">
             <a:extLst>
               <a:ext uri="{FF2B5EF4-FFF2-40B4-BE49-F238E27FC236}">
-                <a16:creationId xmlns:a16="http://schemas.microsoft.com/office/drawing/2014/main" id="{80F5CD5A-1914-4EF1-BE32-34B089486C2F}"/>
+                <a16:creationId xmlns="" xmlns:a16="http://schemas.microsoft.com/office/drawing/2014/main" id="{80F5CD5A-1914-4EF1-BE32-34B089486C2F}"/>
               </a:ext>
             </a:extLst>
           </p:cNvPr>
@@ -27823,7 +27799,7 @@
           <p:cNvPr id="5" name="Conector de Seta Reta 4">
             <a:extLst>
               <a:ext uri="{FF2B5EF4-FFF2-40B4-BE49-F238E27FC236}">
-                <a16:creationId xmlns:a16="http://schemas.microsoft.com/office/drawing/2014/main" id="{85E6B2C7-D043-4C92-898F-4F2DEE8A2690}"/>
+                <a16:creationId xmlns="" xmlns:a16="http://schemas.microsoft.com/office/drawing/2014/main" id="{85E6B2C7-D043-4C92-898F-4F2DEE8A2690}"/>
               </a:ext>
             </a:extLst>
           </p:cNvPr>
@@ -27864,7 +27840,7 @@
           <p:cNvPr id="6" name="Conector de Seta Reta 5">
             <a:extLst>
               <a:ext uri="{FF2B5EF4-FFF2-40B4-BE49-F238E27FC236}">
-                <a16:creationId xmlns:a16="http://schemas.microsoft.com/office/drawing/2014/main" id="{9BACC1B6-2F2A-4248-B083-17CB87D6E5BE}"/>
+                <a16:creationId xmlns="" xmlns:a16="http://schemas.microsoft.com/office/drawing/2014/main" id="{9BACC1B6-2F2A-4248-B083-17CB87D6E5BE}"/>
               </a:ext>
             </a:extLst>
           </p:cNvPr>
@@ -27907,7 +27883,7 @@
           <p:cNvPr id="43" name="Agrupar 42">
             <a:extLst>
               <a:ext uri="{FF2B5EF4-FFF2-40B4-BE49-F238E27FC236}">
-                <a16:creationId xmlns:a16="http://schemas.microsoft.com/office/drawing/2014/main" id="{BF28B680-1403-498E-B98E-3F47E1CD4F15}"/>
+                <a16:creationId xmlns="" xmlns:a16="http://schemas.microsoft.com/office/drawing/2014/main" id="{BF28B680-1403-498E-B98E-3F47E1CD4F15}"/>
               </a:ext>
             </a:extLst>
           </p:cNvPr>
@@ -27927,7 +27903,7 @@
             <p:cNvPr id="8" name="Retângulo 7">
               <a:extLst>
                 <a:ext uri="{FF2B5EF4-FFF2-40B4-BE49-F238E27FC236}">
-                  <a16:creationId xmlns:a16="http://schemas.microsoft.com/office/drawing/2014/main" id="{5941647A-72D6-4138-BD44-C48D31273AB1}"/>
+                  <a16:creationId xmlns="" xmlns:a16="http://schemas.microsoft.com/office/drawing/2014/main" id="{5941647A-72D6-4138-BD44-C48D31273AB1}"/>
                 </a:ext>
               </a:extLst>
             </p:cNvPr>
@@ -27981,7 +27957,7 @@
             <p:cNvPr id="9" name="CaixaDeTexto 1">
               <a:extLst>
                 <a:ext uri="{FF2B5EF4-FFF2-40B4-BE49-F238E27FC236}">
-                  <a16:creationId xmlns:a16="http://schemas.microsoft.com/office/drawing/2014/main" id="{7994EBAF-0D7D-41FB-B228-383D0E67FB6C}"/>
+                  <a16:creationId xmlns="" xmlns:a16="http://schemas.microsoft.com/office/drawing/2014/main" id="{7994EBAF-0D7D-41FB-B228-383D0E67FB6C}"/>
                 </a:ext>
               </a:extLst>
             </p:cNvPr>
@@ -28115,7 +28091,7 @@
           <p:cNvPr id="41" name="Agrupar 40">
             <a:extLst>
               <a:ext uri="{FF2B5EF4-FFF2-40B4-BE49-F238E27FC236}">
-                <a16:creationId xmlns:a16="http://schemas.microsoft.com/office/drawing/2014/main" id="{8B089574-4BAD-41C0-AB24-A3288FD76E68}"/>
+                <a16:creationId xmlns="" xmlns:a16="http://schemas.microsoft.com/office/drawing/2014/main" id="{8B089574-4BAD-41C0-AB24-A3288FD76E68}"/>
               </a:ext>
             </a:extLst>
           </p:cNvPr>
@@ -28135,7 +28111,7 @@
             <p:cNvPr id="13" name="Imagem 6" descr="Uma imagem contendo objeto&#10;&#10;Descrição gerada com muito alta confiança">
               <a:extLst>
                 <a:ext uri="{FF2B5EF4-FFF2-40B4-BE49-F238E27FC236}">
-                  <a16:creationId xmlns:a16="http://schemas.microsoft.com/office/drawing/2014/main" id="{63824687-0B05-4413-8D3C-5E29C9702638}"/>
+                  <a16:creationId xmlns="" xmlns:a16="http://schemas.microsoft.com/office/drawing/2014/main" id="{63824687-0B05-4413-8D3C-5E29C9702638}"/>
                 </a:ext>
               </a:extLst>
             </p:cNvPr>
@@ -28165,7 +28141,7 @@
             <p:cNvPr id="16" name="CaixaDeTexto 15">
               <a:extLst>
                 <a:ext uri="{FF2B5EF4-FFF2-40B4-BE49-F238E27FC236}">
-                  <a16:creationId xmlns:a16="http://schemas.microsoft.com/office/drawing/2014/main" id="{FDA29973-2090-478C-8CFB-2DD1F5F78F5A}"/>
+                  <a16:creationId xmlns="" xmlns:a16="http://schemas.microsoft.com/office/drawing/2014/main" id="{FDA29973-2090-478C-8CFB-2DD1F5F78F5A}"/>
                 </a:ext>
               </a:extLst>
             </p:cNvPr>
@@ -28203,7 +28179,7 @@
           <p:cNvPr id="42" name="Agrupar 41">
             <a:extLst>
               <a:ext uri="{FF2B5EF4-FFF2-40B4-BE49-F238E27FC236}">
-                <a16:creationId xmlns:a16="http://schemas.microsoft.com/office/drawing/2014/main" id="{3B35F1CD-5913-439D-8C83-786B18E01404}"/>
+                <a16:creationId xmlns="" xmlns:a16="http://schemas.microsoft.com/office/drawing/2014/main" id="{3B35F1CD-5913-439D-8C83-786B18E01404}"/>
               </a:ext>
             </a:extLst>
           </p:cNvPr>
@@ -28223,7 +28199,7 @@
             <p:cNvPr id="14" name="Imagem 6" descr="Uma imagem contendo objeto&#10;&#10;Descrição gerada com muito alta confiança">
               <a:extLst>
                 <a:ext uri="{FF2B5EF4-FFF2-40B4-BE49-F238E27FC236}">
-                  <a16:creationId xmlns:a16="http://schemas.microsoft.com/office/drawing/2014/main" id="{DBED1A96-C999-457A-8F32-18571E67930B}"/>
+                  <a16:creationId xmlns="" xmlns:a16="http://schemas.microsoft.com/office/drawing/2014/main" id="{DBED1A96-C999-457A-8F32-18571E67930B}"/>
                 </a:ext>
               </a:extLst>
             </p:cNvPr>
@@ -28253,7 +28229,7 @@
             <p:cNvPr id="18" name="CaixaDeTexto 17">
               <a:extLst>
                 <a:ext uri="{FF2B5EF4-FFF2-40B4-BE49-F238E27FC236}">
-                  <a16:creationId xmlns:a16="http://schemas.microsoft.com/office/drawing/2014/main" id="{4A840F81-AC70-4925-A6AF-06B2ECF11F52}"/>
+                  <a16:creationId xmlns="" xmlns:a16="http://schemas.microsoft.com/office/drawing/2014/main" id="{4A840F81-AC70-4925-A6AF-06B2ECF11F52}"/>
                 </a:ext>
               </a:extLst>
             </p:cNvPr>
@@ -28292,7 +28268,7 @@
           <p:cNvPr id="19" name="Conector de Seta Reta 18">
             <a:extLst>
               <a:ext uri="{FF2B5EF4-FFF2-40B4-BE49-F238E27FC236}">
-                <a16:creationId xmlns:a16="http://schemas.microsoft.com/office/drawing/2014/main" id="{7053101E-BA41-4AFA-90EB-5F30E05D5C2A}"/>
+                <a16:creationId xmlns="" xmlns:a16="http://schemas.microsoft.com/office/drawing/2014/main" id="{7053101E-BA41-4AFA-90EB-5F30E05D5C2A}"/>
               </a:ext>
             </a:extLst>
           </p:cNvPr>
@@ -28336,7 +28312,7 @@
           <p:cNvPr id="20" name="Conector de Seta Reta 19">
             <a:extLst>
               <a:ext uri="{FF2B5EF4-FFF2-40B4-BE49-F238E27FC236}">
-                <a16:creationId xmlns:a16="http://schemas.microsoft.com/office/drawing/2014/main" id="{972CCC72-617F-4D78-B3FE-1B11C03D20E1}"/>
+                <a16:creationId xmlns="" xmlns:a16="http://schemas.microsoft.com/office/drawing/2014/main" id="{972CCC72-617F-4D78-B3FE-1B11C03D20E1}"/>
               </a:ext>
             </a:extLst>
           </p:cNvPr>
@@ -28380,7 +28356,7 @@
           <p:cNvPr id="21" name="Conector de Seta Reta 20">
             <a:extLst>
               <a:ext uri="{FF2B5EF4-FFF2-40B4-BE49-F238E27FC236}">
-                <a16:creationId xmlns:a16="http://schemas.microsoft.com/office/drawing/2014/main" id="{EA66EA41-B19F-44A8-87CD-EFADB016E3DD}"/>
+                <a16:creationId xmlns="" xmlns:a16="http://schemas.microsoft.com/office/drawing/2014/main" id="{EA66EA41-B19F-44A8-87CD-EFADB016E3DD}"/>
               </a:ext>
             </a:extLst>
           </p:cNvPr>
@@ -28424,7 +28400,7 @@
           <p:cNvPr id="22" name="Conector de Seta Reta 21">
             <a:extLst>
               <a:ext uri="{FF2B5EF4-FFF2-40B4-BE49-F238E27FC236}">
-                <a16:creationId xmlns:a16="http://schemas.microsoft.com/office/drawing/2014/main" id="{317BB5CC-C5DD-4E1C-9FC9-A8537615FAD0}"/>
+                <a16:creationId xmlns="" xmlns:a16="http://schemas.microsoft.com/office/drawing/2014/main" id="{317BB5CC-C5DD-4E1C-9FC9-A8537615FAD0}"/>
               </a:ext>
             </a:extLst>
           </p:cNvPr>
@@ -28468,7 +28444,7 @@
           <p:cNvPr id="3" name="CaixaDeTexto 2">
             <a:extLst>
               <a:ext uri="{FF2B5EF4-FFF2-40B4-BE49-F238E27FC236}">
-                <a16:creationId xmlns:a16="http://schemas.microsoft.com/office/drawing/2014/main" id="{7FCA1908-EC09-46BB-B633-12D671CD2244}"/>
+                <a16:creationId xmlns="" xmlns:a16="http://schemas.microsoft.com/office/drawing/2014/main" id="{7FCA1908-EC09-46BB-B633-12D671CD2244}"/>
               </a:ext>
             </a:extLst>
           </p:cNvPr>
@@ -28509,7 +28485,7 @@
           <p:cNvPr id="7" name="CaixaDeTexto 6">
             <a:extLst>
               <a:ext uri="{FF2B5EF4-FFF2-40B4-BE49-F238E27FC236}">
-                <a16:creationId xmlns:a16="http://schemas.microsoft.com/office/drawing/2014/main" id="{BF0B844E-C924-4EC3-B27F-D0C0220E391A}"/>
+                <a16:creationId xmlns="" xmlns:a16="http://schemas.microsoft.com/office/drawing/2014/main" id="{BF0B844E-C924-4EC3-B27F-D0C0220E391A}"/>
               </a:ext>
             </a:extLst>
           </p:cNvPr>
@@ -28548,7 +28524,7 @@
           <p:cNvPr id="35" name="Agrupar 34">
             <a:extLst>
               <a:ext uri="{FF2B5EF4-FFF2-40B4-BE49-F238E27FC236}">
-                <a16:creationId xmlns:a16="http://schemas.microsoft.com/office/drawing/2014/main" id="{E876AD11-81BD-4580-9B33-4F7D24F45B10}"/>
+                <a16:creationId xmlns="" xmlns:a16="http://schemas.microsoft.com/office/drawing/2014/main" id="{E876AD11-81BD-4580-9B33-4F7D24F45B10}"/>
               </a:ext>
             </a:extLst>
           </p:cNvPr>
@@ -28568,7 +28544,7 @@
             <p:cNvPr id="28" name="CaixaDeTexto 27">
               <a:extLst>
                 <a:ext uri="{FF2B5EF4-FFF2-40B4-BE49-F238E27FC236}">
-                  <a16:creationId xmlns:a16="http://schemas.microsoft.com/office/drawing/2014/main" id="{06F24E56-56C0-48DE-B993-B1CF84033F10}"/>
+                  <a16:creationId xmlns="" xmlns:a16="http://schemas.microsoft.com/office/drawing/2014/main" id="{06F24E56-56C0-48DE-B993-B1CF84033F10}"/>
                 </a:ext>
               </a:extLst>
             </p:cNvPr>
@@ -28656,7 +28632,7 @@
             <p:cNvPr id="33" name="Retângulo 32">
               <a:extLst>
                 <a:ext uri="{FF2B5EF4-FFF2-40B4-BE49-F238E27FC236}">
-                  <a16:creationId xmlns:a16="http://schemas.microsoft.com/office/drawing/2014/main" id="{F00C5CCF-AC25-4099-8DD3-8B36FCAF56E7}"/>
+                  <a16:creationId xmlns="" xmlns:a16="http://schemas.microsoft.com/office/drawing/2014/main" id="{F00C5CCF-AC25-4099-8DD3-8B36FCAF56E7}"/>
                 </a:ext>
               </a:extLst>
             </p:cNvPr>
@@ -28739,7 +28715,7 @@
           <p:cNvPr id="4" name="Retângulo 3">
             <a:extLst>
               <a:ext uri="{FF2B5EF4-FFF2-40B4-BE49-F238E27FC236}">
-                <a16:creationId xmlns:a16="http://schemas.microsoft.com/office/drawing/2014/main" id="{88C6BF1B-8B81-4A42-B266-9DF3168EF8CB}"/>
+                <a16:creationId xmlns="" xmlns:a16="http://schemas.microsoft.com/office/drawing/2014/main" id="{88C6BF1B-8B81-4A42-B266-9DF3168EF8CB}"/>
               </a:ext>
             </a:extLst>
           </p:cNvPr>
@@ -28793,7 +28769,7 @@
           <p:cNvPr id="2" name="CaixaDeTexto 1">
             <a:extLst>
               <a:ext uri="{FF2B5EF4-FFF2-40B4-BE49-F238E27FC236}">
-                <a16:creationId xmlns:a16="http://schemas.microsoft.com/office/drawing/2014/main" id="{80F5CD5A-1914-4EF1-BE32-34B089486C2F}"/>
+                <a16:creationId xmlns="" xmlns:a16="http://schemas.microsoft.com/office/drawing/2014/main" id="{80F5CD5A-1914-4EF1-BE32-34B089486C2F}"/>
               </a:ext>
             </a:extLst>
           </p:cNvPr>
@@ -28834,7 +28810,7 @@
           <p:cNvPr id="3" name="Imagem 6" descr="Uma imagem contendo objeto&#10;&#10;Descrição gerada com muito alta confiança">
             <a:extLst>
               <a:ext uri="{FF2B5EF4-FFF2-40B4-BE49-F238E27FC236}">
-                <a16:creationId xmlns:a16="http://schemas.microsoft.com/office/drawing/2014/main" id="{3A958C51-9DB6-409A-8BCE-A5C77D3B1354}"/>
+                <a16:creationId xmlns="" xmlns:a16="http://schemas.microsoft.com/office/drawing/2014/main" id="{3A958C51-9DB6-409A-8BCE-A5C77D3B1354}"/>
               </a:ext>
             </a:extLst>
           </p:cNvPr>
@@ -28864,7 +28840,7 @@
           <p:cNvPr id="7" name="Retângulo 6">
             <a:extLst>
               <a:ext uri="{FF2B5EF4-FFF2-40B4-BE49-F238E27FC236}">
-                <a16:creationId xmlns:a16="http://schemas.microsoft.com/office/drawing/2014/main" id="{89094DE6-756F-4A82-8A95-1CBED37E87E2}"/>
+                <a16:creationId xmlns="" xmlns:a16="http://schemas.microsoft.com/office/drawing/2014/main" id="{89094DE6-756F-4A82-8A95-1CBED37E87E2}"/>
               </a:ext>
             </a:extLst>
           </p:cNvPr>
@@ -28913,7 +28889,7 @@
           <p:cNvPr id="9" name="Retângulo 8">
             <a:extLst>
               <a:ext uri="{FF2B5EF4-FFF2-40B4-BE49-F238E27FC236}">
-                <a16:creationId xmlns:a16="http://schemas.microsoft.com/office/drawing/2014/main" id="{407F5294-A287-4708-8220-29D5D97DEE86}"/>
+                <a16:creationId xmlns="" xmlns:a16="http://schemas.microsoft.com/office/drawing/2014/main" id="{407F5294-A287-4708-8220-29D5D97DEE86}"/>
               </a:ext>
             </a:extLst>
           </p:cNvPr>
@@ -28962,7 +28938,7 @@
           <p:cNvPr id="11" name="Retângulo 10">
             <a:extLst>
               <a:ext uri="{FF2B5EF4-FFF2-40B4-BE49-F238E27FC236}">
-                <a16:creationId xmlns:a16="http://schemas.microsoft.com/office/drawing/2014/main" id="{8CCE9E41-DF19-4539-AEB2-C83DDB8D015A}"/>
+                <a16:creationId xmlns="" xmlns:a16="http://schemas.microsoft.com/office/drawing/2014/main" id="{8CCE9E41-DF19-4539-AEB2-C83DDB8D015A}"/>
               </a:ext>
             </a:extLst>
           </p:cNvPr>
@@ -29011,7 +28987,7 @@
           <p:cNvPr id="13" name="CaixaDeTexto 12">
             <a:extLst>
               <a:ext uri="{FF2B5EF4-FFF2-40B4-BE49-F238E27FC236}">
-                <a16:creationId xmlns:a16="http://schemas.microsoft.com/office/drawing/2014/main" id="{36A1F85B-7B7F-4EB2-A921-5BDA85D5F006}"/>
+                <a16:creationId xmlns="" xmlns:a16="http://schemas.microsoft.com/office/drawing/2014/main" id="{36A1F85B-7B7F-4EB2-A921-5BDA85D5F006}"/>
               </a:ext>
             </a:extLst>
           </p:cNvPr>
@@ -29053,7 +29029,7 @@
           <p:cNvPr id="15" name="CaixaDeTexto 14">
             <a:extLst>
               <a:ext uri="{FF2B5EF4-FFF2-40B4-BE49-F238E27FC236}">
-                <a16:creationId xmlns:a16="http://schemas.microsoft.com/office/drawing/2014/main" id="{F4835543-02C9-4F7E-942E-19AA80F41074}"/>
+                <a16:creationId xmlns="" xmlns:a16="http://schemas.microsoft.com/office/drawing/2014/main" id="{F4835543-02C9-4F7E-942E-19AA80F41074}"/>
               </a:ext>
             </a:extLst>
           </p:cNvPr>
@@ -29095,7 +29071,7 @@
           <p:cNvPr id="17" name="Conector de Seta Reta 16">
             <a:extLst>
               <a:ext uri="{FF2B5EF4-FFF2-40B4-BE49-F238E27FC236}">
-                <a16:creationId xmlns:a16="http://schemas.microsoft.com/office/drawing/2014/main" id="{411AA6B9-507C-44D4-9959-3C997B8CBC1D}"/>
+                <a16:creationId xmlns="" xmlns:a16="http://schemas.microsoft.com/office/drawing/2014/main" id="{411AA6B9-507C-44D4-9959-3C997B8CBC1D}"/>
               </a:ext>
             </a:extLst>
           </p:cNvPr>
@@ -29139,7 +29115,7 @@
           <p:cNvPr id="19" name="Conector de Seta Reta 18">
             <a:extLst>
               <a:ext uri="{FF2B5EF4-FFF2-40B4-BE49-F238E27FC236}">
-                <a16:creationId xmlns:a16="http://schemas.microsoft.com/office/drawing/2014/main" id="{93EB990D-C099-4555-BD11-426E6E8EE67F}"/>
+                <a16:creationId xmlns="" xmlns:a16="http://schemas.microsoft.com/office/drawing/2014/main" id="{93EB990D-C099-4555-BD11-426E6E8EE67F}"/>
               </a:ext>
             </a:extLst>
           </p:cNvPr>
@@ -29183,7 +29159,7 @@
           <p:cNvPr id="21" name="CaixaDeTexto 20">
             <a:extLst>
               <a:ext uri="{FF2B5EF4-FFF2-40B4-BE49-F238E27FC236}">
-                <a16:creationId xmlns:a16="http://schemas.microsoft.com/office/drawing/2014/main" id="{DDB3C006-F399-4DA0-84A7-14D02AA99AD9}"/>
+                <a16:creationId xmlns="" xmlns:a16="http://schemas.microsoft.com/office/drawing/2014/main" id="{DDB3C006-F399-4DA0-84A7-14D02AA99AD9}"/>
               </a:ext>
             </a:extLst>
           </p:cNvPr>
@@ -29223,7 +29199,7 @@
           <p:cNvPr id="14" name="Imagem 6" descr="Uma imagem contendo objeto&#10;&#10;Descrição gerada com muito alta confiança">
             <a:extLst>
               <a:ext uri="{FF2B5EF4-FFF2-40B4-BE49-F238E27FC236}">
-                <a16:creationId xmlns:a16="http://schemas.microsoft.com/office/drawing/2014/main" id="{679141C5-05BA-4E9B-9DE4-33CA40E689E3}"/>
+                <a16:creationId xmlns="" xmlns:a16="http://schemas.microsoft.com/office/drawing/2014/main" id="{679141C5-05BA-4E9B-9DE4-33CA40E689E3}"/>
               </a:ext>
             </a:extLst>
           </p:cNvPr>
@@ -29253,7 +29229,7 @@
           <p:cNvPr id="5" name="CaixaDeTexto 4">
             <a:extLst>
               <a:ext uri="{FF2B5EF4-FFF2-40B4-BE49-F238E27FC236}">
-                <a16:creationId xmlns:a16="http://schemas.microsoft.com/office/drawing/2014/main" id="{B16219F2-C8D5-4962-B139-35FAB8DA186B}"/>
+                <a16:creationId xmlns="" xmlns:a16="http://schemas.microsoft.com/office/drawing/2014/main" id="{B16219F2-C8D5-4962-B139-35FAB8DA186B}"/>
               </a:ext>
             </a:extLst>
           </p:cNvPr>
@@ -29290,7 +29266,7 @@
           <p:cNvPr id="6" name="CaixaDeTexto 5">
             <a:extLst>
               <a:ext uri="{FF2B5EF4-FFF2-40B4-BE49-F238E27FC236}">
-                <a16:creationId xmlns:a16="http://schemas.microsoft.com/office/drawing/2014/main" id="{E30895BE-0869-4DCC-8DF3-4E9AA8EB5C8C}"/>
+                <a16:creationId xmlns="" xmlns:a16="http://schemas.microsoft.com/office/drawing/2014/main" id="{E30895BE-0869-4DCC-8DF3-4E9AA8EB5C8C}"/>
               </a:ext>
             </a:extLst>
           </p:cNvPr>
@@ -29332,7 +29308,7 @@
           <p:cNvPr id="20" name="Conector de Seta Reta 19">
             <a:extLst>
               <a:ext uri="{FF2B5EF4-FFF2-40B4-BE49-F238E27FC236}">
-                <a16:creationId xmlns:a16="http://schemas.microsoft.com/office/drawing/2014/main" id="{14BFD4BF-B15E-4CD7-866F-99EB8A96BAA7}"/>
+                <a16:creationId xmlns="" xmlns:a16="http://schemas.microsoft.com/office/drawing/2014/main" id="{14BFD4BF-B15E-4CD7-866F-99EB8A96BAA7}"/>
               </a:ext>
             </a:extLst>
           </p:cNvPr>
@@ -29406,7 +29382,7 @@
           <p:cNvPr id="4" name="Retângulo 3">
             <a:extLst>
               <a:ext uri="{FF2B5EF4-FFF2-40B4-BE49-F238E27FC236}">
-                <a16:creationId xmlns:a16="http://schemas.microsoft.com/office/drawing/2014/main" id="{88C6BF1B-8B81-4A42-B266-9DF3168EF8CB}"/>
+                <a16:creationId xmlns="" xmlns:a16="http://schemas.microsoft.com/office/drawing/2014/main" id="{88C6BF1B-8B81-4A42-B266-9DF3168EF8CB}"/>
               </a:ext>
             </a:extLst>
           </p:cNvPr>
@@ -29460,7 +29436,7 @@
           <p:cNvPr id="2" name="CaixaDeTexto 1">
             <a:extLst>
               <a:ext uri="{FF2B5EF4-FFF2-40B4-BE49-F238E27FC236}">
-                <a16:creationId xmlns:a16="http://schemas.microsoft.com/office/drawing/2014/main" id="{80F5CD5A-1914-4EF1-BE32-34B089486C2F}"/>
+                <a16:creationId xmlns="" xmlns:a16="http://schemas.microsoft.com/office/drawing/2014/main" id="{80F5CD5A-1914-4EF1-BE32-34B089486C2F}"/>
               </a:ext>
             </a:extLst>
           </p:cNvPr>
@@ -29501,7 +29477,7 @@
           <p:cNvPr id="5" name="Conector de Seta Reta 4">
             <a:extLst>
               <a:ext uri="{FF2B5EF4-FFF2-40B4-BE49-F238E27FC236}">
-                <a16:creationId xmlns:a16="http://schemas.microsoft.com/office/drawing/2014/main" id="{85E6B2C7-D043-4C92-898F-4F2DEE8A2690}"/>
+                <a16:creationId xmlns="" xmlns:a16="http://schemas.microsoft.com/office/drawing/2014/main" id="{85E6B2C7-D043-4C92-898F-4F2DEE8A2690}"/>
               </a:ext>
             </a:extLst>
           </p:cNvPr>
@@ -29544,7 +29520,7 @@
           <p:cNvPr id="6" name="Conector de Seta Reta 5">
             <a:extLst>
               <a:ext uri="{FF2B5EF4-FFF2-40B4-BE49-F238E27FC236}">
-                <a16:creationId xmlns:a16="http://schemas.microsoft.com/office/drawing/2014/main" id="{9BACC1B6-2F2A-4248-B083-17CB87D6E5BE}"/>
+                <a16:creationId xmlns="" xmlns:a16="http://schemas.microsoft.com/office/drawing/2014/main" id="{9BACC1B6-2F2A-4248-B083-17CB87D6E5BE}"/>
               </a:ext>
             </a:extLst>
           </p:cNvPr>
@@ -29587,7 +29563,7 @@
           <p:cNvPr id="50" name="Agrupar 49">
             <a:extLst>
               <a:ext uri="{FF2B5EF4-FFF2-40B4-BE49-F238E27FC236}">
-                <a16:creationId xmlns:a16="http://schemas.microsoft.com/office/drawing/2014/main" id="{59A99669-CC2E-471C-9533-EE65C05F42DC}"/>
+                <a16:creationId xmlns="" xmlns:a16="http://schemas.microsoft.com/office/drawing/2014/main" id="{59A99669-CC2E-471C-9533-EE65C05F42DC}"/>
               </a:ext>
             </a:extLst>
           </p:cNvPr>
@@ -29607,7 +29583,7 @@
             <p:cNvPr id="8" name="Retângulo 7">
               <a:extLst>
                 <a:ext uri="{FF2B5EF4-FFF2-40B4-BE49-F238E27FC236}">
-                  <a16:creationId xmlns:a16="http://schemas.microsoft.com/office/drawing/2014/main" id="{5941647A-72D6-4138-BD44-C48D31273AB1}"/>
+                  <a16:creationId xmlns="" xmlns:a16="http://schemas.microsoft.com/office/drawing/2014/main" id="{5941647A-72D6-4138-BD44-C48D31273AB1}"/>
                 </a:ext>
               </a:extLst>
             </p:cNvPr>
@@ -29661,7 +29637,7 @@
             <p:cNvPr id="9" name="CaixaDeTexto 1">
               <a:extLst>
                 <a:ext uri="{FF2B5EF4-FFF2-40B4-BE49-F238E27FC236}">
-                  <a16:creationId xmlns:a16="http://schemas.microsoft.com/office/drawing/2014/main" id="{7994EBAF-0D7D-41FB-B228-383D0E67FB6C}"/>
+                  <a16:creationId xmlns="" xmlns:a16="http://schemas.microsoft.com/office/drawing/2014/main" id="{7994EBAF-0D7D-41FB-B228-383D0E67FB6C}"/>
                 </a:ext>
               </a:extLst>
             </p:cNvPr>
@@ -29798,7 +29774,7 @@
           <p:cNvPr id="49" name="Agrupar 48">
             <a:extLst>
               <a:ext uri="{FF2B5EF4-FFF2-40B4-BE49-F238E27FC236}">
-                <a16:creationId xmlns:a16="http://schemas.microsoft.com/office/drawing/2014/main" id="{23F3B3EC-DB9B-48C6-B968-A50048FE2EB4}"/>
+                <a16:creationId xmlns="" xmlns:a16="http://schemas.microsoft.com/office/drawing/2014/main" id="{23F3B3EC-DB9B-48C6-B968-A50048FE2EB4}"/>
               </a:ext>
             </a:extLst>
           </p:cNvPr>
@@ -29818,7 +29794,7 @@
             <p:cNvPr id="10" name="Retângulo 9">
               <a:extLst>
                 <a:ext uri="{FF2B5EF4-FFF2-40B4-BE49-F238E27FC236}">
-                  <a16:creationId xmlns:a16="http://schemas.microsoft.com/office/drawing/2014/main" id="{971BC70D-B8E4-4A17-B17F-86055154C60C}"/>
+                  <a16:creationId xmlns="" xmlns:a16="http://schemas.microsoft.com/office/drawing/2014/main" id="{971BC70D-B8E4-4A17-B17F-86055154C60C}"/>
                 </a:ext>
               </a:extLst>
             </p:cNvPr>
@@ -29872,7 +29848,7 @@
             <p:cNvPr id="11" name="CaixaDeTexto 1">
               <a:extLst>
                 <a:ext uri="{FF2B5EF4-FFF2-40B4-BE49-F238E27FC236}">
-                  <a16:creationId xmlns:a16="http://schemas.microsoft.com/office/drawing/2014/main" id="{F77E377A-2299-45F1-BD65-AD221DB0412C}"/>
+                  <a16:creationId xmlns="" xmlns:a16="http://schemas.microsoft.com/office/drawing/2014/main" id="{F77E377A-2299-45F1-BD65-AD221DB0412C}"/>
                 </a:ext>
               </a:extLst>
             </p:cNvPr>
@@ -30009,7 +29985,7 @@
           <p:cNvPr id="53" name="Agrupar 52">
             <a:extLst>
               <a:ext uri="{FF2B5EF4-FFF2-40B4-BE49-F238E27FC236}">
-                <a16:creationId xmlns:a16="http://schemas.microsoft.com/office/drawing/2014/main" id="{9102A23B-7600-4BE1-A0EA-04D802778857}"/>
+                <a16:creationId xmlns="" xmlns:a16="http://schemas.microsoft.com/office/drawing/2014/main" id="{9102A23B-7600-4BE1-A0EA-04D802778857}"/>
               </a:ext>
             </a:extLst>
           </p:cNvPr>
@@ -30029,7 +30005,7 @@
             <p:cNvPr id="13" name="Imagem 6" descr="Uma imagem contendo objeto&#10;&#10;Descrição gerada com muito alta confiança">
               <a:extLst>
                 <a:ext uri="{FF2B5EF4-FFF2-40B4-BE49-F238E27FC236}">
-                  <a16:creationId xmlns:a16="http://schemas.microsoft.com/office/drawing/2014/main" id="{63824687-0B05-4413-8D3C-5E29C9702638}"/>
+                  <a16:creationId xmlns="" xmlns:a16="http://schemas.microsoft.com/office/drawing/2014/main" id="{63824687-0B05-4413-8D3C-5E29C9702638}"/>
                 </a:ext>
               </a:extLst>
             </p:cNvPr>
@@ -30059,7 +30035,7 @@
             <p:cNvPr id="16" name="CaixaDeTexto 15">
               <a:extLst>
                 <a:ext uri="{FF2B5EF4-FFF2-40B4-BE49-F238E27FC236}">
-                  <a16:creationId xmlns:a16="http://schemas.microsoft.com/office/drawing/2014/main" id="{FDA29973-2090-478C-8CFB-2DD1F5F78F5A}"/>
+                  <a16:creationId xmlns="" xmlns:a16="http://schemas.microsoft.com/office/drawing/2014/main" id="{FDA29973-2090-478C-8CFB-2DD1F5F78F5A}"/>
                 </a:ext>
               </a:extLst>
             </p:cNvPr>
@@ -30097,7 +30073,7 @@
           <p:cNvPr id="52" name="Agrupar 51">
             <a:extLst>
               <a:ext uri="{FF2B5EF4-FFF2-40B4-BE49-F238E27FC236}">
-                <a16:creationId xmlns:a16="http://schemas.microsoft.com/office/drawing/2014/main" id="{117C8AE4-4833-4058-9612-B813911B00FD}"/>
+                <a16:creationId xmlns="" xmlns:a16="http://schemas.microsoft.com/office/drawing/2014/main" id="{117C8AE4-4833-4058-9612-B813911B00FD}"/>
               </a:ext>
             </a:extLst>
           </p:cNvPr>
@@ -30117,7 +30093,7 @@
             <p:cNvPr id="14" name="Imagem 6" descr="Uma imagem contendo objeto&#10;&#10;Descrição gerada com muito alta confiança">
               <a:extLst>
                 <a:ext uri="{FF2B5EF4-FFF2-40B4-BE49-F238E27FC236}">
-                  <a16:creationId xmlns:a16="http://schemas.microsoft.com/office/drawing/2014/main" id="{DBED1A96-C999-457A-8F32-18571E67930B}"/>
+                  <a16:creationId xmlns="" xmlns:a16="http://schemas.microsoft.com/office/drawing/2014/main" id="{DBED1A96-C999-457A-8F32-18571E67930B}"/>
                 </a:ext>
               </a:extLst>
             </p:cNvPr>
@@ -30147,7 +30123,7 @@
             <p:cNvPr id="18" name="CaixaDeTexto 17">
               <a:extLst>
                 <a:ext uri="{FF2B5EF4-FFF2-40B4-BE49-F238E27FC236}">
-                  <a16:creationId xmlns:a16="http://schemas.microsoft.com/office/drawing/2014/main" id="{4A840F81-AC70-4925-A6AF-06B2ECF11F52}"/>
+                  <a16:creationId xmlns="" xmlns:a16="http://schemas.microsoft.com/office/drawing/2014/main" id="{4A840F81-AC70-4925-A6AF-06B2ECF11F52}"/>
                 </a:ext>
               </a:extLst>
             </p:cNvPr>
@@ -30185,7 +30161,7 @@
           <p:cNvPr id="19" name="Conector de Seta Reta 18">
             <a:extLst>
               <a:ext uri="{FF2B5EF4-FFF2-40B4-BE49-F238E27FC236}">
-                <a16:creationId xmlns:a16="http://schemas.microsoft.com/office/drawing/2014/main" id="{7053101E-BA41-4AFA-90EB-5F30E05D5C2A}"/>
+                <a16:creationId xmlns="" xmlns:a16="http://schemas.microsoft.com/office/drawing/2014/main" id="{7053101E-BA41-4AFA-90EB-5F30E05D5C2A}"/>
               </a:ext>
             </a:extLst>
           </p:cNvPr>
@@ -30229,7 +30205,7 @@
           <p:cNvPr id="20" name="Conector de Seta Reta 19">
             <a:extLst>
               <a:ext uri="{FF2B5EF4-FFF2-40B4-BE49-F238E27FC236}">
-                <a16:creationId xmlns:a16="http://schemas.microsoft.com/office/drawing/2014/main" id="{972CCC72-617F-4D78-B3FE-1B11C03D20E1}"/>
+                <a16:creationId xmlns="" xmlns:a16="http://schemas.microsoft.com/office/drawing/2014/main" id="{972CCC72-617F-4D78-B3FE-1B11C03D20E1}"/>
               </a:ext>
             </a:extLst>
           </p:cNvPr>
@@ -30273,7 +30249,7 @@
           <p:cNvPr id="21" name="Conector de Seta Reta 20">
             <a:extLst>
               <a:ext uri="{FF2B5EF4-FFF2-40B4-BE49-F238E27FC236}">
-                <a16:creationId xmlns:a16="http://schemas.microsoft.com/office/drawing/2014/main" id="{EA66EA41-B19F-44A8-87CD-EFADB016E3DD}"/>
+                <a16:creationId xmlns="" xmlns:a16="http://schemas.microsoft.com/office/drawing/2014/main" id="{EA66EA41-B19F-44A8-87CD-EFADB016E3DD}"/>
               </a:ext>
             </a:extLst>
           </p:cNvPr>
@@ -30317,7 +30293,7 @@
           <p:cNvPr id="23" name="Conector de Seta Reta 22">
             <a:extLst>
               <a:ext uri="{FF2B5EF4-FFF2-40B4-BE49-F238E27FC236}">
-                <a16:creationId xmlns:a16="http://schemas.microsoft.com/office/drawing/2014/main" id="{6F2A4F03-C5E4-40D7-AA81-EDDBC7B02437}"/>
+                <a16:creationId xmlns="" xmlns:a16="http://schemas.microsoft.com/office/drawing/2014/main" id="{6F2A4F03-C5E4-40D7-AA81-EDDBC7B02437}"/>
               </a:ext>
             </a:extLst>
           </p:cNvPr>
@@ -30361,7 +30337,7 @@
           <p:cNvPr id="27" name="Conector de Seta Reta 26">
             <a:extLst>
               <a:ext uri="{FF2B5EF4-FFF2-40B4-BE49-F238E27FC236}">
-                <a16:creationId xmlns:a16="http://schemas.microsoft.com/office/drawing/2014/main" id="{569658DA-03D1-4969-9E0E-3405A27FE72E}"/>
+                <a16:creationId xmlns="" xmlns:a16="http://schemas.microsoft.com/office/drawing/2014/main" id="{569658DA-03D1-4969-9E0E-3405A27FE72E}"/>
               </a:ext>
             </a:extLst>
           </p:cNvPr>
@@ -30405,7 +30381,7 @@
           <p:cNvPr id="3" name="CaixaDeTexto 2">
             <a:extLst>
               <a:ext uri="{FF2B5EF4-FFF2-40B4-BE49-F238E27FC236}">
-                <a16:creationId xmlns:a16="http://schemas.microsoft.com/office/drawing/2014/main" id="{7FCA1908-EC09-46BB-B633-12D671CD2244}"/>
+                <a16:creationId xmlns="" xmlns:a16="http://schemas.microsoft.com/office/drawing/2014/main" id="{7FCA1908-EC09-46BB-B633-12D671CD2244}"/>
               </a:ext>
             </a:extLst>
           </p:cNvPr>
@@ -30446,7 +30422,7 @@
           <p:cNvPr id="7" name="CaixaDeTexto 6">
             <a:extLst>
               <a:ext uri="{FF2B5EF4-FFF2-40B4-BE49-F238E27FC236}">
-                <a16:creationId xmlns:a16="http://schemas.microsoft.com/office/drawing/2014/main" id="{BF0B844E-C924-4EC3-B27F-D0C0220E391A}"/>
+                <a16:creationId xmlns="" xmlns:a16="http://schemas.microsoft.com/office/drawing/2014/main" id="{BF0B844E-C924-4EC3-B27F-D0C0220E391A}"/>
               </a:ext>
             </a:extLst>
           </p:cNvPr>
@@ -30485,7 +30461,7 @@
           <p:cNvPr id="42" name="Agrupar 41">
             <a:extLst>
               <a:ext uri="{FF2B5EF4-FFF2-40B4-BE49-F238E27FC236}">
-                <a16:creationId xmlns:a16="http://schemas.microsoft.com/office/drawing/2014/main" id="{21F91D42-F2B6-4275-A3D0-4C3BAED84193}"/>
+                <a16:creationId xmlns="" xmlns:a16="http://schemas.microsoft.com/office/drawing/2014/main" id="{21F91D42-F2B6-4275-A3D0-4C3BAED84193}"/>
               </a:ext>
             </a:extLst>
           </p:cNvPr>
@@ -30505,7 +30481,7 @@
             <p:cNvPr id="32" name="CaixaDeTexto 31">
               <a:extLst>
                 <a:ext uri="{FF2B5EF4-FFF2-40B4-BE49-F238E27FC236}">
-                  <a16:creationId xmlns:a16="http://schemas.microsoft.com/office/drawing/2014/main" id="{566CD485-09EF-48E1-86C5-9CA202611613}"/>
+                  <a16:creationId xmlns="" xmlns:a16="http://schemas.microsoft.com/office/drawing/2014/main" id="{566CD485-09EF-48E1-86C5-9CA202611613}"/>
                 </a:ext>
               </a:extLst>
             </p:cNvPr>
@@ -30584,7 +30560,7 @@
             <p:cNvPr id="30" name="Retângulo 29">
               <a:extLst>
                 <a:ext uri="{FF2B5EF4-FFF2-40B4-BE49-F238E27FC236}">
-                  <a16:creationId xmlns:a16="http://schemas.microsoft.com/office/drawing/2014/main" id="{D7B5B938-3ED4-4381-81EC-D26D6C4BA4A2}"/>
+                  <a16:creationId xmlns="" xmlns:a16="http://schemas.microsoft.com/office/drawing/2014/main" id="{D7B5B938-3ED4-4381-81EC-D26D6C4BA4A2}"/>
                 </a:ext>
               </a:extLst>
             </p:cNvPr>
@@ -30637,7 +30613,7 @@
           <p:cNvPr id="41" name="Agrupar 40">
             <a:extLst>
               <a:ext uri="{FF2B5EF4-FFF2-40B4-BE49-F238E27FC236}">
-                <a16:creationId xmlns:a16="http://schemas.microsoft.com/office/drawing/2014/main" id="{CE589A6F-0BF7-4F13-8115-B627981BEA60}"/>
+                <a16:creationId xmlns="" xmlns:a16="http://schemas.microsoft.com/office/drawing/2014/main" id="{CE589A6F-0BF7-4F13-8115-B627981BEA60}"/>
               </a:ext>
             </a:extLst>
           </p:cNvPr>
@@ -30657,7 +30633,7 @@
             <p:cNvPr id="28" name="CaixaDeTexto 27">
               <a:extLst>
                 <a:ext uri="{FF2B5EF4-FFF2-40B4-BE49-F238E27FC236}">
-                  <a16:creationId xmlns:a16="http://schemas.microsoft.com/office/drawing/2014/main" id="{06F24E56-56C0-48DE-B993-B1CF84033F10}"/>
+                  <a16:creationId xmlns="" xmlns:a16="http://schemas.microsoft.com/office/drawing/2014/main" id="{06F24E56-56C0-48DE-B993-B1CF84033F10}"/>
                 </a:ext>
               </a:extLst>
             </p:cNvPr>
@@ -30734,7 +30710,7 @@
             <p:cNvPr id="33" name="Retângulo 32">
               <a:extLst>
                 <a:ext uri="{FF2B5EF4-FFF2-40B4-BE49-F238E27FC236}">
-                  <a16:creationId xmlns:a16="http://schemas.microsoft.com/office/drawing/2014/main" id="{F00C5CCF-AC25-4099-8DD3-8B36FCAF56E7}"/>
+                  <a16:creationId xmlns="" xmlns:a16="http://schemas.microsoft.com/office/drawing/2014/main" id="{F00C5CCF-AC25-4099-8DD3-8B36FCAF56E7}"/>
                 </a:ext>
               </a:extLst>
             </p:cNvPr>
@@ -30787,7 +30763,7 @@
           <p:cNvPr id="51" name="Agrupar 50">
             <a:extLst>
               <a:ext uri="{FF2B5EF4-FFF2-40B4-BE49-F238E27FC236}">
-                <a16:creationId xmlns:a16="http://schemas.microsoft.com/office/drawing/2014/main" id="{283F123E-DE00-45B4-8DF4-7F224AED295D}"/>
+                <a16:creationId xmlns="" xmlns:a16="http://schemas.microsoft.com/office/drawing/2014/main" id="{283F123E-DE00-45B4-8DF4-7F224AED295D}"/>
               </a:ext>
             </a:extLst>
           </p:cNvPr>
@@ -30807,7 +30783,7 @@
             <p:cNvPr id="34" name="CaixaDeTexto 33">
               <a:extLst>
                 <a:ext uri="{FF2B5EF4-FFF2-40B4-BE49-F238E27FC236}">
-                  <a16:creationId xmlns:a16="http://schemas.microsoft.com/office/drawing/2014/main" id="{5D39F44F-4BB8-42ED-B09A-9657764491D5}"/>
+                  <a16:creationId xmlns="" xmlns:a16="http://schemas.microsoft.com/office/drawing/2014/main" id="{5D39F44F-4BB8-42ED-B09A-9657764491D5}"/>
                 </a:ext>
               </a:extLst>
             </p:cNvPr>
@@ -30849,7 +30825,7 @@
             <p:cNvPr id="35" name="Imagem 6" descr="Uma imagem contendo objeto&#10;&#10;Descrição gerada com muito alta confiança">
               <a:extLst>
                 <a:ext uri="{FF2B5EF4-FFF2-40B4-BE49-F238E27FC236}">
-                  <a16:creationId xmlns:a16="http://schemas.microsoft.com/office/drawing/2014/main" id="{E44324F1-C6C9-4A4B-9667-7D21BF66D74C}"/>
+                  <a16:creationId xmlns="" xmlns:a16="http://schemas.microsoft.com/office/drawing/2014/main" id="{E44324F1-C6C9-4A4B-9667-7D21BF66D74C}"/>
                 </a:ext>
               </a:extLst>
             </p:cNvPr>
@@ -30880,7 +30856,7 @@
           <p:cNvPr id="37" name="Conector de Seta Reta 36">
             <a:extLst>
               <a:ext uri="{FF2B5EF4-FFF2-40B4-BE49-F238E27FC236}">
-                <a16:creationId xmlns:a16="http://schemas.microsoft.com/office/drawing/2014/main" id="{99C24CD1-FABB-4DD9-A9FD-41AD181EE8C7}"/>
+                <a16:creationId xmlns="" xmlns:a16="http://schemas.microsoft.com/office/drawing/2014/main" id="{99C24CD1-FABB-4DD9-A9FD-41AD181EE8C7}"/>
               </a:ext>
             </a:extLst>
           </p:cNvPr>
@@ -30924,7 +30900,7 @@
           <p:cNvPr id="39" name="Agrupar 38">
             <a:extLst>
               <a:ext uri="{FF2B5EF4-FFF2-40B4-BE49-F238E27FC236}">
-                <a16:creationId xmlns:a16="http://schemas.microsoft.com/office/drawing/2014/main" id="{A3441A96-A4E4-4F25-BD39-743E94E79917}"/>
+                <a16:creationId xmlns="" xmlns:a16="http://schemas.microsoft.com/office/drawing/2014/main" id="{A3441A96-A4E4-4F25-BD39-743E94E79917}"/>
               </a:ext>
             </a:extLst>
           </p:cNvPr>
@@ -30944,7 +30920,7 @@
             <p:cNvPr id="38" name="Retângulo 37">
               <a:extLst>
                 <a:ext uri="{FF2B5EF4-FFF2-40B4-BE49-F238E27FC236}">
-                  <a16:creationId xmlns:a16="http://schemas.microsoft.com/office/drawing/2014/main" id="{ADEABFF6-5823-4443-A6BF-973E9448ED9B}"/>
+                  <a16:creationId xmlns="" xmlns:a16="http://schemas.microsoft.com/office/drawing/2014/main" id="{ADEABFF6-5823-4443-A6BF-973E9448ED9B}"/>
                 </a:ext>
               </a:extLst>
             </p:cNvPr>
@@ -30996,7 +30972,7 @@
             <p:cNvPr id="40" name="CaixaDeTexto 39">
               <a:extLst>
                 <a:ext uri="{FF2B5EF4-FFF2-40B4-BE49-F238E27FC236}">
-                  <a16:creationId xmlns:a16="http://schemas.microsoft.com/office/drawing/2014/main" id="{850C7818-A02E-4E81-8BD6-424EFA441C21}"/>
+                  <a16:creationId xmlns="" xmlns:a16="http://schemas.microsoft.com/office/drawing/2014/main" id="{850C7818-A02E-4E81-8BD6-424EFA441C21}"/>
                 </a:ext>
               </a:extLst>
             </p:cNvPr>
@@ -31043,7 +31019,7 @@
           <p:cNvPr id="60" name="Conector de Seta Reta 59">
             <a:extLst>
               <a:ext uri="{FF2B5EF4-FFF2-40B4-BE49-F238E27FC236}">
-                <a16:creationId xmlns:a16="http://schemas.microsoft.com/office/drawing/2014/main" id="{A0A811B6-4F10-4ACC-BAFD-38F039227B28}"/>
+                <a16:creationId xmlns="" xmlns:a16="http://schemas.microsoft.com/office/drawing/2014/main" id="{A0A811B6-4F10-4ACC-BAFD-38F039227B28}"/>
               </a:ext>
             </a:extLst>
           </p:cNvPr>
@@ -31087,7 +31063,7 @@
           <p:cNvPr id="61" name="Conector de Seta Reta 60">
             <a:extLst>
               <a:ext uri="{FF2B5EF4-FFF2-40B4-BE49-F238E27FC236}">
-                <a16:creationId xmlns:a16="http://schemas.microsoft.com/office/drawing/2014/main" id="{42ABDC8F-7BC1-4EBD-806F-E95C8F0FA29D}"/>
+                <a16:creationId xmlns="" xmlns:a16="http://schemas.microsoft.com/office/drawing/2014/main" id="{42ABDC8F-7BC1-4EBD-806F-E95C8F0FA29D}"/>
               </a:ext>
             </a:extLst>
           </p:cNvPr>
@@ -31161,7 +31137,7 @@
           <p:cNvPr id="4" name="Retângulo 3">
             <a:extLst>
               <a:ext uri="{FF2B5EF4-FFF2-40B4-BE49-F238E27FC236}">
-                <a16:creationId xmlns:a16="http://schemas.microsoft.com/office/drawing/2014/main" id="{88C6BF1B-8B81-4A42-B266-9DF3168EF8CB}"/>
+                <a16:creationId xmlns="" xmlns:a16="http://schemas.microsoft.com/office/drawing/2014/main" id="{88C6BF1B-8B81-4A42-B266-9DF3168EF8CB}"/>
               </a:ext>
             </a:extLst>
           </p:cNvPr>
@@ -31215,7 +31191,7 @@
           <p:cNvPr id="6" name="CaixaDeTexto 5">
             <a:extLst>
               <a:ext uri="{FF2B5EF4-FFF2-40B4-BE49-F238E27FC236}">
-                <a16:creationId xmlns:a16="http://schemas.microsoft.com/office/drawing/2014/main" id="{1270056D-C445-482D-9C8C-EC4698A09D63}"/>
+                <a16:creationId xmlns="" xmlns:a16="http://schemas.microsoft.com/office/drawing/2014/main" id="{1270056D-C445-482D-9C8C-EC4698A09D63}"/>
               </a:ext>
             </a:extLst>
           </p:cNvPr>
@@ -31256,7 +31232,7 @@
           <p:cNvPr id="2" name="Retângulo 1">
             <a:extLst>
               <a:ext uri="{FF2B5EF4-FFF2-40B4-BE49-F238E27FC236}">
-                <a16:creationId xmlns:a16="http://schemas.microsoft.com/office/drawing/2014/main" id="{12043949-80F2-4BA4-ACCA-8E1E73200266}"/>
+                <a16:creationId xmlns="" xmlns:a16="http://schemas.microsoft.com/office/drawing/2014/main" id="{12043949-80F2-4BA4-ACCA-8E1E73200266}"/>
               </a:ext>
             </a:extLst>
           </p:cNvPr>
@@ -31305,7 +31281,7 @@
           <p:cNvPr id="9" name="Conector de Seta Reta 8">
             <a:extLst>
               <a:ext uri="{FF2B5EF4-FFF2-40B4-BE49-F238E27FC236}">
-                <a16:creationId xmlns:a16="http://schemas.microsoft.com/office/drawing/2014/main" id="{BA601A5E-E9FD-4E49-A21A-E1D9795909C3}"/>
+                <a16:creationId xmlns="" xmlns:a16="http://schemas.microsoft.com/office/drawing/2014/main" id="{BA601A5E-E9FD-4E49-A21A-E1D9795909C3}"/>
               </a:ext>
             </a:extLst>
           </p:cNvPr>
@@ -31347,7 +31323,7 @@
           <p:cNvPr id="5" name="Agrupar 4">
             <a:extLst>
               <a:ext uri="{FF2B5EF4-FFF2-40B4-BE49-F238E27FC236}">
-                <a16:creationId xmlns:a16="http://schemas.microsoft.com/office/drawing/2014/main" id="{E6673161-0C4F-48B5-8E89-7B48BFDA7916}"/>
+                <a16:creationId xmlns="" xmlns:a16="http://schemas.microsoft.com/office/drawing/2014/main" id="{E6673161-0C4F-48B5-8E89-7B48BFDA7916}"/>
               </a:ext>
             </a:extLst>
           </p:cNvPr>
@@ -31367,7 +31343,7 @@
             <p:cNvPr id="3" name="Imagem 6" descr="Uma imagem contendo objeto&#10;&#10;Descrição gerada com muito alta confiança">
               <a:extLst>
                 <a:ext uri="{FF2B5EF4-FFF2-40B4-BE49-F238E27FC236}">
-                  <a16:creationId xmlns:a16="http://schemas.microsoft.com/office/drawing/2014/main" id="{BBEA9159-6E91-4172-99DF-56517BBFE5AC}"/>
+                  <a16:creationId xmlns="" xmlns:a16="http://schemas.microsoft.com/office/drawing/2014/main" id="{BBEA9159-6E91-4172-99DF-56517BBFE5AC}"/>
                 </a:ext>
               </a:extLst>
             </p:cNvPr>
@@ -31397,7 +31373,7 @@
             <p:cNvPr id="11" name="CaixaDeTexto 10">
               <a:extLst>
                 <a:ext uri="{FF2B5EF4-FFF2-40B4-BE49-F238E27FC236}">
-                  <a16:creationId xmlns:a16="http://schemas.microsoft.com/office/drawing/2014/main" id="{2B365FA8-96A9-46EF-82C1-1F0ACEB6382C}"/>
+                  <a16:creationId xmlns="" xmlns:a16="http://schemas.microsoft.com/office/drawing/2014/main" id="{2B365FA8-96A9-46EF-82C1-1F0ACEB6382C}"/>
                 </a:ext>
               </a:extLst>
             </p:cNvPr>
@@ -31435,7 +31411,7 @@
           <p:cNvPr id="15" name="CaixaDeTexto 14">
             <a:extLst>
               <a:ext uri="{FF2B5EF4-FFF2-40B4-BE49-F238E27FC236}">
-                <a16:creationId xmlns:a16="http://schemas.microsoft.com/office/drawing/2014/main" id="{589ED39B-DB76-4792-9198-978C3E9B327E}"/>
+                <a16:creationId xmlns="" xmlns:a16="http://schemas.microsoft.com/office/drawing/2014/main" id="{589ED39B-DB76-4792-9198-978C3E9B327E}"/>
               </a:ext>
             </a:extLst>
           </p:cNvPr>
@@ -31475,7 +31451,7 @@
           <p:cNvPr id="17" name="Retângulo 16">
             <a:extLst>
               <a:ext uri="{FF2B5EF4-FFF2-40B4-BE49-F238E27FC236}">
-                <a16:creationId xmlns:a16="http://schemas.microsoft.com/office/drawing/2014/main" id="{AAE3C69C-201D-4C86-AAF7-B3DC70259B1F}"/>
+                <a16:creationId xmlns="" xmlns:a16="http://schemas.microsoft.com/office/drawing/2014/main" id="{AAE3C69C-201D-4C86-AAF7-B3DC70259B1F}"/>
               </a:ext>
             </a:extLst>
           </p:cNvPr>
@@ -31524,7 +31500,7 @@
           <p:cNvPr id="20" name="CaixaDeTexto 19">
             <a:extLst>
               <a:ext uri="{FF2B5EF4-FFF2-40B4-BE49-F238E27FC236}">
-                <a16:creationId xmlns:a16="http://schemas.microsoft.com/office/drawing/2014/main" id="{9EF114C1-C8CF-409C-847E-943F96FE0F0F}"/>
+                <a16:creationId xmlns="" xmlns:a16="http://schemas.microsoft.com/office/drawing/2014/main" id="{9EF114C1-C8CF-409C-847E-943F96FE0F0F}"/>
               </a:ext>
             </a:extLst>
           </p:cNvPr>
@@ -31563,7 +31539,7 @@
           <p:cNvPr id="22" name="Conector de Seta Reta 21">
             <a:extLst>
               <a:ext uri="{FF2B5EF4-FFF2-40B4-BE49-F238E27FC236}">
-                <a16:creationId xmlns:a16="http://schemas.microsoft.com/office/drawing/2014/main" id="{6005A5E0-EFE8-4E81-9A9B-EC939F301038}"/>
+                <a16:creationId xmlns="" xmlns:a16="http://schemas.microsoft.com/office/drawing/2014/main" id="{6005A5E0-EFE8-4E81-9A9B-EC939F301038}"/>
               </a:ext>
             </a:extLst>
           </p:cNvPr>
@@ -31637,7 +31613,7 @@
           <p:cNvPr id="7" name="CaixaDeTexto 6">
             <a:extLst>
               <a:ext uri="{FF2B5EF4-FFF2-40B4-BE49-F238E27FC236}">
-                <a16:creationId xmlns:a16="http://schemas.microsoft.com/office/drawing/2014/main" id="{BF0B844E-C924-4EC3-B27F-D0C0220E391A}"/>
+                <a16:creationId xmlns="" xmlns:a16="http://schemas.microsoft.com/office/drawing/2014/main" id="{BF0B844E-C924-4EC3-B27F-D0C0220E391A}"/>
               </a:ext>
             </a:extLst>
           </p:cNvPr>
@@ -31676,7 +31652,7 @@
           <p:cNvPr id="22" name="Agrupar 21">
             <a:extLst>
               <a:ext uri="{FF2B5EF4-FFF2-40B4-BE49-F238E27FC236}">
-                <a16:creationId xmlns:a16="http://schemas.microsoft.com/office/drawing/2014/main" id="{6DCBA173-E66C-403F-8F53-8A3DF7EFD734}"/>
+                <a16:creationId xmlns="" xmlns:a16="http://schemas.microsoft.com/office/drawing/2014/main" id="{6DCBA173-E66C-403F-8F53-8A3DF7EFD734}"/>
               </a:ext>
             </a:extLst>
           </p:cNvPr>
@@ -31696,7 +31672,7 @@
             <p:cNvPr id="4" name="Retângulo 3">
               <a:extLst>
                 <a:ext uri="{FF2B5EF4-FFF2-40B4-BE49-F238E27FC236}">
-                  <a16:creationId xmlns:a16="http://schemas.microsoft.com/office/drawing/2014/main" id="{88C6BF1B-8B81-4A42-B266-9DF3168EF8CB}"/>
+                  <a16:creationId xmlns="" xmlns:a16="http://schemas.microsoft.com/office/drawing/2014/main" id="{88C6BF1B-8B81-4A42-B266-9DF3168EF8CB}"/>
                 </a:ext>
               </a:extLst>
             </p:cNvPr>
@@ -31750,7 +31726,7 @@
             <p:cNvPr id="2" name="CaixaDeTexto 1">
               <a:extLst>
                 <a:ext uri="{FF2B5EF4-FFF2-40B4-BE49-F238E27FC236}">
-                  <a16:creationId xmlns:a16="http://schemas.microsoft.com/office/drawing/2014/main" id="{80F5CD5A-1914-4EF1-BE32-34B089486C2F}"/>
+                  <a16:creationId xmlns="" xmlns:a16="http://schemas.microsoft.com/office/drawing/2014/main" id="{80F5CD5A-1914-4EF1-BE32-34B089486C2F}"/>
                 </a:ext>
               </a:extLst>
             </p:cNvPr>
@@ -31791,7 +31767,7 @@
             <p:cNvPr id="5" name="Conector de Seta Reta 4">
               <a:extLst>
                 <a:ext uri="{FF2B5EF4-FFF2-40B4-BE49-F238E27FC236}">
-                  <a16:creationId xmlns:a16="http://schemas.microsoft.com/office/drawing/2014/main" id="{85E6B2C7-D043-4C92-898F-4F2DEE8A2690}"/>
+                  <a16:creationId xmlns="" xmlns:a16="http://schemas.microsoft.com/office/drawing/2014/main" id="{85E6B2C7-D043-4C92-898F-4F2DEE8A2690}"/>
                 </a:ext>
               </a:extLst>
             </p:cNvPr>
@@ -31834,7 +31810,7 @@
             <p:cNvPr id="6" name="Conector de Seta Reta 5">
               <a:extLst>
                 <a:ext uri="{FF2B5EF4-FFF2-40B4-BE49-F238E27FC236}">
-                  <a16:creationId xmlns:a16="http://schemas.microsoft.com/office/drawing/2014/main" id="{9BACC1B6-2F2A-4248-B083-17CB87D6E5BE}"/>
+                  <a16:creationId xmlns="" xmlns:a16="http://schemas.microsoft.com/office/drawing/2014/main" id="{9BACC1B6-2F2A-4248-B083-17CB87D6E5BE}"/>
                 </a:ext>
               </a:extLst>
             </p:cNvPr>
@@ -31877,7 +31853,7 @@
             <p:cNvPr id="8" name="Retângulo 7">
               <a:extLst>
                 <a:ext uri="{FF2B5EF4-FFF2-40B4-BE49-F238E27FC236}">
-                  <a16:creationId xmlns:a16="http://schemas.microsoft.com/office/drawing/2014/main" id="{5941647A-72D6-4138-BD44-C48D31273AB1}"/>
+                  <a16:creationId xmlns="" xmlns:a16="http://schemas.microsoft.com/office/drawing/2014/main" id="{5941647A-72D6-4138-BD44-C48D31273AB1}"/>
                 </a:ext>
               </a:extLst>
             </p:cNvPr>
@@ -31931,7 +31907,7 @@
             <p:cNvPr id="9" name="CaixaDeTexto 1">
               <a:extLst>
                 <a:ext uri="{FF2B5EF4-FFF2-40B4-BE49-F238E27FC236}">
-                  <a16:creationId xmlns:a16="http://schemas.microsoft.com/office/drawing/2014/main" id="{7994EBAF-0D7D-41FB-B228-383D0E67FB6C}"/>
+                  <a16:creationId xmlns="" xmlns:a16="http://schemas.microsoft.com/office/drawing/2014/main" id="{7994EBAF-0D7D-41FB-B228-383D0E67FB6C}"/>
                 </a:ext>
               </a:extLst>
             </p:cNvPr>
@@ -32064,7 +32040,7 @@
             <p:cNvPr id="10" name="Agrupar 9">
               <a:extLst>
                 <a:ext uri="{FF2B5EF4-FFF2-40B4-BE49-F238E27FC236}">
-                  <a16:creationId xmlns:a16="http://schemas.microsoft.com/office/drawing/2014/main" id="{824586A1-E2A3-4B25-8F44-2AB0D73E8B07}"/>
+                  <a16:creationId xmlns="" xmlns:a16="http://schemas.microsoft.com/office/drawing/2014/main" id="{824586A1-E2A3-4B25-8F44-2AB0D73E8B07}"/>
                 </a:ext>
               </a:extLst>
             </p:cNvPr>
@@ -32084,7 +32060,7 @@
               <p:cNvPr id="13" name="Imagem 6" descr="Uma imagem contendo objeto&#10;&#10;Descrição gerada com muito alta confiança">
                 <a:extLst>
                   <a:ext uri="{FF2B5EF4-FFF2-40B4-BE49-F238E27FC236}">
-                    <a16:creationId xmlns:a16="http://schemas.microsoft.com/office/drawing/2014/main" id="{63824687-0B05-4413-8D3C-5E29C9702638}"/>
+                    <a16:creationId xmlns="" xmlns:a16="http://schemas.microsoft.com/office/drawing/2014/main" id="{63824687-0B05-4413-8D3C-5E29C9702638}"/>
                   </a:ext>
                 </a:extLst>
               </p:cNvPr>
@@ -32114,7 +32090,7 @@
               <p:cNvPr id="16" name="CaixaDeTexto 15">
                 <a:extLst>
                   <a:ext uri="{FF2B5EF4-FFF2-40B4-BE49-F238E27FC236}">
-                    <a16:creationId xmlns:a16="http://schemas.microsoft.com/office/drawing/2014/main" id="{FDA29973-2090-478C-8CFB-2DD1F5F78F5A}"/>
+                    <a16:creationId xmlns="" xmlns:a16="http://schemas.microsoft.com/office/drawing/2014/main" id="{FDA29973-2090-478C-8CFB-2DD1F5F78F5A}"/>
                   </a:ext>
                 </a:extLst>
               </p:cNvPr>
@@ -32155,7 +32131,7 @@
             <p:cNvPr id="19" name="Conector de Seta Reta 18">
               <a:extLst>
                 <a:ext uri="{FF2B5EF4-FFF2-40B4-BE49-F238E27FC236}">
-                  <a16:creationId xmlns:a16="http://schemas.microsoft.com/office/drawing/2014/main" id="{7053101E-BA41-4AFA-90EB-5F30E05D5C2A}"/>
+                  <a16:creationId xmlns="" xmlns:a16="http://schemas.microsoft.com/office/drawing/2014/main" id="{7053101E-BA41-4AFA-90EB-5F30E05D5C2A}"/>
                 </a:ext>
               </a:extLst>
             </p:cNvPr>
@@ -32199,7 +32175,7 @@
             <p:cNvPr id="20" name="Conector de Seta Reta 19">
               <a:extLst>
                 <a:ext uri="{FF2B5EF4-FFF2-40B4-BE49-F238E27FC236}">
-                  <a16:creationId xmlns:a16="http://schemas.microsoft.com/office/drawing/2014/main" id="{972CCC72-617F-4D78-B3FE-1B11C03D20E1}"/>
+                  <a16:creationId xmlns="" xmlns:a16="http://schemas.microsoft.com/office/drawing/2014/main" id="{972CCC72-617F-4D78-B3FE-1B11C03D20E1}"/>
                 </a:ext>
               </a:extLst>
             </p:cNvPr>
@@ -32243,7 +32219,7 @@
             <p:cNvPr id="23" name="Conector de Seta Reta 22">
               <a:extLst>
                 <a:ext uri="{FF2B5EF4-FFF2-40B4-BE49-F238E27FC236}">
-                  <a16:creationId xmlns:a16="http://schemas.microsoft.com/office/drawing/2014/main" id="{6F2A4F03-C5E4-40D7-AA81-EDDBC7B02437}"/>
+                  <a16:creationId xmlns="" xmlns:a16="http://schemas.microsoft.com/office/drawing/2014/main" id="{6F2A4F03-C5E4-40D7-AA81-EDDBC7B02437}"/>
                 </a:ext>
               </a:extLst>
             </p:cNvPr>
@@ -32287,7 +32263,7 @@
             <p:cNvPr id="3" name="CaixaDeTexto 2">
               <a:extLst>
                 <a:ext uri="{FF2B5EF4-FFF2-40B4-BE49-F238E27FC236}">
-                  <a16:creationId xmlns:a16="http://schemas.microsoft.com/office/drawing/2014/main" id="{7FCA1908-EC09-46BB-B633-12D671CD2244}"/>
+                  <a16:creationId xmlns="" xmlns:a16="http://schemas.microsoft.com/office/drawing/2014/main" id="{7FCA1908-EC09-46BB-B633-12D671CD2244}"/>
                 </a:ext>
               </a:extLst>
             </p:cNvPr>
@@ -32328,7 +32304,7 @@
             <p:cNvPr id="14" name="Agrupar 13">
               <a:extLst>
                 <a:ext uri="{FF2B5EF4-FFF2-40B4-BE49-F238E27FC236}">
-                  <a16:creationId xmlns:a16="http://schemas.microsoft.com/office/drawing/2014/main" id="{52E15621-7F03-4345-B836-9C7FBBF4EDE5}"/>
+                  <a16:creationId xmlns="" xmlns:a16="http://schemas.microsoft.com/office/drawing/2014/main" id="{52E15621-7F03-4345-B836-9C7FBBF4EDE5}"/>
                 </a:ext>
               </a:extLst>
             </p:cNvPr>
@@ -32348,7 +32324,7 @@
               <p:cNvPr id="28" name="CaixaDeTexto 27">
                 <a:extLst>
                   <a:ext uri="{FF2B5EF4-FFF2-40B4-BE49-F238E27FC236}">
-                    <a16:creationId xmlns:a16="http://schemas.microsoft.com/office/drawing/2014/main" id="{06F24E56-56C0-48DE-B993-B1CF84033F10}"/>
+                    <a16:creationId xmlns="" xmlns:a16="http://schemas.microsoft.com/office/drawing/2014/main" id="{06F24E56-56C0-48DE-B993-B1CF84033F10}"/>
                   </a:ext>
                 </a:extLst>
               </p:cNvPr>
@@ -32430,7 +32406,7 @@
               <p:cNvPr id="33" name="Retângulo 32">
                 <a:extLst>
                   <a:ext uri="{FF2B5EF4-FFF2-40B4-BE49-F238E27FC236}">
-                    <a16:creationId xmlns:a16="http://schemas.microsoft.com/office/drawing/2014/main" id="{F00C5CCF-AC25-4099-8DD3-8B36FCAF56E7}"/>
+                    <a16:creationId xmlns="" xmlns:a16="http://schemas.microsoft.com/office/drawing/2014/main" id="{F00C5CCF-AC25-4099-8DD3-8B36FCAF56E7}"/>
                   </a:ext>
                 </a:extLst>
               </p:cNvPr>

</xml_diff>